<commit_message>
Identified most of the slides - split out the structure.
</commit_message>
<xml_diff>
--- a/Decks/Craft2023-PromiscuousPairingBeginnerMind.pptx
+++ b/Decks/Craft2023-PromiscuousPairingBeginnerMind.pptx
@@ -5,13 +5,27 @@
     <p:sldMasterId id="2147483660" r:id="rId1"/>
   </p:sldMasterIdLst>
   <p:notesMasterIdLst>
-    <p:notesMasterId r:id="rId6"/>
+    <p:notesMasterId r:id="rId20"/>
   </p:notesMasterIdLst>
   <p:sldIdLst>
     <p:sldId id="256" r:id="rId2"/>
-    <p:sldId id="259" r:id="rId3"/>
-    <p:sldId id="257" r:id="rId4"/>
-    <p:sldId id="258" r:id="rId5"/>
+    <p:sldId id="260" r:id="rId3"/>
+    <p:sldId id="261" r:id="rId4"/>
+    <p:sldId id="262" r:id="rId5"/>
+    <p:sldId id="263" r:id="rId6"/>
+    <p:sldId id="257" r:id="rId7"/>
+    <p:sldId id="258" r:id="rId8"/>
+    <p:sldId id="264" r:id="rId9"/>
+    <p:sldId id="266" r:id="rId10"/>
+    <p:sldId id="265" r:id="rId11"/>
+    <p:sldId id="267" r:id="rId12"/>
+    <p:sldId id="268" r:id="rId13"/>
+    <p:sldId id="269" r:id="rId14"/>
+    <p:sldId id="270" r:id="rId15"/>
+    <p:sldId id="271" r:id="rId16"/>
+    <p:sldId id="272" r:id="rId17"/>
+    <p:sldId id="273" r:id="rId18"/>
+    <p:sldId id="274" r:id="rId19"/>
   </p:sldIdLst>
   <p:sldSz cx="12192000" cy="6858000"/>
   <p:notesSz cx="6858000" cy="9144000"/>
@@ -513,7 +527,80 @@
           <a:p>
             <a:r>
               <a:rPr lang="en-US" dirty="0"/>
-              <a:t>Speaker notes for slide 1</a:t>
+              <a:t>We knew we had an excellent way to work when we were totally unable to do it without an egg timer. Let me step back.</a:t>
+            </a:r>
+          </a:p>
+          <a:p>
+            <a:endParaRPr lang="en-US" dirty="0"/>
+          </a:p>
+          <a:p>
+            <a:pPr marL="171450" indent="-171450">
+              <a:buFont typeface="Arial" panose="020B0604020202020204" pitchFamily="34" charset="0"/>
+              <a:buChar char="•"/>
+            </a:pPr>
+            <a:r>
+              <a:rPr lang="en-US" dirty="0"/>
+              <a:t>We paired 100% of the time. This was 2000, we had read the Extreme Programming White Book. Did it by the book, because couldn’t mess about.</a:t>
+            </a:r>
+          </a:p>
+          <a:p>
+            <a:pPr marL="171450" indent="-171450">
+              <a:buFont typeface="Arial" panose="020B0604020202020204" pitchFamily="34" charset="0"/>
+              <a:buChar char="•"/>
+            </a:pPr>
+            <a:r>
+              <a:rPr lang="en-US" dirty="0"/>
+              <a:t>Because we couldn’t mess about, we ran experiments &amp; did whatever worked.</a:t>
+            </a:r>
+          </a:p>
+          <a:p>
+            <a:pPr marL="171450" indent="-171450">
+              <a:buFont typeface="Arial" panose="020B0604020202020204" pitchFamily="34" charset="0"/>
+              <a:buChar char="•"/>
+            </a:pPr>
+            <a:r>
+              <a:rPr lang="en-US" dirty="0"/>
+              <a:t>Found some pairs were far more effective – even same people on different days.</a:t>
+            </a:r>
+          </a:p>
+          <a:p>
+            <a:pPr marL="171450" indent="-171450">
+              <a:buFont typeface="Arial" panose="020B0604020202020204" pitchFamily="34" charset="0"/>
+              <a:buChar char="•"/>
+            </a:pPr>
+            <a:r>
+              <a:rPr lang="en-US" dirty="0"/>
+              <a:t>Sought to establish why.</a:t>
+            </a:r>
+          </a:p>
+          <a:p>
+            <a:pPr marL="171450" indent="-171450">
+              <a:buFont typeface="Arial" panose="020B0604020202020204" pitchFamily="34" charset="0"/>
+              <a:buChar char="•"/>
+            </a:pPr>
+            <a:r>
+              <a:rPr lang="en-US" dirty="0"/>
+              <a:t>These were our results.</a:t>
+            </a:r>
+          </a:p>
+          <a:p>
+            <a:pPr marL="171450" indent="-171450">
+              <a:buFont typeface="Arial" panose="020B0604020202020204" pitchFamily="34" charset="0"/>
+              <a:buChar char="•"/>
+            </a:pPr>
+            <a:r>
+              <a:rPr lang="en-US" dirty="0"/>
+              <a:t>But most effective was also hardest.</a:t>
+            </a:r>
+          </a:p>
+          <a:p>
+            <a:pPr marL="171450" indent="-171450">
+              <a:buFont typeface="Arial" panose="020B0604020202020204" pitchFamily="34" charset="0"/>
+              <a:buChar char="•"/>
+            </a:pPr>
+            <a:r>
+              <a:rPr lang="en-US" dirty="0"/>
+              <a:t>Team chose to use the egg timer. Not because we like pain, but because we understood the data.</a:t>
             </a:r>
           </a:p>
         </p:txBody>
@@ -535,7 +622,7 @@
           <a:p>
             <a:fld id="{2E396785-7325-4959-B34C-58C3AEDA50A1}" type="slidenum">
               <a:rPr lang="en-US" smtClean="0"/>
-              <a:t>3</a:t>
+              <a:t>2</a:t>
             </a:fld>
             <a:endParaRPr lang="en-US"/>
           </a:p>
@@ -544,7 +631,394 @@
     </p:spTree>
     <p:extLst>
       <p:ext uri="{BB962C8B-B14F-4D97-AF65-F5344CB8AC3E}">
-        <p14:creationId xmlns:p14="http://schemas.microsoft.com/office/powerpoint/2010/main" val="1605974872"/>
+        <p14:creationId xmlns:p14="http://schemas.microsoft.com/office/powerpoint/2010/main" val="901128009"/>
+      </p:ext>
+    </p:extLst>
+  </p:cSld>
+  <p:clrMapOvr>
+    <a:masterClrMapping/>
+  </p:clrMapOvr>
+</p:notes>
+</file>
+
+<file path=ppt/notesSlides/notesSlide10.xml><?xml version="1.0" encoding="utf-8"?>
+<p:notes xmlns:a="http://schemas.openxmlformats.org/drawingml/2006/main" xmlns:r="http://schemas.openxmlformats.org/officeDocument/2006/relationships" xmlns:p="http://schemas.openxmlformats.org/presentationml/2006/main">
+  <p:cSld>
+    <p:spTree>
+      <p:nvGrpSpPr>
+        <p:cNvPr id="1" name=""/>
+        <p:cNvGrpSpPr/>
+        <p:nvPr/>
+      </p:nvGrpSpPr>
+      <p:grpSpPr>
+        <a:xfrm>
+          <a:off x="0" y="0"/>
+          <a:ext cx="0" cy="0"/>
+          <a:chOff x="0" y="0"/>
+          <a:chExt cx="0" cy="0"/>
+        </a:xfrm>
+      </p:grpSpPr>
+      <p:sp>
+        <p:nvSpPr>
+          <p:cNvPr id="2" name="Slide Image Placeholder 1"/>
+          <p:cNvSpPr>
+            <a:spLocks noGrp="1" noRot="1" noChangeAspect="1"/>
+          </p:cNvSpPr>
+          <p:nvPr>
+            <p:ph type="sldImg"/>
+          </p:nvPr>
+        </p:nvSpPr>
+        <p:spPr/>
+      </p:sp>
+      <p:sp>
+        <p:nvSpPr>
+          <p:cNvPr id="3" name="Notes Placeholder 2"/>
+          <p:cNvSpPr>
+            <a:spLocks noGrp="1"/>
+          </p:cNvSpPr>
+          <p:nvPr>
+            <p:ph type="body" idx="1"/>
+          </p:nvPr>
+        </p:nvSpPr>
+        <p:spPr/>
+        <p:txBody>
+          <a:bodyPr/>
+          <a:lstStyle/>
+          <a:p>
+            <a:r>
+              <a:rPr lang="en-US" dirty="0"/>
+              <a:t>Engineering Method</a:t>
+            </a:r>
+          </a:p>
+          <a:p>
+            <a:r>
+              <a:rPr lang="en-US" dirty="0"/>
+              <a:t>Goal: improve, even if it costs learning.</a:t>
+            </a:r>
+          </a:p>
+          <a:p>
+            <a:r>
+              <a:rPr lang="en-US" dirty="0"/>
+              <a:t>Assumes knowledge is present</a:t>
+            </a:r>
+          </a:p>
+          <a:p>
+            <a:r>
+              <a:rPr lang="en-US" dirty="0"/>
+              <a:t>Now apply &amp; refine best ideas.</a:t>
+            </a:r>
+          </a:p>
+          <a:p>
+            <a:r>
+              <a:rPr lang="en-US" dirty="0"/>
+              <a:t>Build consistency &amp; habits.</a:t>
+            </a:r>
+          </a:p>
+        </p:txBody>
+      </p:sp>
+      <p:sp>
+        <p:nvSpPr>
+          <p:cNvPr id="4" name="Slide Number Placeholder 3"/>
+          <p:cNvSpPr>
+            <a:spLocks noGrp="1"/>
+          </p:cNvSpPr>
+          <p:nvPr>
+            <p:ph type="sldNum" sz="quarter" idx="5"/>
+          </p:nvPr>
+        </p:nvSpPr>
+        <p:spPr/>
+        <p:txBody>
+          <a:bodyPr/>
+          <a:lstStyle/>
+          <a:p>
+            <a:fld id="{2E396785-7325-4959-B34C-58C3AEDA50A1}" type="slidenum">
+              <a:rPr lang="en-US" smtClean="0"/>
+              <a:t>11</a:t>
+            </a:fld>
+            <a:endParaRPr lang="en-US"/>
+          </a:p>
+        </p:txBody>
+      </p:sp>
+    </p:spTree>
+    <p:extLst>
+      <p:ext uri="{BB962C8B-B14F-4D97-AF65-F5344CB8AC3E}">
+        <p14:creationId xmlns:p14="http://schemas.microsoft.com/office/powerpoint/2010/main" val="3895911215"/>
+      </p:ext>
+    </p:extLst>
+  </p:cSld>
+  <p:clrMapOvr>
+    <a:masterClrMapping/>
+  </p:clrMapOvr>
+</p:notes>
+</file>
+
+<file path=ppt/notesSlides/notesSlide11.xml><?xml version="1.0" encoding="utf-8"?>
+<p:notes xmlns:a="http://schemas.openxmlformats.org/drawingml/2006/main" xmlns:r="http://schemas.openxmlformats.org/officeDocument/2006/relationships" xmlns:p="http://schemas.openxmlformats.org/presentationml/2006/main">
+  <p:cSld>
+    <p:spTree>
+      <p:nvGrpSpPr>
+        <p:cNvPr id="1" name=""/>
+        <p:cNvGrpSpPr/>
+        <p:nvPr/>
+      </p:nvGrpSpPr>
+      <p:grpSpPr>
+        <a:xfrm>
+          <a:off x="0" y="0"/>
+          <a:ext cx="0" cy="0"/>
+          <a:chOff x="0" y="0"/>
+          <a:chExt cx="0" cy="0"/>
+        </a:xfrm>
+      </p:grpSpPr>
+      <p:sp>
+        <p:nvSpPr>
+          <p:cNvPr id="2" name="Slide Image Placeholder 1"/>
+          <p:cNvSpPr>
+            <a:spLocks noGrp="1" noRot="1" noChangeAspect="1"/>
+          </p:cNvSpPr>
+          <p:nvPr>
+            <p:ph type="sldImg"/>
+          </p:nvPr>
+        </p:nvSpPr>
+        <p:spPr/>
+      </p:sp>
+      <p:sp>
+        <p:nvSpPr>
+          <p:cNvPr id="3" name="Notes Placeholder 2"/>
+          <p:cNvSpPr>
+            <a:spLocks noGrp="1"/>
+          </p:cNvSpPr>
+          <p:nvPr>
+            <p:ph type="body" idx="1"/>
+          </p:nvPr>
+        </p:nvSpPr>
+        <p:spPr/>
+        <p:txBody>
+          <a:bodyPr/>
+          <a:lstStyle/>
+          <a:p>
+            <a:r>
+              <a:rPr lang="en-US" dirty="0"/>
+              <a:t>Overall: alternate discovery with implementation</a:t>
+            </a:r>
+          </a:p>
+          <a:p>
+            <a:r>
+              <a:rPr lang="en-US" dirty="0"/>
+              <a:t>Each week, know which you are doing for each facet of your work</a:t>
+            </a:r>
+          </a:p>
+          <a:p>
+            <a:r>
+              <a:rPr lang="en-US" dirty="0"/>
+              <a:t>Retro format: shorts &amp; longs. Shorts only apply for improvements, longs lead to experiments.</a:t>
+            </a:r>
+          </a:p>
+          <a:p>
+            <a:endParaRPr lang="en-US" dirty="0"/>
+          </a:p>
+        </p:txBody>
+      </p:sp>
+      <p:sp>
+        <p:nvSpPr>
+          <p:cNvPr id="4" name="Slide Number Placeholder 3"/>
+          <p:cNvSpPr>
+            <a:spLocks noGrp="1"/>
+          </p:cNvSpPr>
+          <p:nvPr>
+            <p:ph type="sldNum" sz="quarter" idx="5"/>
+          </p:nvPr>
+        </p:nvSpPr>
+        <p:spPr/>
+        <p:txBody>
+          <a:bodyPr/>
+          <a:lstStyle/>
+          <a:p>
+            <a:fld id="{2E396785-7325-4959-B34C-58C3AEDA50A1}" type="slidenum">
+              <a:rPr lang="en-US" smtClean="0"/>
+              <a:t>12</a:t>
+            </a:fld>
+            <a:endParaRPr lang="en-US"/>
+          </a:p>
+        </p:txBody>
+      </p:sp>
+    </p:spTree>
+    <p:extLst>
+      <p:ext uri="{BB962C8B-B14F-4D97-AF65-F5344CB8AC3E}">
+        <p14:creationId xmlns:p14="http://schemas.microsoft.com/office/powerpoint/2010/main" val="1394533708"/>
+      </p:ext>
+    </p:extLst>
+  </p:cSld>
+  <p:clrMapOvr>
+    <a:masterClrMapping/>
+  </p:clrMapOvr>
+</p:notes>
+</file>
+
+<file path=ppt/notesSlides/notesSlide12.xml><?xml version="1.0" encoding="utf-8"?>
+<p:notes xmlns:a="http://schemas.openxmlformats.org/drawingml/2006/main" xmlns:r="http://schemas.openxmlformats.org/officeDocument/2006/relationships" xmlns:p="http://schemas.openxmlformats.org/presentationml/2006/main">
+  <p:cSld>
+    <p:spTree>
+      <p:nvGrpSpPr>
+        <p:cNvPr id="1" name=""/>
+        <p:cNvGrpSpPr/>
+        <p:nvPr/>
+      </p:nvGrpSpPr>
+      <p:grpSpPr>
+        <a:xfrm>
+          <a:off x="0" y="0"/>
+          <a:ext cx="0" cy="0"/>
+          <a:chOff x="0" y="0"/>
+          <a:chExt cx="0" cy="0"/>
+        </a:xfrm>
+      </p:grpSpPr>
+      <p:sp>
+        <p:nvSpPr>
+          <p:cNvPr id="2" name="Slide Image Placeholder 1"/>
+          <p:cNvSpPr>
+            <a:spLocks noGrp="1" noRot="1" noChangeAspect="1"/>
+          </p:cNvSpPr>
+          <p:nvPr>
+            <p:ph type="sldImg"/>
+          </p:nvPr>
+        </p:nvSpPr>
+        <p:spPr/>
+      </p:sp>
+      <p:sp>
+        <p:nvSpPr>
+          <p:cNvPr id="3" name="Notes Placeholder 2"/>
+          <p:cNvSpPr>
+            <a:spLocks noGrp="1"/>
+          </p:cNvSpPr>
+          <p:nvPr>
+            <p:ph type="body" idx="1"/>
+          </p:nvPr>
+        </p:nvSpPr>
+        <p:spPr/>
+        <p:txBody>
+          <a:bodyPr/>
+          <a:lstStyle/>
+          <a:p>
+            <a:r>
+              <a:rPr lang="en-US" dirty="0"/>
+              <a:t>Choose it intentionally, based on data. Then improve it consistently.</a:t>
+            </a:r>
+          </a:p>
+          <a:p>
+            <a:endParaRPr lang="en-US" dirty="0"/>
+          </a:p>
+        </p:txBody>
+      </p:sp>
+      <p:sp>
+        <p:nvSpPr>
+          <p:cNvPr id="4" name="Slide Number Placeholder 3"/>
+          <p:cNvSpPr>
+            <a:spLocks noGrp="1"/>
+          </p:cNvSpPr>
+          <p:nvPr>
+            <p:ph type="sldNum" sz="quarter" idx="5"/>
+          </p:nvPr>
+        </p:nvSpPr>
+        <p:spPr/>
+        <p:txBody>
+          <a:bodyPr/>
+          <a:lstStyle/>
+          <a:p>
+            <a:fld id="{2E396785-7325-4959-B34C-58C3AEDA50A1}" type="slidenum">
+              <a:rPr lang="en-US" smtClean="0"/>
+              <a:t>16</a:t>
+            </a:fld>
+            <a:endParaRPr lang="en-US"/>
+          </a:p>
+        </p:txBody>
+      </p:sp>
+    </p:spTree>
+    <p:extLst>
+      <p:ext uri="{BB962C8B-B14F-4D97-AF65-F5344CB8AC3E}">
+        <p14:creationId xmlns:p14="http://schemas.microsoft.com/office/powerpoint/2010/main" val="2271503796"/>
+      </p:ext>
+    </p:extLst>
+  </p:cSld>
+  <p:clrMapOvr>
+    <a:masterClrMapping/>
+  </p:clrMapOvr>
+</p:notes>
+</file>
+
+<file path=ppt/notesSlides/notesSlide13.xml><?xml version="1.0" encoding="utf-8"?>
+<p:notes xmlns:a="http://schemas.openxmlformats.org/drawingml/2006/main" xmlns:r="http://schemas.openxmlformats.org/officeDocument/2006/relationships" xmlns:p="http://schemas.openxmlformats.org/presentationml/2006/main">
+  <p:cSld>
+    <p:spTree>
+      <p:nvGrpSpPr>
+        <p:cNvPr id="1" name=""/>
+        <p:cNvGrpSpPr/>
+        <p:nvPr/>
+      </p:nvGrpSpPr>
+      <p:grpSpPr>
+        <a:xfrm>
+          <a:off x="0" y="0"/>
+          <a:ext cx="0" cy="0"/>
+          <a:chOff x="0" y="0"/>
+          <a:chExt cx="0" cy="0"/>
+        </a:xfrm>
+      </p:grpSpPr>
+      <p:sp>
+        <p:nvSpPr>
+          <p:cNvPr id="2" name="Slide Image Placeholder 1"/>
+          <p:cNvSpPr>
+            <a:spLocks noGrp="1" noRot="1" noChangeAspect="1"/>
+          </p:cNvSpPr>
+          <p:nvPr>
+            <p:ph type="sldImg"/>
+          </p:nvPr>
+        </p:nvSpPr>
+        <p:spPr/>
+      </p:sp>
+      <p:sp>
+        <p:nvSpPr>
+          <p:cNvPr id="3" name="Notes Placeholder 2"/>
+          <p:cNvSpPr>
+            <a:spLocks noGrp="1"/>
+          </p:cNvSpPr>
+          <p:nvPr>
+            <p:ph type="body" idx="1"/>
+          </p:nvPr>
+        </p:nvSpPr>
+        <p:spPr/>
+        <p:txBody>
+          <a:bodyPr/>
+          <a:lstStyle/>
+          <a:p>
+            <a:endParaRPr lang="en-US" dirty="0"/>
+          </a:p>
+        </p:txBody>
+      </p:sp>
+      <p:sp>
+        <p:nvSpPr>
+          <p:cNvPr id="4" name="Slide Number Placeholder 3"/>
+          <p:cNvSpPr>
+            <a:spLocks noGrp="1"/>
+          </p:cNvSpPr>
+          <p:nvPr>
+            <p:ph type="sldNum" sz="quarter" idx="5"/>
+          </p:nvPr>
+        </p:nvSpPr>
+        <p:spPr/>
+        <p:txBody>
+          <a:bodyPr/>
+          <a:lstStyle/>
+          <a:p>
+            <a:fld id="{2E396785-7325-4959-B34C-58C3AEDA50A1}" type="slidenum">
+              <a:rPr lang="en-US" smtClean="0"/>
+              <a:t>17</a:t>
+            </a:fld>
+            <a:endParaRPr lang="en-US"/>
+          </a:p>
+        </p:txBody>
+      </p:sp>
+    </p:spTree>
+    <p:extLst>
+      <p:ext uri="{BB962C8B-B14F-4D97-AF65-F5344CB8AC3E}">
+        <p14:creationId xmlns:p14="http://schemas.microsoft.com/office/powerpoint/2010/main" val="2426292136"/>
       </p:ext>
     </p:extLst>
   </p:cSld>
@@ -600,7 +1074,206 @@
           <a:p>
             <a:r>
               <a:rPr lang="en-US" dirty="0"/>
-              <a:t>Notes about Mobbing</a:t>
+              <a:t>There are many ways to collaborate. PR, Peer, Pair, and Ensemble all work in different contexts. Many variations on each.</a:t>
+            </a:r>
+          </a:p>
+          <a:p>
+            <a:endParaRPr lang="en-US" dirty="0"/>
+          </a:p>
+          <a:p>
+            <a:r>
+              <a:rPr lang="en-US" dirty="0"/>
+              <a:t>Intuition and ease may be misleading. Choose intentionally, based on data. And ease can be a valid factor!</a:t>
+            </a:r>
+          </a:p>
+        </p:txBody>
+      </p:sp>
+      <p:sp>
+        <p:nvSpPr>
+          <p:cNvPr id="4" name="Slide Number Placeholder 3"/>
+          <p:cNvSpPr>
+            <a:spLocks noGrp="1"/>
+          </p:cNvSpPr>
+          <p:nvPr>
+            <p:ph type="sldNum" sz="quarter" idx="5"/>
+          </p:nvPr>
+        </p:nvSpPr>
+        <p:spPr/>
+        <p:txBody>
+          <a:bodyPr/>
+          <a:lstStyle/>
+          <a:p>
+            <a:fld id="{2E396785-7325-4959-B34C-58C3AEDA50A1}" type="slidenum">
+              <a:rPr lang="en-US" smtClean="0"/>
+              <a:t>3</a:t>
+            </a:fld>
+            <a:endParaRPr lang="en-US"/>
+          </a:p>
+        </p:txBody>
+      </p:sp>
+    </p:spTree>
+    <p:extLst>
+      <p:ext uri="{BB962C8B-B14F-4D97-AF65-F5344CB8AC3E}">
+        <p14:creationId xmlns:p14="http://schemas.microsoft.com/office/powerpoint/2010/main" val="2527625466"/>
+      </p:ext>
+    </p:extLst>
+  </p:cSld>
+  <p:clrMapOvr>
+    <a:masterClrMapping/>
+  </p:clrMapOvr>
+</p:notes>
+</file>
+
+<file path=ppt/notesSlides/notesSlide3.xml><?xml version="1.0" encoding="utf-8"?>
+<p:notes xmlns:a="http://schemas.openxmlformats.org/drawingml/2006/main" xmlns:r="http://schemas.openxmlformats.org/officeDocument/2006/relationships" xmlns:p="http://schemas.openxmlformats.org/presentationml/2006/main">
+  <p:cSld>
+    <p:spTree>
+      <p:nvGrpSpPr>
+        <p:cNvPr id="1" name=""/>
+        <p:cNvGrpSpPr/>
+        <p:nvPr/>
+      </p:nvGrpSpPr>
+      <p:grpSpPr>
+        <a:xfrm>
+          <a:off x="0" y="0"/>
+          <a:ext cx="0" cy="0"/>
+          <a:chOff x="0" y="0"/>
+          <a:chExt cx="0" cy="0"/>
+        </a:xfrm>
+      </p:grpSpPr>
+      <p:sp>
+        <p:nvSpPr>
+          <p:cNvPr id="2" name="Slide Image Placeholder 1"/>
+          <p:cNvSpPr>
+            <a:spLocks noGrp="1" noRot="1" noChangeAspect="1"/>
+          </p:cNvSpPr>
+          <p:nvPr>
+            <p:ph type="sldImg"/>
+          </p:nvPr>
+        </p:nvSpPr>
+        <p:spPr/>
+      </p:sp>
+      <p:sp>
+        <p:nvSpPr>
+          <p:cNvPr id="3" name="Notes Placeholder 2"/>
+          <p:cNvSpPr>
+            <a:spLocks noGrp="1"/>
+          </p:cNvSpPr>
+          <p:nvPr>
+            <p:ph type="body" idx="1"/>
+          </p:nvPr>
+        </p:nvSpPr>
+        <p:spPr/>
+        <p:txBody>
+          <a:bodyPr/>
+          <a:lstStyle/>
+          <a:p>
+            <a:pPr marL="0" marR="0" lvl="0" indent="0" algn="l" defTabSz="914400" rtl="0" eaLnBrk="1" fontAlgn="auto" latinLnBrk="0" hangingPunct="1">
+              <a:lnSpc>
+                <a:spcPct val="100000"/>
+              </a:lnSpc>
+              <a:spcBef>
+                <a:spcPts val="0"/>
+              </a:spcBef>
+              <a:spcAft>
+                <a:spcPts val="0"/>
+              </a:spcAft>
+              <a:buClrTx/>
+              <a:buSzTx/>
+              <a:buFontTx/>
+              <a:buNone/>
+              <a:tabLst/>
+              <a:defRPr/>
+            </a:pPr>
+            <a:r>
+              <a:rPr lang="en-US" dirty="0"/>
+              <a:t>Here’s where I make a recommendation about how you work.</a:t>
+            </a:r>
+          </a:p>
+          <a:p>
+            <a:pPr marL="0" marR="0" lvl="0" indent="0" algn="l" defTabSz="914400" rtl="0" eaLnBrk="1" fontAlgn="auto" latinLnBrk="0" hangingPunct="1">
+              <a:lnSpc>
+                <a:spcPct val="100000"/>
+              </a:lnSpc>
+              <a:spcBef>
+                <a:spcPts val="0"/>
+              </a:spcBef>
+              <a:spcAft>
+                <a:spcPts val="0"/>
+              </a:spcAft>
+              <a:buClrTx/>
+              <a:buSzTx/>
+              <a:buFontTx/>
+              <a:buNone/>
+              <a:tabLst/>
+              <a:defRPr/>
+            </a:pPr>
+            <a:endParaRPr lang="en-US" dirty="0"/>
+          </a:p>
+          <a:p>
+            <a:pPr marL="0" marR="0" lvl="0" indent="0" algn="l" defTabSz="914400" rtl="0" eaLnBrk="1" fontAlgn="auto" latinLnBrk="0" hangingPunct="1">
+              <a:lnSpc>
+                <a:spcPct val="100000"/>
+              </a:lnSpc>
+              <a:spcBef>
+                <a:spcPts val="0"/>
+              </a:spcBef>
+              <a:spcAft>
+                <a:spcPts val="0"/>
+              </a:spcAft>
+              <a:buClrTx/>
+              <a:buSzTx/>
+              <a:buFontTx/>
+              <a:buNone/>
+              <a:tabLst/>
+              <a:defRPr/>
+            </a:pPr>
+            <a:r>
+              <a:rPr lang="en-US" dirty="0"/>
+              <a:t>…and because this is a talk about Pairing, I’m going to recommend…that you change your retro.</a:t>
+            </a:r>
+          </a:p>
+          <a:p>
+            <a:pPr marL="0" marR="0" lvl="0" indent="0" algn="l" defTabSz="914400" rtl="0" eaLnBrk="1" fontAlgn="auto" latinLnBrk="0" hangingPunct="1">
+              <a:lnSpc>
+                <a:spcPct val="100000"/>
+              </a:lnSpc>
+              <a:spcBef>
+                <a:spcPts val="0"/>
+              </a:spcBef>
+              <a:spcAft>
+                <a:spcPts val="0"/>
+              </a:spcAft>
+              <a:buClrTx/>
+              <a:buSzTx/>
+              <a:buFontTx/>
+              <a:buNone/>
+              <a:tabLst/>
+              <a:defRPr/>
+            </a:pPr>
+            <a:endParaRPr lang="en-US" dirty="0"/>
+          </a:p>
+          <a:p>
+            <a:pPr marL="0" marR="0" lvl="0" indent="0" algn="l" defTabSz="914400" rtl="0" eaLnBrk="1" fontAlgn="auto" latinLnBrk="0" hangingPunct="1">
+              <a:lnSpc>
+                <a:spcPct val="100000"/>
+              </a:lnSpc>
+              <a:spcBef>
+                <a:spcPts val="0"/>
+              </a:spcBef>
+              <a:spcAft>
+                <a:spcPts val="0"/>
+              </a:spcAft>
+              <a:buClrTx/>
+              <a:buSzTx/>
+              <a:buFontTx/>
+              <a:buNone/>
+              <a:tabLst/>
+              <a:defRPr/>
+            </a:pPr>
+            <a:r>
+              <a:rPr lang="en-US" dirty="0"/>
+              <a:t>Start using data and lightweight experiments in your continuous improvement process (replaces traditional retro)</a:t>
             </a:r>
           </a:p>
           <a:p>
@@ -634,7 +1307,688 @@
     </p:spTree>
     <p:extLst>
       <p:ext uri="{BB962C8B-B14F-4D97-AF65-F5344CB8AC3E}">
+        <p14:creationId xmlns:p14="http://schemas.microsoft.com/office/powerpoint/2010/main" val="1178756113"/>
+      </p:ext>
+    </p:extLst>
+  </p:cSld>
+  <p:clrMapOvr>
+    <a:masterClrMapping/>
+  </p:clrMapOvr>
+</p:notes>
+</file>
+
+<file path=ppt/notesSlides/notesSlide4.xml><?xml version="1.0" encoding="utf-8"?>
+<p:notes xmlns:a="http://schemas.openxmlformats.org/drawingml/2006/main" xmlns:r="http://schemas.openxmlformats.org/officeDocument/2006/relationships" xmlns:p="http://schemas.openxmlformats.org/presentationml/2006/main">
+  <p:cSld>
+    <p:spTree>
+      <p:nvGrpSpPr>
+        <p:cNvPr id="1" name=""/>
+        <p:cNvGrpSpPr/>
+        <p:nvPr/>
+      </p:nvGrpSpPr>
+      <p:grpSpPr>
+        <a:xfrm>
+          <a:off x="0" y="0"/>
+          <a:ext cx="0" cy="0"/>
+          <a:chOff x="0" y="0"/>
+          <a:chExt cx="0" cy="0"/>
+        </a:xfrm>
+      </p:grpSpPr>
+      <p:sp>
+        <p:nvSpPr>
+          <p:cNvPr id="2" name="Slide Image Placeholder 1"/>
+          <p:cNvSpPr>
+            <a:spLocks noGrp="1" noRot="1" noChangeAspect="1"/>
+          </p:cNvSpPr>
+          <p:nvPr>
+            <p:ph type="sldImg"/>
+          </p:nvPr>
+        </p:nvSpPr>
+        <p:spPr/>
+      </p:sp>
+      <p:sp>
+        <p:nvSpPr>
+          <p:cNvPr id="3" name="Notes Placeholder 2"/>
+          <p:cNvSpPr>
+            <a:spLocks noGrp="1"/>
+          </p:cNvSpPr>
+          <p:nvPr>
+            <p:ph type="body" idx="1"/>
+          </p:nvPr>
+        </p:nvSpPr>
+        <p:spPr/>
+        <p:txBody>
+          <a:bodyPr/>
+          <a:lstStyle/>
+          <a:p>
+            <a:r>
+              <a:rPr lang="en-US" dirty="0"/>
+              <a:t>But first let’s talk about pairing</a:t>
+            </a:r>
+          </a:p>
+          <a:p>
+            <a:endParaRPr lang="en-US" dirty="0"/>
+          </a:p>
+          <a:p>
+            <a:pPr marL="171450" indent="-171450">
+              <a:buFont typeface="Arial" panose="020B0604020202020204" pitchFamily="34" charset="0"/>
+              <a:buChar char="•"/>
+            </a:pPr>
+            <a:r>
+              <a:rPr lang="en-US" dirty="0"/>
+              <a:t>Walk through our results</a:t>
+            </a:r>
+          </a:p>
+          <a:p>
+            <a:pPr marL="0" lvl="0" indent="0">
+              <a:buFont typeface="Arial" panose="020B0604020202020204" pitchFamily="34" charset="0"/>
+              <a:buNone/>
+            </a:pPr>
+            <a:endParaRPr lang="en-US" dirty="0"/>
+          </a:p>
+          <a:p>
+            <a:pPr marL="0" lvl="0" indent="0">
+              <a:buFont typeface="Arial" panose="020B0604020202020204" pitchFamily="34" charset="0"/>
+              <a:buNone/>
+            </a:pPr>
+            <a:r>
+              <a:rPr lang="en-US" dirty="0"/>
+              <a:t>…so if you’re going to pair promiscuously, make sure you experiment well!</a:t>
+            </a:r>
+          </a:p>
+        </p:txBody>
+      </p:sp>
+      <p:sp>
+        <p:nvSpPr>
+          <p:cNvPr id="4" name="Slide Number Placeholder 3"/>
+          <p:cNvSpPr>
+            <a:spLocks noGrp="1"/>
+          </p:cNvSpPr>
+          <p:nvPr>
+            <p:ph type="sldNum" sz="quarter" idx="5"/>
+          </p:nvPr>
+        </p:nvSpPr>
+        <p:spPr/>
+        <p:txBody>
+          <a:bodyPr/>
+          <a:lstStyle/>
+          <a:p>
+            <a:fld id="{2E396785-7325-4959-B34C-58C3AEDA50A1}" type="slidenum">
+              <a:rPr lang="en-US" smtClean="0"/>
+              <a:t>5</a:t>
+            </a:fld>
+            <a:endParaRPr lang="en-US"/>
+          </a:p>
+        </p:txBody>
+      </p:sp>
+    </p:spTree>
+    <p:extLst>
+      <p:ext uri="{BB962C8B-B14F-4D97-AF65-F5344CB8AC3E}">
+        <p14:creationId xmlns:p14="http://schemas.microsoft.com/office/powerpoint/2010/main" val="1966691023"/>
+      </p:ext>
+    </p:extLst>
+  </p:cSld>
+  <p:clrMapOvr>
+    <a:masterClrMapping/>
+  </p:clrMapOvr>
+</p:notes>
+</file>
+
+<file path=ppt/notesSlides/notesSlide5.xml><?xml version="1.0" encoding="utf-8"?>
+<p:notes xmlns:a="http://schemas.openxmlformats.org/drawingml/2006/main" xmlns:r="http://schemas.openxmlformats.org/officeDocument/2006/relationships" xmlns:p="http://schemas.openxmlformats.org/presentationml/2006/main">
+  <p:cSld>
+    <p:spTree>
+      <p:nvGrpSpPr>
+        <p:cNvPr id="1" name=""/>
+        <p:cNvGrpSpPr/>
+        <p:nvPr/>
+      </p:nvGrpSpPr>
+      <p:grpSpPr>
+        <a:xfrm>
+          <a:off x="0" y="0"/>
+          <a:ext cx="0" cy="0"/>
+          <a:chOff x="0" y="0"/>
+          <a:chExt cx="0" cy="0"/>
+        </a:xfrm>
+      </p:grpSpPr>
+      <p:sp>
+        <p:nvSpPr>
+          <p:cNvPr id="2" name="Slide Image Placeholder 1"/>
+          <p:cNvSpPr>
+            <a:spLocks noGrp="1" noRot="1" noChangeAspect="1"/>
+          </p:cNvSpPr>
+          <p:nvPr>
+            <p:ph type="sldImg"/>
+          </p:nvPr>
+        </p:nvSpPr>
+        <p:spPr/>
+      </p:sp>
+      <p:sp>
+        <p:nvSpPr>
+          <p:cNvPr id="3" name="Notes Placeholder 2"/>
+          <p:cNvSpPr>
+            <a:spLocks noGrp="1"/>
+          </p:cNvSpPr>
+          <p:nvPr>
+            <p:ph type="body" idx="1"/>
+          </p:nvPr>
+        </p:nvSpPr>
+        <p:spPr/>
+        <p:txBody>
+          <a:bodyPr/>
+          <a:lstStyle/>
+          <a:p>
+            <a:r>
+              <a:rPr lang="en-US" dirty="0"/>
+              <a:t>Speaker notes for slide 1</a:t>
+            </a:r>
+          </a:p>
+        </p:txBody>
+      </p:sp>
+      <p:sp>
+        <p:nvSpPr>
+          <p:cNvPr id="4" name="Slide Number Placeholder 3"/>
+          <p:cNvSpPr>
+            <a:spLocks noGrp="1"/>
+          </p:cNvSpPr>
+          <p:nvPr>
+            <p:ph type="sldNum" sz="quarter" idx="5"/>
+          </p:nvPr>
+        </p:nvSpPr>
+        <p:spPr/>
+        <p:txBody>
+          <a:bodyPr/>
+          <a:lstStyle/>
+          <a:p>
+            <a:fld id="{2E396785-7325-4959-B34C-58C3AEDA50A1}" type="slidenum">
+              <a:rPr lang="en-US" smtClean="0"/>
+              <a:t>6</a:t>
+            </a:fld>
+            <a:endParaRPr lang="en-US"/>
+          </a:p>
+        </p:txBody>
+      </p:sp>
+    </p:spTree>
+    <p:extLst>
+      <p:ext uri="{BB962C8B-B14F-4D97-AF65-F5344CB8AC3E}">
+        <p14:creationId xmlns:p14="http://schemas.microsoft.com/office/powerpoint/2010/main" val="1605974872"/>
+      </p:ext>
+    </p:extLst>
+  </p:cSld>
+  <p:clrMapOvr>
+    <a:masterClrMapping/>
+  </p:clrMapOvr>
+</p:notes>
+</file>
+
+<file path=ppt/notesSlides/notesSlide6.xml><?xml version="1.0" encoding="utf-8"?>
+<p:notes xmlns:a="http://schemas.openxmlformats.org/drawingml/2006/main" xmlns:r="http://schemas.openxmlformats.org/officeDocument/2006/relationships" xmlns:p="http://schemas.openxmlformats.org/presentationml/2006/main">
+  <p:cSld>
+    <p:spTree>
+      <p:nvGrpSpPr>
+        <p:cNvPr id="1" name=""/>
+        <p:cNvGrpSpPr/>
+        <p:nvPr/>
+      </p:nvGrpSpPr>
+      <p:grpSpPr>
+        <a:xfrm>
+          <a:off x="0" y="0"/>
+          <a:ext cx="0" cy="0"/>
+          <a:chOff x="0" y="0"/>
+          <a:chExt cx="0" cy="0"/>
+        </a:xfrm>
+      </p:grpSpPr>
+      <p:sp>
+        <p:nvSpPr>
+          <p:cNvPr id="2" name="Slide Image Placeholder 1"/>
+          <p:cNvSpPr>
+            <a:spLocks noGrp="1" noRot="1" noChangeAspect="1"/>
+          </p:cNvSpPr>
+          <p:nvPr>
+            <p:ph type="sldImg"/>
+          </p:nvPr>
+        </p:nvSpPr>
+        <p:spPr/>
+      </p:sp>
+      <p:sp>
+        <p:nvSpPr>
+          <p:cNvPr id="3" name="Notes Placeholder 2"/>
+          <p:cNvSpPr>
+            <a:spLocks noGrp="1"/>
+          </p:cNvSpPr>
+          <p:nvPr>
+            <p:ph type="body" idx="1"/>
+          </p:nvPr>
+        </p:nvSpPr>
+        <p:spPr/>
+        <p:txBody>
+          <a:bodyPr/>
+          <a:lstStyle/>
+          <a:p>
+            <a:r>
+              <a:rPr lang="en-US" dirty="0"/>
+              <a:t>Not really. Mob vs Promiscuous Pair vs slow Pair vs Peer vs Solo/PR feature comparison</a:t>
+            </a:r>
+          </a:p>
+          <a:p>
+            <a:endParaRPr lang="en-US" dirty="0"/>
+          </a:p>
+          <a:p>
+            <a:r>
+              <a:rPr lang="en-US" dirty="0"/>
+              <a:t>But these are all generalizations. Different teams see different results. Different contexts need different things. So run the experiments yourself and choose.</a:t>
+            </a:r>
+          </a:p>
+          <a:p>
+            <a:endParaRPr lang="en-US" dirty="0"/>
+          </a:p>
+        </p:txBody>
+      </p:sp>
+      <p:sp>
+        <p:nvSpPr>
+          <p:cNvPr id="4" name="Slide Number Placeholder 3"/>
+          <p:cNvSpPr>
+            <a:spLocks noGrp="1"/>
+          </p:cNvSpPr>
+          <p:nvPr>
+            <p:ph type="sldNum" sz="quarter" idx="5"/>
+          </p:nvPr>
+        </p:nvSpPr>
+        <p:spPr/>
+        <p:txBody>
+          <a:bodyPr/>
+          <a:lstStyle/>
+          <a:p>
+            <a:fld id="{2E396785-7325-4959-B34C-58C3AEDA50A1}" type="slidenum">
+              <a:rPr lang="en-US" smtClean="0"/>
+              <a:t>7</a:t>
+            </a:fld>
+            <a:endParaRPr lang="en-US"/>
+          </a:p>
+        </p:txBody>
+      </p:sp>
+    </p:spTree>
+    <p:extLst>
+      <p:ext uri="{BB962C8B-B14F-4D97-AF65-F5344CB8AC3E}">
         <p14:creationId xmlns:p14="http://schemas.microsoft.com/office/powerpoint/2010/main" val="1406372321"/>
+      </p:ext>
+    </p:extLst>
+  </p:cSld>
+  <p:clrMapOvr>
+    <a:masterClrMapping/>
+  </p:clrMapOvr>
+</p:notes>
+</file>
+
+<file path=ppt/notesSlides/notesSlide7.xml><?xml version="1.0" encoding="utf-8"?>
+<p:notes xmlns:a="http://schemas.openxmlformats.org/drawingml/2006/main" xmlns:r="http://schemas.openxmlformats.org/officeDocument/2006/relationships" xmlns:p="http://schemas.openxmlformats.org/presentationml/2006/main">
+  <p:cSld>
+    <p:spTree>
+      <p:nvGrpSpPr>
+        <p:cNvPr id="1" name=""/>
+        <p:cNvGrpSpPr/>
+        <p:nvPr/>
+      </p:nvGrpSpPr>
+      <p:grpSpPr>
+        <a:xfrm>
+          <a:off x="0" y="0"/>
+          <a:ext cx="0" cy="0"/>
+          <a:chOff x="0" y="0"/>
+          <a:chExt cx="0" cy="0"/>
+        </a:xfrm>
+      </p:grpSpPr>
+      <p:sp>
+        <p:nvSpPr>
+          <p:cNvPr id="2" name="Slide Image Placeholder 1"/>
+          <p:cNvSpPr>
+            <a:spLocks noGrp="1" noRot="1" noChangeAspect="1"/>
+          </p:cNvSpPr>
+          <p:nvPr>
+            <p:ph type="sldImg"/>
+          </p:nvPr>
+        </p:nvSpPr>
+        <p:spPr/>
+      </p:sp>
+      <p:sp>
+        <p:nvSpPr>
+          <p:cNvPr id="3" name="Notes Placeholder 2"/>
+          <p:cNvSpPr>
+            <a:spLocks noGrp="1"/>
+          </p:cNvSpPr>
+          <p:nvPr>
+            <p:ph type="body" idx="1"/>
+          </p:nvPr>
+        </p:nvSpPr>
+        <p:spPr/>
+        <p:txBody>
+          <a:bodyPr/>
+          <a:lstStyle/>
+          <a:p>
+            <a:pPr marL="171450" indent="-171450">
+              <a:buFont typeface="Arial" panose="020B0604020202020204" pitchFamily="34" charset="0"/>
+              <a:buChar char="•"/>
+            </a:pPr>
+            <a:r>
+              <a:rPr lang="en-US" dirty="0"/>
+              <a:t>Mention MS team’s follow-up a year later</a:t>
+            </a:r>
+          </a:p>
+          <a:p>
+            <a:pPr marL="628650" lvl="1" indent="-171450">
+              <a:buFont typeface="Arial" panose="020B0604020202020204" pitchFamily="34" charset="0"/>
+              <a:buChar char="•"/>
+            </a:pPr>
+            <a:r>
+              <a:rPr lang="en-US" dirty="0"/>
+              <a:t>Surfaced all the problems. They had a traditional continuous improvement process, so couldn’t solve the problems in real time.</a:t>
+            </a:r>
+          </a:p>
+          <a:p>
+            <a:endParaRPr lang="en-US" dirty="0"/>
+          </a:p>
+        </p:txBody>
+      </p:sp>
+      <p:sp>
+        <p:nvSpPr>
+          <p:cNvPr id="4" name="Slide Number Placeholder 3"/>
+          <p:cNvSpPr>
+            <a:spLocks noGrp="1"/>
+          </p:cNvSpPr>
+          <p:nvPr>
+            <p:ph type="sldNum" sz="quarter" idx="5"/>
+          </p:nvPr>
+        </p:nvSpPr>
+        <p:spPr/>
+        <p:txBody>
+          <a:bodyPr/>
+          <a:lstStyle/>
+          <a:p>
+            <a:fld id="{2E396785-7325-4959-B34C-58C3AEDA50A1}" type="slidenum">
+              <a:rPr lang="en-US" smtClean="0"/>
+              <a:t>8</a:t>
+            </a:fld>
+            <a:endParaRPr lang="en-US"/>
+          </a:p>
+        </p:txBody>
+      </p:sp>
+    </p:spTree>
+    <p:extLst>
+      <p:ext uri="{BB962C8B-B14F-4D97-AF65-F5344CB8AC3E}">
+        <p14:creationId xmlns:p14="http://schemas.microsoft.com/office/powerpoint/2010/main" val="1704017679"/>
+      </p:ext>
+    </p:extLst>
+  </p:cSld>
+  <p:clrMapOvr>
+    <a:masterClrMapping/>
+  </p:clrMapOvr>
+</p:notes>
+</file>
+
+<file path=ppt/notesSlides/notesSlide8.xml><?xml version="1.0" encoding="utf-8"?>
+<p:notes xmlns:a="http://schemas.openxmlformats.org/drawingml/2006/main" xmlns:r="http://schemas.openxmlformats.org/officeDocument/2006/relationships" xmlns:p="http://schemas.openxmlformats.org/presentationml/2006/main">
+  <p:cSld>
+    <p:spTree>
+      <p:nvGrpSpPr>
+        <p:cNvPr id="1" name=""/>
+        <p:cNvGrpSpPr/>
+        <p:nvPr/>
+      </p:nvGrpSpPr>
+      <p:grpSpPr>
+        <a:xfrm>
+          <a:off x="0" y="0"/>
+          <a:ext cx="0" cy="0"/>
+          <a:chOff x="0" y="0"/>
+          <a:chExt cx="0" cy="0"/>
+        </a:xfrm>
+      </p:grpSpPr>
+      <p:sp>
+        <p:nvSpPr>
+          <p:cNvPr id="2" name="Slide Image Placeholder 1"/>
+          <p:cNvSpPr>
+            <a:spLocks noGrp="1" noRot="1" noChangeAspect="1"/>
+          </p:cNvSpPr>
+          <p:nvPr>
+            <p:ph type="sldImg"/>
+          </p:nvPr>
+        </p:nvSpPr>
+        <p:spPr/>
+      </p:sp>
+      <p:sp>
+        <p:nvSpPr>
+          <p:cNvPr id="3" name="Notes Placeholder 2"/>
+          <p:cNvSpPr>
+            <a:spLocks noGrp="1"/>
+          </p:cNvSpPr>
+          <p:nvPr>
+            <p:ph type="body" idx="1"/>
+          </p:nvPr>
+        </p:nvSpPr>
+        <p:spPr/>
+        <p:txBody>
+          <a:bodyPr/>
+          <a:lstStyle/>
+          <a:p>
+            <a:r>
+              <a:rPr lang="en-US" dirty="0"/>
+              <a:t>4 parts of changing something: identify problem, generate ideas, decide among them, implement them (partially), verify them.</a:t>
+            </a:r>
+          </a:p>
+          <a:p>
+            <a:r>
+              <a:rPr lang="en-US" dirty="0"/>
+              <a:t>4 common orderings: governance, retro, stage magic, and experiment.</a:t>
+            </a:r>
+          </a:p>
+          <a:p>
+            <a:r>
+              <a:rPr lang="en-US" dirty="0"/>
+              <a:t>Governance and retro are similar, but governance does first 3 steps in different context from last 2. And both governance and retro often skip verify – leading to silent success &amp; failure.</a:t>
+            </a:r>
+          </a:p>
+        </p:txBody>
+      </p:sp>
+      <p:sp>
+        <p:nvSpPr>
+          <p:cNvPr id="4" name="Slide Number Placeholder 3"/>
+          <p:cNvSpPr>
+            <a:spLocks noGrp="1"/>
+          </p:cNvSpPr>
+          <p:nvPr>
+            <p:ph type="sldNum" sz="quarter" idx="5"/>
+          </p:nvPr>
+        </p:nvSpPr>
+        <p:spPr/>
+        <p:txBody>
+          <a:bodyPr/>
+          <a:lstStyle/>
+          <a:p>
+            <a:fld id="{2E396785-7325-4959-B34C-58C3AEDA50A1}" type="slidenum">
+              <a:rPr lang="en-US" smtClean="0"/>
+              <a:t>9</a:t>
+            </a:fld>
+            <a:endParaRPr lang="en-US"/>
+          </a:p>
+        </p:txBody>
+      </p:sp>
+    </p:spTree>
+    <p:extLst>
+      <p:ext uri="{BB962C8B-B14F-4D97-AF65-F5344CB8AC3E}">
+        <p14:creationId xmlns:p14="http://schemas.microsoft.com/office/powerpoint/2010/main" val="3169776868"/>
+      </p:ext>
+    </p:extLst>
+  </p:cSld>
+  <p:clrMapOvr>
+    <a:masterClrMapping/>
+  </p:clrMapOvr>
+</p:notes>
+</file>
+
+<file path=ppt/notesSlides/notesSlide9.xml><?xml version="1.0" encoding="utf-8"?>
+<p:notes xmlns:a="http://schemas.openxmlformats.org/drawingml/2006/main" xmlns:r="http://schemas.openxmlformats.org/officeDocument/2006/relationships" xmlns:p="http://schemas.openxmlformats.org/presentationml/2006/main">
+  <p:cSld>
+    <p:spTree>
+      <p:nvGrpSpPr>
+        <p:cNvPr id="1" name=""/>
+        <p:cNvGrpSpPr/>
+        <p:nvPr/>
+      </p:nvGrpSpPr>
+      <p:grpSpPr>
+        <a:xfrm>
+          <a:off x="0" y="0"/>
+          <a:ext cx="0" cy="0"/>
+          <a:chOff x="0" y="0"/>
+          <a:chExt cx="0" cy="0"/>
+        </a:xfrm>
+      </p:grpSpPr>
+      <p:sp>
+        <p:nvSpPr>
+          <p:cNvPr id="2" name="Slide Image Placeholder 1"/>
+          <p:cNvSpPr>
+            <a:spLocks noGrp="1" noRot="1" noChangeAspect="1"/>
+          </p:cNvSpPr>
+          <p:nvPr>
+            <p:ph type="sldImg"/>
+          </p:nvPr>
+        </p:nvSpPr>
+        <p:spPr/>
+      </p:sp>
+      <p:sp>
+        <p:nvSpPr>
+          <p:cNvPr id="3" name="Notes Placeholder 2"/>
+          <p:cNvSpPr>
+            <a:spLocks noGrp="1"/>
+          </p:cNvSpPr>
+          <p:nvPr>
+            <p:ph type="body" idx="1"/>
+          </p:nvPr>
+        </p:nvSpPr>
+        <p:spPr/>
+        <p:txBody>
+          <a:bodyPr/>
+          <a:lstStyle/>
+          <a:p>
+            <a:r>
+              <a:rPr lang="en-US" dirty="0"/>
+              <a:t>Scientific Method</a:t>
+            </a:r>
+          </a:p>
+          <a:p>
+            <a:r>
+              <a:rPr lang="en-US" dirty="0"/>
+              <a:t>Social experiments</a:t>
+            </a:r>
+          </a:p>
+          <a:p>
+            <a:r>
+              <a:rPr lang="en-US" dirty="0"/>
+              <a:t>Goal: maximize learning, not success. Even if it means intentionally doing the wrong thing – Wordle example.</a:t>
+            </a:r>
+          </a:p>
+          <a:p>
+            <a:r>
+              <a:rPr lang="en-US" dirty="0"/>
+              <a:t>Avoid obvious invalidity problems</a:t>
+            </a:r>
+          </a:p>
+          <a:p>
+            <a:pPr marL="171450" indent="-171450">
+              <a:buFont typeface="Arial" panose="020B0604020202020204" pitchFamily="34" charset="0"/>
+              <a:buChar char="•"/>
+            </a:pPr>
+            <a:r>
+              <a:rPr lang="en-US" dirty="0"/>
+              <a:t>Test multiple options, including the current state</a:t>
+            </a:r>
+          </a:p>
+          <a:p>
+            <a:pPr marL="171450" indent="-171450">
+              <a:buFont typeface="Arial" panose="020B0604020202020204" pitchFamily="34" charset="0"/>
+              <a:buChar char="•"/>
+            </a:pPr>
+            <a:r>
+              <a:rPr lang="en-US" dirty="0"/>
+              <a:t>Vary details within the practice</a:t>
+            </a:r>
+          </a:p>
+          <a:p>
+            <a:pPr marL="171450" indent="-171450">
+              <a:buFont typeface="Arial" panose="020B0604020202020204" pitchFamily="34" charset="0"/>
+              <a:buChar char="•"/>
+            </a:pPr>
+            <a:r>
+              <a:rPr lang="en-US" dirty="0"/>
+              <a:t>Use qualitative and quantitative measures</a:t>
+            </a:r>
+          </a:p>
+          <a:p>
+            <a:pPr marL="171450" indent="-171450">
+              <a:buFont typeface="Arial" panose="020B0604020202020204" pitchFamily="34" charset="0"/>
+              <a:buChar char="•"/>
+            </a:pPr>
+            <a:r>
+              <a:rPr lang="en-US" dirty="0"/>
+              <a:t>Measure one level up and out when possible</a:t>
+            </a:r>
+          </a:p>
+          <a:p>
+            <a:pPr marL="171450" indent="-171450">
+              <a:buFont typeface="Arial" panose="020B0604020202020204" pitchFamily="34" charset="0"/>
+              <a:buChar char="•"/>
+            </a:pPr>
+            <a:r>
+              <a:rPr lang="en-US" dirty="0"/>
+              <a:t>Measure invariants, to see if they do vary</a:t>
+            </a:r>
+          </a:p>
+          <a:p>
+            <a:pPr marL="171450" indent="-171450">
+              <a:buFont typeface="Arial" panose="020B0604020202020204" pitchFamily="34" charset="0"/>
+              <a:buChar char="•"/>
+            </a:pPr>
+            <a:r>
+              <a:rPr lang="en-US" dirty="0"/>
+              <a:t>Write down the results in real-time, not in a retro after</a:t>
+            </a:r>
+          </a:p>
+          <a:p>
+            <a:pPr marL="171450" indent="-171450">
+              <a:buFont typeface="Arial" panose="020B0604020202020204" pitchFamily="34" charset="0"/>
+              <a:buChar char="•"/>
+            </a:pPr>
+            <a:r>
+              <a:rPr lang="en-US" dirty="0"/>
+              <a:t>Don’t adopt anything; try everything</a:t>
+            </a:r>
+          </a:p>
+        </p:txBody>
+      </p:sp>
+      <p:sp>
+        <p:nvSpPr>
+          <p:cNvPr id="4" name="Slide Number Placeholder 3"/>
+          <p:cNvSpPr>
+            <a:spLocks noGrp="1"/>
+          </p:cNvSpPr>
+          <p:nvPr>
+            <p:ph type="sldNum" sz="quarter" idx="5"/>
+          </p:nvPr>
+        </p:nvSpPr>
+        <p:spPr/>
+        <p:txBody>
+          <a:bodyPr/>
+          <a:lstStyle/>
+          <a:p>
+            <a:fld id="{2E396785-7325-4959-B34C-58C3AEDA50A1}" type="slidenum">
+              <a:rPr lang="en-US" smtClean="0"/>
+              <a:t>10</a:t>
+            </a:fld>
+            <a:endParaRPr lang="en-US"/>
+          </a:p>
+        </p:txBody>
+      </p:sp>
+    </p:spTree>
+    <p:extLst>
+      <p:ext uri="{BB962C8B-B14F-4D97-AF65-F5344CB8AC3E}">
+        <p14:creationId xmlns:p14="http://schemas.microsoft.com/office/powerpoint/2010/main" val="1136876532"/>
       </p:ext>
     </p:extLst>
   </p:cSld>
@@ -3336,6 +4690,803 @@
 </p:sld>
 </file>
 
+<file path=ppt/slides/slide10.xml><?xml version="1.0" encoding="utf-8"?>
+<p:sld xmlns:a="http://schemas.openxmlformats.org/drawingml/2006/main" xmlns:r="http://schemas.openxmlformats.org/officeDocument/2006/relationships" xmlns:p="http://schemas.openxmlformats.org/presentationml/2006/main">
+  <p:cSld>
+    <p:spTree>
+      <p:nvGrpSpPr>
+        <p:cNvPr id="1" name=""/>
+        <p:cNvGrpSpPr/>
+        <p:nvPr/>
+      </p:nvGrpSpPr>
+      <p:grpSpPr>
+        <a:xfrm>
+          <a:off x="0" y="0"/>
+          <a:ext cx="0" cy="0"/>
+          <a:chOff x="0" y="0"/>
+          <a:chExt cx="0" cy="0"/>
+        </a:xfrm>
+      </p:grpSpPr>
+      <p:sp>
+        <p:nvSpPr>
+          <p:cNvPr id="2" name="Title 1">
+            <a:extLst>
+              <a:ext uri="{FF2B5EF4-FFF2-40B4-BE49-F238E27FC236}">
+                <a16:creationId xmlns:a16="http://schemas.microsoft.com/office/drawing/2014/main" id="{E66FDEC9-024F-6212-4D66-375FD1458F48}"/>
+              </a:ext>
+            </a:extLst>
+          </p:cNvPr>
+          <p:cNvSpPr>
+            <a:spLocks noGrp="1"/>
+          </p:cNvSpPr>
+          <p:nvPr>
+            <p:ph type="title"/>
+          </p:nvPr>
+        </p:nvSpPr>
+        <p:spPr/>
+        <p:txBody>
+          <a:bodyPr/>
+          <a:lstStyle/>
+          <a:p>
+            <a:r>
+              <a:rPr lang="en-US" dirty="0"/>
+              <a:t>Discovering</a:t>
+            </a:r>
+          </a:p>
+        </p:txBody>
+      </p:sp>
+      <p:sp>
+        <p:nvSpPr>
+          <p:cNvPr id="3" name="Content Placeholder 2">
+            <a:extLst>
+              <a:ext uri="{FF2B5EF4-FFF2-40B4-BE49-F238E27FC236}">
+                <a16:creationId xmlns:a16="http://schemas.microsoft.com/office/drawing/2014/main" id="{DE65B0D9-3553-0873-9064-905082CFEF76}"/>
+              </a:ext>
+            </a:extLst>
+          </p:cNvPr>
+          <p:cNvSpPr>
+            <a:spLocks noGrp="1"/>
+          </p:cNvSpPr>
+          <p:nvPr>
+            <p:ph idx="1"/>
+          </p:nvPr>
+        </p:nvSpPr>
+        <p:spPr/>
+        <p:txBody>
+          <a:bodyPr/>
+          <a:lstStyle/>
+          <a:p>
+            <a:endParaRPr lang="en-US"/>
+          </a:p>
+        </p:txBody>
+      </p:sp>
+    </p:spTree>
+    <p:extLst>
+      <p:ext uri="{BB962C8B-B14F-4D97-AF65-F5344CB8AC3E}">
+        <p14:creationId xmlns:p14="http://schemas.microsoft.com/office/powerpoint/2010/main" val="2690004034"/>
+      </p:ext>
+    </p:extLst>
+  </p:cSld>
+  <p:clrMapOvr>
+    <a:masterClrMapping/>
+  </p:clrMapOvr>
+</p:sld>
+</file>
+
+<file path=ppt/slides/slide11.xml><?xml version="1.0" encoding="utf-8"?>
+<p:sld xmlns:a="http://schemas.openxmlformats.org/drawingml/2006/main" xmlns:r="http://schemas.openxmlformats.org/officeDocument/2006/relationships" xmlns:p="http://schemas.openxmlformats.org/presentationml/2006/main">
+  <p:cSld>
+    <p:spTree>
+      <p:nvGrpSpPr>
+        <p:cNvPr id="1" name=""/>
+        <p:cNvGrpSpPr/>
+        <p:nvPr/>
+      </p:nvGrpSpPr>
+      <p:grpSpPr>
+        <a:xfrm>
+          <a:off x="0" y="0"/>
+          <a:ext cx="0" cy="0"/>
+          <a:chOff x="0" y="0"/>
+          <a:chExt cx="0" cy="0"/>
+        </a:xfrm>
+      </p:grpSpPr>
+      <p:sp>
+        <p:nvSpPr>
+          <p:cNvPr id="2" name="Title 1">
+            <a:extLst>
+              <a:ext uri="{FF2B5EF4-FFF2-40B4-BE49-F238E27FC236}">
+                <a16:creationId xmlns:a16="http://schemas.microsoft.com/office/drawing/2014/main" id="{026E08C8-8B95-0BDE-BA2D-EDDA96924B22}"/>
+              </a:ext>
+            </a:extLst>
+          </p:cNvPr>
+          <p:cNvSpPr>
+            <a:spLocks noGrp="1"/>
+          </p:cNvSpPr>
+          <p:nvPr>
+            <p:ph type="title"/>
+          </p:nvPr>
+        </p:nvSpPr>
+        <p:spPr/>
+        <p:txBody>
+          <a:bodyPr/>
+          <a:lstStyle/>
+          <a:p>
+            <a:r>
+              <a:rPr lang="en-US" dirty="0"/>
+              <a:t>Improving</a:t>
+            </a:r>
+          </a:p>
+        </p:txBody>
+      </p:sp>
+      <p:sp>
+        <p:nvSpPr>
+          <p:cNvPr id="3" name="Content Placeholder 2">
+            <a:extLst>
+              <a:ext uri="{FF2B5EF4-FFF2-40B4-BE49-F238E27FC236}">
+                <a16:creationId xmlns:a16="http://schemas.microsoft.com/office/drawing/2014/main" id="{30F458B9-3214-61F6-F55C-FBE49373D5A2}"/>
+              </a:ext>
+            </a:extLst>
+          </p:cNvPr>
+          <p:cNvSpPr>
+            <a:spLocks noGrp="1"/>
+          </p:cNvSpPr>
+          <p:nvPr>
+            <p:ph idx="1"/>
+          </p:nvPr>
+        </p:nvSpPr>
+        <p:spPr/>
+        <p:txBody>
+          <a:bodyPr/>
+          <a:lstStyle/>
+          <a:p>
+            <a:endParaRPr lang="en-US"/>
+          </a:p>
+        </p:txBody>
+      </p:sp>
+    </p:spTree>
+    <p:extLst>
+      <p:ext uri="{BB962C8B-B14F-4D97-AF65-F5344CB8AC3E}">
+        <p14:creationId xmlns:p14="http://schemas.microsoft.com/office/powerpoint/2010/main" val="1315325954"/>
+      </p:ext>
+    </p:extLst>
+  </p:cSld>
+  <p:clrMapOvr>
+    <a:masterClrMapping/>
+  </p:clrMapOvr>
+</p:sld>
+</file>
+
+<file path=ppt/slides/slide12.xml><?xml version="1.0" encoding="utf-8"?>
+<p:sld xmlns:a="http://schemas.openxmlformats.org/drawingml/2006/main" xmlns:r="http://schemas.openxmlformats.org/officeDocument/2006/relationships" xmlns:p="http://schemas.openxmlformats.org/presentationml/2006/main">
+  <p:cSld>
+    <p:spTree>
+      <p:nvGrpSpPr>
+        <p:cNvPr id="1" name=""/>
+        <p:cNvGrpSpPr/>
+        <p:nvPr/>
+      </p:nvGrpSpPr>
+      <p:grpSpPr>
+        <a:xfrm>
+          <a:off x="0" y="0"/>
+          <a:ext cx="0" cy="0"/>
+          <a:chOff x="0" y="0"/>
+          <a:chExt cx="0" cy="0"/>
+        </a:xfrm>
+      </p:grpSpPr>
+      <p:sp>
+        <p:nvSpPr>
+          <p:cNvPr id="2" name="Title 1">
+            <a:extLst>
+              <a:ext uri="{FF2B5EF4-FFF2-40B4-BE49-F238E27FC236}">
+                <a16:creationId xmlns:a16="http://schemas.microsoft.com/office/drawing/2014/main" id="{A08C284F-8E83-1FFC-600E-6A88764C3599}"/>
+              </a:ext>
+            </a:extLst>
+          </p:cNvPr>
+          <p:cNvSpPr>
+            <a:spLocks noGrp="1"/>
+          </p:cNvSpPr>
+          <p:nvPr>
+            <p:ph type="title"/>
+          </p:nvPr>
+        </p:nvSpPr>
+        <p:spPr/>
+        <p:txBody>
+          <a:bodyPr/>
+          <a:lstStyle/>
+          <a:p>
+            <a:r>
+              <a:rPr lang="en-US" dirty="0"/>
+              <a:t>Structure: overview</a:t>
+            </a:r>
+          </a:p>
+        </p:txBody>
+      </p:sp>
+      <p:sp>
+        <p:nvSpPr>
+          <p:cNvPr id="3" name="Content Placeholder 2">
+            <a:extLst>
+              <a:ext uri="{FF2B5EF4-FFF2-40B4-BE49-F238E27FC236}">
+                <a16:creationId xmlns:a16="http://schemas.microsoft.com/office/drawing/2014/main" id="{5A7E2A3B-6C6F-E699-3514-508DC738D209}"/>
+              </a:ext>
+            </a:extLst>
+          </p:cNvPr>
+          <p:cNvSpPr>
+            <a:spLocks noGrp="1"/>
+          </p:cNvSpPr>
+          <p:nvPr>
+            <p:ph idx="1"/>
+          </p:nvPr>
+        </p:nvSpPr>
+        <p:spPr/>
+        <p:txBody>
+          <a:bodyPr/>
+          <a:lstStyle/>
+          <a:p>
+            <a:endParaRPr lang="en-US"/>
+          </a:p>
+        </p:txBody>
+      </p:sp>
+    </p:spTree>
+    <p:extLst>
+      <p:ext uri="{BB962C8B-B14F-4D97-AF65-F5344CB8AC3E}">
+        <p14:creationId xmlns:p14="http://schemas.microsoft.com/office/powerpoint/2010/main" val="1571871775"/>
+      </p:ext>
+    </p:extLst>
+  </p:cSld>
+  <p:clrMapOvr>
+    <a:masterClrMapping/>
+  </p:clrMapOvr>
+</p:sld>
+</file>
+
+<file path=ppt/slides/slide13.xml><?xml version="1.0" encoding="utf-8"?>
+<p:sld xmlns:a="http://schemas.openxmlformats.org/drawingml/2006/main" xmlns:r="http://schemas.openxmlformats.org/officeDocument/2006/relationships" xmlns:p="http://schemas.openxmlformats.org/presentationml/2006/main">
+  <p:cSld>
+    <p:spTree>
+      <p:nvGrpSpPr>
+        <p:cNvPr id="1" name=""/>
+        <p:cNvGrpSpPr/>
+        <p:nvPr/>
+      </p:nvGrpSpPr>
+      <p:grpSpPr>
+        <a:xfrm>
+          <a:off x="0" y="0"/>
+          <a:ext cx="0" cy="0"/>
+          <a:chOff x="0" y="0"/>
+          <a:chExt cx="0" cy="0"/>
+        </a:xfrm>
+      </p:grpSpPr>
+      <p:sp>
+        <p:nvSpPr>
+          <p:cNvPr id="2" name="Title 1">
+            <a:extLst>
+              <a:ext uri="{FF2B5EF4-FFF2-40B4-BE49-F238E27FC236}">
+                <a16:creationId xmlns:a16="http://schemas.microsoft.com/office/drawing/2014/main" id="{3C7AF96F-753D-CBFB-A2E8-E9890411F0C8}"/>
+              </a:ext>
+            </a:extLst>
+          </p:cNvPr>
+          <p:cNvSpPr>
+            <a:spLocks noGrp="1"/>
+          </p:cNvSpPr>
+          <p:nvPr>
+            <p:ph type="title"/>
+          </p:nvPr>
+        </p:nvSpPr>
+        <p:spPr/>
+        <p:txBody>
+          <a:bodyPr/>
+          <a:lstStyle/>
+          <a:p>
+            <a:r>
+              <a:rPr lang="en-US" dirty="0"/>
+              <a:t>Discovery – how-to</a:t>
+            </a:r>
+          </a:p>
+        </p:txBody>
+      </p:sp>
+      <p:sp>
+        <p:nvSpPr>
+          <p:cNvPr id="3" name="Content Placeholder 2">
+            <a:extLst>
+              <a:ext uri="{FF2B5EF4-FFF2-40B4-BE49-F238E27FC236}">
+                <a16:creationId xmlns:a16="http://schemas.microsoft.com/office/drawing/2014/main" id="{F2D78617-A0C6-D616-97BF-07B84D07CFE1}"/>
+              </a:ext>
+            </a:extLst>
+          </p:cNvPr>
+          <p:cNvSpPr>
+            <a:spLocks noGrp="1"/>
+          </p:cNvSpPr>
+          <p:nvPr>
+            <p:ph idx="1"/>
+          </p:nvPr>
+        </p:nvSpPr>
+        <p:spPr/>
+        <p:txBody>
+          <a:bodyPr/>
+          <a:lstStyle/>
+          <a:p>
+            <a:endParaRPr lang="en-US"/>
+          </a:p>
+        </p:txBody>
+      </p:sp>
+    </p:spTree>
+    <p:extLst>
+      <p:ext uri="{BB962C8B-B14F-4D97-AF65-F5344CB8AC3E}">
+        <p14:creationId xmlns:p14="http://schemas.microsoft.com/office/powerpoint/2010/main" val="2811714190"/>
+      </p:ext>
+    </p:extLst>
+  </p:cSld>
+  <p:clrMapOvr>
+    <a:masterClrMapping/>
+  </p:clrMapOvr>
+</p:sld>
+</file>
+
+<file path=ppt/slides/slide14.xml><?xml version="1.0" encoding="utf-8"?>
+<p:sld xmlns:a="http://schemas.openxmlformats.org/drawingml/2006/main" xmlns:r="http://schemas.openxmlformats.org/officeDocument/2006/relationships" xmlns:p="http://schemas.openxmlformats.org/presentationml/2006/main">
+  <p:cSld>
+    <p:spTree>
+      <p:nvGrpSpPr>
+        <p:cNvPr id="1" name=""/>
+        <p:cNvGrpSpPr/>
+        <p:nvPr/>
+      </p:nvGrpSpPr>
+      <p:grpSpPr>
+        <a:xfrm>
+          <a:off x="0" y="0"/>
+          <a:ext cx="0" cy="0"/>
+          <a:chOff x="0" y="0"/>
+          <a:chExt cx="0" cy="0"/>
+        </a:xfrm>
+      </p:grpSpPr>
+      <p:sp>
+        <p:nvSpPr>
+          <p:cNvPr id="2" name="Title 1">
+            <a:extLst>
+              <a:ext uri="{FF2B5EF4-FFF2-40B4-BE49-F238E27FC236}">
+                <a16:creationId xmlns:a16="http://schemas.microsoft.com/office/drawing/2014/main" id="{77C8A617-1C2E-68FB-4C49-7538F0B53927}"/>
+              </a:ext>
+            </a:extLst>
+          </p:cNvPr>
+          <p:cNvSpPr>
+            <a:spLocks noGrp="1"/>
+          </p:cNvSpPr>
+          <p:nvPr>
+            <p:ph type="title"/>
+          </p:nvPr>
+        </p:nvSpPr>
+        <p:spPr/>
+        <p:txBody>
+          <a:bodyPr/>
+          <a:lstStyle/>
+          <a:p>
+            <a:r>
+              <a:rPr lang="en-US" dirty="0"/>
+              <a:t>Improvement – how-to</a:t>
+            </a:r>
+          </a:p>
+        </p:txBody>
+      </p:sp>
+      <p:sp>
+        <p:nvSpPr>
+          <p:cNvPr id="3" name="Content Placeholder 2">
+            <a:extLst>
+              <a:ext uri="{FF2B5EF4-FFF2-40B4-BE49-F238E27FC236}">
+                <a16:creationId xmlns:a16="http://schemas.microsoft.com/office/drawing/2014/main" id="{BFEEF9B7-7A3B-968D-BF69-7498A8D0AC2E}"/>
+              </a:ext>
+            </a:extLst>
+          </p:cNvPr>
+          <p:cNvSpPr>
+            <a:spLocks noGrp="1"/>
+          </p:cNvSpPr>
+          <p:nvPr>
+            <p:ph idx="1"/>
+          </p:nvPr>
+        </p:nvSpPr>
+        <p:spPr/>
+        <p:txBody>
+          <a:bodyPr/>
+          <a:lstStyle/>
+          <a:p>
+            <a:r>
+              <a:rPr lang="en-US" dirty="0"/>
+              <a:t>Focus on habits &amp; fluency</a:t>
+            </a:r>
+          </a:p>
+          <a:p>
+            <a:r>
+              <a:rPr lang="en-US" dirty="0"/>
+              <a:t>Start by getting to consistency</a:t>
+            </a:r>
+          </a:p>
+          <a:p>
+            <a:r>
+              <a:rPr lang="en-US" dirty="0"/>
+              <a:t>Then refine the habit</a:t>
+            </a:r>
+          </a:p>
+        </p:txBody>
+      </p:sp>
+    </p:spTree>
+    <p:extLst>
+      <p:ext uri="{BB962C8B-B14F-4D97-AF65-F5344CB8AC3E}">
+        <p14:creationId xmlns:p14="http://schemas.microsoft.com/office/powerpoint/2010/main" val="4125958910"/>
+      </p:ext>
+    </p:extLst>
+  </p:cSld>
+  <p:clrMapOvr>
+    <a:masterClrMapping/>
+  </p:clrMapOvr>
+</p:sld>
+</file>
+
+<file path=ppt/slides/slide15.xml><?xml version="1.0" encoding="utf-8"?>
+<p:sld xmlns:a="http://schemas.openxmlformats.org/drawingml/2006/main" xmlns:r="http://schemas.openxmlformats.org/officeDocument/2006/relationships" xmlns:p="http://schemas.openxmlformats.org/presentationml/2006/main">
+  <p:cSld>
+    <p:spTree>
+      <p:nvGrpSpPr>
+        <p:cNvPr id="1" name=""/>
+        <p:cNvGrpSpPr/>
+        <p:nvPr/>
+      </p:nvGrpSpPr>
+      <p:grpSpPr>
+        <a:xfrm>
+          <a:off x="0" y="0"/>
+          <a:ext cx="0" cy="0"/>
+          <a:chOff x="0" y="0"/>
+          <a:chExt cx="0" cy="0"/>
+        </a:xfrm>
+      </p:grpSpPr>
+      <p:sp>
+        <p:nvSpPr>
+          <p:cNvPr id="2" name="Title 1">
+            <a:extLst>
+              <a:ext uri="{FF2B5EF4-FFF2-40B4-BE49-F238E27FC236}">
+                <a16:creationId xmlns:a16="http://schemas.microsoft.com/office/drawing/2014/main" id="{9F201C76-E7A8-D58E-C3C7-15CBAD5FAC34}"/>
+              </a:ext>
+            </a:extLst>
+          </p:cNvPr>
+          <p:cNvSpPr>
+            <a:spLocks noGrp="1"/>
+          </p:cNvSpPr>
+          <p:nvPr>
+            <p:ph type="title"/>
+          </p:nvPr>
+        </p:nvSpPr>
+        <p:spPr/>
+        <p:txBody>
+          <a:bodyPr/>
+          <a:lstStyle/>
+          <a:p>
+            <a:r>
+              <a:rPr lang="en-US" dirty="0"/>
+              <a:t>Week structure</a:t>
+            </a:r>
+          </a:p>
+        </p:txBody>
+      </p:sp>
+      <p:sp>
+        <p:nvSpPr>
+          <p:cNvPr id="3" name="Content Placeholder 2">
+            <a:extLst>
+              <a:ext uri="{FF2B5EF4-FFF2-40B4-BE49-F238E27FC236}">
+                <a16:creationId xmlns:a16="http://schemas.microsoft.com/office/drawing/2014/main" id="{39130E3B-2AFE-B589-182D-A44AC9DA4649}"/>
+              </a:ext>
+            </a:extLst>
+          </p:cNvPr>
+          <p:cNvSpPr>
+            <a:spLocks noGrp="1"/>
+          </p:cNvSpPr>
+          <p:nvPr>
+            <p:ph idx="1"/>
+          </p:nvPr>
+        </p:nvSpPr>
+        <p:spPr/>
+        <p:txBody>
+          <a:bodyPr/>
+          <a:lstStyle/>
+          <a:p>
+            <a:r>
+              <a:rPr lang="en-US" dirty="0"/>
+              <a:t>Retro (planning portion): longs &amp; shorts</a:t>
+            </a:r>
+          </a:p>
+          <a:p>
+            <a:r>
+              <a:rPr lang="en-US" dirty="0"/>
+              <a:t>Discover 1 thing + Improve 0-1, or</a:t>
+            </a:r>
+          </a:p>
+          <a:p>
+            <a:r>
+              <a:rPr lang="en-US" dirty="0"/>
+              <a:t>Discover 0 things + Improve 1-3</a:t>
+            </a:r>
+          </a:p>
+          <a:p>
+            <a:r>
+              <a:rPr lang="en-US" dirty="0"/>
+              <a:t>Retro (demo portion) analyze results, make decisions</a:t>
+            </a:r>
+          </a:p>
+          <a:p>
+            <a:endParaRPr lang="en-US" dirty="0"/>
+          </a:p>
+          <a:p>
+            <a:r>
+              <a:rPr lang="en-US" dirty="0"/>
+              <a:t>Note: this means your improvement week starts/ends about 10 min into your retro meeting!</a:t>
+            </a:r>
+          </a:p>
+        </p:txBody>
+      </p:sp>
+    </p:spTree>
+    <p:extLst>
+      <p:ext uri="{BB962C8B-B14F-4D97-AF65-F5344CB8AC3E}">
+        <p14:creationId xmlns:p14="http://schemas.microsoft.com/office/powerpoint/2010/main" val="1956938991"/>
+      </p:ext>
+    </p:extLst>
+  </p:cSld>
+  <p:clrMapOvr>
+    <a:masterClrMapping/>
+  </p:clrMapOvr>
+</p:sld>
+</file>
+
+<file path=ppt/slides/slide16.xml><?xml version="1.0" encoding="utf-8"?>
+<p:sld xmlns:a="http://schemas.openxmlformats.org/drawingml/2006/main" xmlns:r="http://schemas.openxmlformats.org/officeDocument/2006/relationships" xmlns:p="http://schemas.openxmlformats.org/presentationml/2006/main">
+  <p:cSld>
+    <p:spTree>
+      <p:nvGrpSpPr>
+        <p:cNvPr id="1" name=""/>
+        <p:cNvGrpSpPr/>
+        <p:nvPr/>
+      </p:nvGrpSpPr>
+      <p:grpSpPr>
+        <a:xfrm>
+          <a:off x="0" y="0"/>
+          <a:ext cx="0" cy="0"/>
+          <a:chOff x="0" y="0"/>
+          <a:chExt cx="0" cy="0"/>
+        </a:xfrm>
+      </p:grpSpPr>
+      <p:sp>
+        <p:nvSpPr>
+          <p:cNvPr id="2" name="Title 1">
+            <a:extLst>
+              <a:ext uri="{FF2B5EF4-FFF2-40B4-BE49-F238E27FC236}">
+                <a16:creationId xmlns:a16="http://schemas.microsoft.com/office/drawing/2014/main" id="{337547C3-A153-778D-BE32-B8F90668A1A8}"/>
+              </a:ext>
+            </a:extLst>
+          </p:cNvPr>
+          <p:cNvSpPr>
+            <a:spLocks noGrp="1"/>
+          </p:cNvSpPr>
+          <p:nvPr>
+            <p:ph type="title"/>
+          </p:nvPr>
+        </p:nvSpPr>
+        <p:spPr/>
+        <p:txBody>
+          <a:bodyPr/>
+          <a:lstStyle/>
+          <a:p>
+            <a:r>
+              <a:rPr lang="en-US" dirty="0"/>
+              <a:t>Your Collaboration Style</a:t>
+            </a:r>
+          </a:p>
+        </p:txBody>
+      </p:sp>
+      <p:sp>
+        <p:nvSpPr>
+          <p:cNvPr id="3" name="Content Placeholder 2">
+            <a:extLst>
+              <a:ext uri="{FF2B5EF4-FFF2-40B4-BE49-F238E27FC236}">
+                <a16:creationId xmlns:a16="http://schemas.microsoft.com/office/drawing/2014/main" id="{343FC8CF-C9F8-C55F-E0FA-74260E322EB2}"/>
+              </a:ext>
+            </a:extLst>
+          </p:cNvPr>
+          <p:cNvSpPr>
+            <a:spLocks noGrp="1"/>
+          </p:cNvSpPr>
+          <p:nvPr>
+            <p:ph idx="1"/>
+          </p:nvPr>
+        </p:nvSpPr>
+        <p:spPr/>
+        <p:txBody>
+          <a:bodyPr/>
+          <a:lstStyle/>
+          <a:p>
+            <a:endParaRPr lang="en-US"/>
+          </a:p>
+        </p:txBody>
+      </p:sp>
+    </p:spTree>
+    <p:extLst>
+      <p:ext uri="{BB962C8B-B14F-4D97-AF65-F5344CB8AC3E}">
+        <p14:creationId xmlns:p14="http://schemas.microsoft.com/office/powerpoint/2010/main" val="1384430317"/>
+      </p:ext>
+    </p:extLst>
+  </p:cSld>
+  <p:clrMapOvr>
+    <a:masterClrMapping/>
+  </p:clrMapOvr>
+</p:sld>
+</file>
+
+<file path=ppt/slides/slide17.xml><?xml version="1.0" encoding="utf-8"?>
+<p:sld xmlns:a="http://schemas.openxmlformats.org/drawingml/2006/main" xmlns:r="http://schemas.openxmlformats.org/officeDocument/2006/relationships" xmlns:p="http://schemas.openxmlformats.org/presentationml/2006/main">
+  <p:cSld>
+    <p:spTree>
+      <p:nvGrpSpPr>
+        <p:cNvPr id="1" name=""/>
+        <p:cNvGrpSpPr/>
+        <p:nvPr/>
+      </p:nvGrpSpPr>
+      <p:grpSpPr>
+        <a:xfrm>
+          <a:off x="0" y="0"/>
+          <a:ext cx="0" cy="0"/>
+          <a:chOff x="0" y="0"/>
+          <a:chExt cx="0" cy="0"/>
+        </a:xfrm>
+      </p:grpSpPr>
+      <p:sp>
+        <p:nvSpPr>
+          <p:cNvPr id="2" name="Title 1">
+            <a:extLst>
+              <a:ext uri="{FF2B5EF4-FFF2-40B4-BE49-F238E27FC236}">
+                <a16:creationId xmlns:a16="http://schemas.microsoft.com/office/drawing/2014/main" id="{71CA4DAE-8F1F-10EB-FEF0-7F132A28860E}"/>
+              </a:ext>
+            </a:extLst>
+          </p:cNvPr>
+          <p:cNvSpPr>
+            <a:spLocks noGrp="1"/>
+          </p:cNvSpPr>
+          <p:nvPr>
+            <p:ph type="title"/>
+          </p:nvPr>
+        </p:nvSpPr>
+        <p:spPr/>
+        <p:txBody>
+          <a:bodyPr>
+            <a:normAutofit/>
+          </a:bodyPr>
+          <a:lstStyle/>
+          <a:p>
+            <a:r>
+              <a:rPr lang="en-US" dirty="0"/>
+              <a:t>First Next Step: Swap your Retro</a:t>
+            </a:r>
+          </a:p>
+        </p:txBody>
+      </p:sp>
+      <p:sp>
+        <p:nvSpPr>
+          <p:cNvPr id="3" name="Content Placeholder 2">
+            <a:extLst>
+              <a:ext uri="{FF2B5EF4-FFF2-40B4-BE49-F238E27FC236}">
+                <a16:creationId xmlns:a16="http://schemas.microsoft.com/office/drawing/2014/main" id="{FCD0505E-6A36-CBC3-30DB-1ED5D15BFE62}"/>
+              </a:ext>
+            </a:extLst>
+          </p:cNvPr>
+          <p:cNvSpPr>
+            <a:spLocks noGrp="1"/>
+          </p:cNvSpPr>
+          <p:nvPr>
+            <p:ph idx="1"/>
+          </p:nvPr>
+        </p:nvSpPr>
+        <p:spPr/>
+        <p:txBody>
+          <a:bodyPr/>
+          <a:lstStyle/>
+          <a:p>
+            <a:endParaRPr lang="en-US"/>
+          </a:p>
+        </p:txBody>
+      </p:sp>
+    </p:spTree>
+    <p:extLst>
+      <p:ext uri="{BB962C8B-B14F-4D97-AF65-F5344CB8AC3E}">
+        <p14:creationId xmlns:p14="http://schemas.microsoft.com/office/powerpoint/2010/main" val="672966753"/>
+      </p:ext>
+    </p:extLst>
+  </p:cSld>
+  <p:clrMapOvr>
+    <a:masterClrMapping/>
+  </p:clrMapOvr>
+</p:sld>
+</file>
+
+<file path=ppt/slides/slide18.xml><?xml version="1.0" encoding="utf-8"?>
+<p:sld xmlns:a="http://schemas.openxmlformats.org/drawingml/2006/main" xmlns:r="http://schemas.openxmlformats.org/officeDocument/2006/relationships" xmlns:p="http://schemas.openxmlformats.org/presentationml/2006/main">
+  <p:cSld>
+    <p:spTree>
+      <p:nvGrpSpPr>
+        <p:cNvPr id="1" name=""/>
+        <p:cNvGrpSpPr/>
+        <p:nvPr/>
+      </p:nvGrpSpPr>
+      <p:grpSpPr>
+        <a:xfrm>
+          <a:off x="0" y="0"/>
+          <a:ext cx="0" cy="0"/>
+          <a:chOff x="0" y="0"/>
+          <a:chExt cx="0" cy="0"/>
+        </a:xfrm>
+      </p:grpSpPr>
+      <p:sp>
+        <p:nvSpPr>
+          <p:cNvPr id="2" name="Title 1">
+            <a:extLst>
+              <a:ext uri="{FF2B5EF4-FFF2-40B4-BE49-F238E27FC236}">
+                <a16:creationId xmlns:a16="http://schemas.microsoft.com/office/drawing/2014/main" id="{0CCB2085-43F4-8573-398A-7B670AF76D43}"/>
+              </a:ext>
+            </a:extLst>
+          </p:cNvPr>
+          <p:cNvSpPr>
+            <a:spLocks noGrp="1"/>
+          </p:cNvSpPr>
+          <p:nvPr>
+            <p:ph type="title"/>
+          </p:nvPr>
+        </p:nvSpPr>
+        <p:spPr/>
+        <p:txBody>
+          <a:bodyPr/>
+          <a:lstStyle/>
+          <a:p>
+            <a:r>
+              <a:rPr lang="en-US" dirty="0"/>
+              <a:t>Ask me Anything / Resources</a:t>
+            </a:r>
+          </a:p>
+        </p:txBody>
+      </p:sp>
+      <p:sp>
+        <p:nvSpPr>
+          <p:cNvPr id="3" name="Content Placeholder 2">
+            <a:extLst>
+              <a:ext uri="{FF2B5EF4-FFF2-40B4-BE49-F238E27FC236}">
+                <a16:creationId xmlns:a16="http://schemas.microsoft.com/office/drawing/2014/main" id="{746B55EF-4D2A-2F22-DDE7-390086895E65}"/>
+              </a:ext>
+            </a:extLst>
+          </p:cNvPr>
+          <p:cNvSpPr>
+            <a:spLocks noGrp="1"/>
+          </p:cNvSpPr>
+          <p:nvPr>
+            <p:ph idx="1"/>
+          </p:nvPr>
+        </p:nvSpPr>
+        <p:spPr/>
+        <p:txBody>
+          <a:bodyPr/>
+          <a:lstStyle/>
+          <a:p>
+            <a:r>
+              <a:rPr lang="en-US" dirty="0"/>
+              <a:t>QR code</a:t>
+            </a:r>
+          </a:p>
+        </p:txBody>
+      </p:sp>
+    </p:spTree>
+    <p:extLst>
+      <p:ext uri="{BB962C8B-B14F-4D97-AF65-F5344CB8AC3E}">
+        <p14:creationId xmlns:p14="http://schemas.microsoft.com/office/powerpoint/2010/main" val="3303992412"/>
+      </p:ext>
+    </p:extLst>
+  </p:cSld>
+  <p:clrMapOvr>
+    <a:masterClrMapping/>
+  </p:clrMapOvr>
+</p:sld>
+</file>
+
 <file path=ppt/slides/slide2.xml><?xml version="1.0" encoding="utf-8"?>
 <p:sld xmlns:a="http://schemas.openxmlformats.org/drawingml/2006/main" xmlns:r="http://schemas.openxmlformats.org/officeDocument/2006/relationships" xmlns:p="http://schemas.openxmlformats.org/presentationml/2006/main">
   <p:cSld>
@@ -3358,7 +5509,7 @@
           <p:cNvPr id="2" name="Title 1">
             <a:extLst>
               <a:ext uri="{FF2B5EF4-FFF2-40B4-BE49-F238E27FC236}">
-                <a16:creationId xmlns:a16="http://schemas.microsoft.com/office/drawing/2014/main" id="{CFD2036F-0C35-E907-24E5-B7525A7BB308}"/>
+                <a16:creationId xmlns:a16="http://schemas.microsoft.com/office/drawing/2014/main" id="{EBE9E6D3-61EB-7A28-2129-DEE8B5EDFBEE}"/>
               </a:ext>
             </a:extLst>
           </p:cNvPr>
@@ -3374,10 +5525,7 @@
           <a:bodyPr/>
           <a:lstStyle/>
           <a:p>
-            <a:r>
-              <a:rPr lang="en-US" dirty="0"/>
-              <a:t>Talk Structure</a:t>
-            </a:r>
+            <a:endParaRPr lang="en-US"/>
           </a:p>
         </p:txBody>
       </p:sp>
@@ -3386,7 +5534,7 @@
           <p:cNvPr id="3" name="Content Placeholder 2">
             <a:extLst>
               <a:ext uri="{FF2B5EF4-FFF2-40B4-BE49-F238E27FC236}">
-                <a16:creationId xmlns:a16="http://schemas.microsoft.com/office/drawing/2014/main" id="{64F6C5C0-4321-B1DB-3600-D978999D86C6}"/>
+                <a16:creationId xmlns:a16="http://schemas.microsoft.com/office/drawing/2014/main" id="{5EE111E0-D1BE-5C18-7BB8-29E9C671F396}"/>
               </a:ext>
             </a:extLst>
           </p:cNvPr>
@@ -3399,86 +5547,48 @@
         </p:nvSpPr>
         <p:spPr/>
         <p:txBody>
-          <a:bodyPr>
-            <a:normAutofit fontScale="92500" lnSpcReduction="20000"/>
-          </a:bodyPr>
-          <a:lstStyle/>
-          <a:p>
-            <a:r>
-              <a:rPr lang="en-US" dirty="0"/>
-              <a:t>Sharp – tell story of egg timer. Ask: why would we choose to do the painful thing? Does mobbing obsolete this?</a:t>
-            </a:r>
-          </a:p>
-          <a:p>
-            <a:r>
-              <a:rPr lang="en-US" dirty="0" err="1"/>
-              <a:t>PoV</a:t>
-            </a:r>
-            <a:r>
-              <a:rPr lang="en-US" dirty="0"/>
-              <a:t> – Many ways to collaborate, but make sure you choose one that meets your goals – your intuition and comfort may be wrong</a:t>
-            </a:r>
-          </a:p>
-          <a:p>
-            <a:r>
-              <a:rPr lang="en-US" dirty="0"/>
-              <a:t>Desired Shift – Start using data and lightweight experiments in your continuous improvement process (replaces traditional retro)</a:t>
-            </a:r>
-          </a:p>
-          <a:p>
-            <a:r>
-              <a:rPr lang="en-US" dirty="0"/>
-              <a:t>Points 1-3</a:t>
+          <a:bodyPr/>
+          <a:lstStyle/>
+          <a:p>
+            <a:r>
+              <a:rPr lang="en-US" dirty="0"/>
+              <a:t>This will become multiple slides:</a:t>
             </a:r>
           </a:p>
           <a:p>
             <a:pPr lvl="1"/>
             <a:r>
               <a:rPr lang="en-US" dirty="0"/>
-              <a:t>Pairing – swap time and style data</a:t>
+              <a:t>Egg timer</a:t>
             </a:r>
           </a:p>
           <a:p>
             <a:pPr lvl="1"/>
             <a:r>
               <a:rPr lang="en-US" dirty="0"/>
-              <a:t>Mobbing – doesn’t obsolete promiscuous pairing, but use data to make choices</a:t>
+              <a:t>XP white book</a:t>
             </a:r>
           </a:p>
           <a:p>
             <a:pPr lvl="1"/>
             <a:r>
               <a:rPr lang="en-US" dirty="0"/>
-              <a:t>Social experiments – a structure to adopt</a:t>
-            </a:r>
-          </a:p>
-          <a:p>
-            <a:r>
-              <a:rPr lang="en-US" dirty="0" err="1"/>
-              <a:t>PoV</a:t>
-            </a:r>
-            <a:r>
-              <a:rPr lang="en-US" dirty="0"/>
-              <a:t> – Make intentional choices about your practices. Start gathering data, not just intuition / opinion.</a:t>
-            </a:r>
-          </a:p>
-          <a:p>
-            <a:r>
-              <a:rPr lang="en-US" dirty="0"/>
-              <a:t>First next step – Replace your retro with an experiment </a:t>
-            </a:r>
-            <a:r>
-              <a:rPr lang="en-US"/>
-              <a:t>process.</a:t>
-            </a:r>
-            <a:endParaRPr lang="en-US" dirty="0"/>
+              <a:t>Our results</a:t>
+            </a:r>
+          </a:p>
+          <a:p>
+            <a:pPr lvl="1"/>
+            <a:r>
+              <a:rPr lang="en-US" dirty="0"/>
+              <a:t>Our results + egg timer</a:t>
+            </a:r>
           </a:p>
         </p:txBody>
       </p:sp>
     </p:spTree>
     <p:extLst>
       <p:ext uri="{BB962C8B-B14F-4D97-AF65-F5344CB8AC3E}">
-        <p14:creationId xmlns:p14="http://schemas.microsoft.com/office/powerpoint/2010/main" val="2029249811"/>
+        <p14:creationId xmlns:p14="http://schemas.microsoft.com/office/powerpoint/2010/main" val="907666451"/>
       </p:ext>
     </p:extLst>
   </p:cSld>
@@ -3510,7 +5620,7 @@
           <p:cNvPr id="2" name="Title 1">
             <a:extLst>
               <a:ext uri="{FF2B5EF4-FFF2-40B4-BE49-F238E27FC236}">
-                <a16:creationId xmlns:a16="http://schemas.microsoft.com/office/drawing/2014/main" id="{37B996A8-324B-4155-990B-F843E2A78828}"/>
+                <a16:creationId xmlns:a16="http://schemas.microsoft.com/office/drawing/2014/main" id="{C7A19533-9BCE-DDF6-5FCC-CAF4C2054439}"/>
               </a:ext>
             </a:extLst>
           </p:cNvPr>
@@ -3528,7 +5638,7 @@
           <a:p>
             <a:r>
               <a:rPr lang="en-US" dirty="0"/>
-              <a:t>What is Promiscuous Pairing?</a:t>
+              <a:t>Choose How to Collaborate</a:t>
             </a:r>
           </a:p>
         </p:txBody>
@@ -3538,7 +5648,7 @@
           <p:cNvPr id="3" name="Content Placeholder 2">
             <a:extLst>
               <a:ext uri="{FF2B5EF4-FFF2-40B4-BE49-F238E27FC236}">
-                <a16:creationId xmlns:a16="http://schemas.microsoft.com/office/drawing/2014/main" id="{E6B9802D-7580-4777-794B-113CD2A7839A}"/>
+                <a16:creationId xmlns:a16="http://schemas.microsoft.com/office/drawing/2014/main" id="{8B16E928-6B09-F8A0-D5F4-74CDAC89405A}"/>
               </a:ext>
             </a:extLst>
           </p:cNvPr>
@@ -3561,7 +5671,7 @@
     </p:spTree>
     <p:extLst>
       <p:ext uri="{BB962C8B-B14F-4D97-AF65-F5344CB8AC3E}">
-        <p14:creationId xmlns:p14="http://schemas.microsoft.com/office/powerpoint/2010/main" val="3357544226"/>
+        <p14:creationId xmlns:p14="http://schemas.microsoft.com/office/powerpoint/2010/main" val="972508822"/>
       </p:ext>
     </p:extLst>
   </p:cSld>
@@ -3593,6 +5703,264 @@
           <p:cNvPr id="2" name="Title 1">
             <a:extLst>
               <a:ext uri="{FF2B5EF4-FFF2-40B4-BE49-F238E27FC236}">
+                <a16:creationId xmlns:a16="http://schemas.microsoft.com/office/drawing/2014/main" id="{04AEDA35-7173-AB53-F552-515CDF02E2C0}"/>
+              </a:ext>
+            </a:extLst>
+          </p:cNvPr>
+          <p:cNvSpPr>
+            <a:spLocks noGrp="1"/>
+          </p:cNvSpPr>
+          <p:nvPr>
+            <p:ph type="title"/>
+          </p:nvPr>
+        </p:nvSpPr>
+        <p:spPr/>
+        <p:txBody>
+          <a:bodyPr/>
+          <a:lstStyle/>
+          <a:p>
+            <a:r>
+              <a:rPr lang="en-US" dirty="0"/>
+              <a:t>Recommendation</a:t>
+            </a:r>
+          </a:p>
+        </p:txBody>
+      </p:sp>
+      <p:sp>
+        <p:nvSpPr>
+          <p:cNvPr id="3" name="Content Placeholder 2">
+            <a:extLst>
+              <a:ext uri="{FF2B5EF4-FFF2-40B4-BE49-F238E27FC236}">
+                <a16:creationId xmlns:a16="http://schemas.microsoft.com/office/drawing/2014/main" id="{7451BDDA-FCBD-A1DE-D366-8A2B8A3FF1FF}"/>
+              </a:ext>
+            </a:extLst>
+          </p:cNvPr>
+          <p:cNvSpPr>
+            <a:spLocks noGrp="1"/>
+          </p:cNvSpPr>
+          <p:nvPr>
+            <p:ph idx="1"/>
+          </p:nvPr>
+        </p:nvSpPr>
+        <p:spPr/>
+        <p:txBody>
+          <a:bodyPr/>
+          <a:lstStyle/>
+          <a:p>
+            <a:r>
+              <a:rPr lang="en-US" dirty="0"/>
+              <a:t>Start off with pairing slide</a:t>
+            </a:r>
+          </a:p>
+          <a:p>
+            <a:r>
+              <a:rPr lang="en-US" dirty="0"/>
+              <a:t>Switch to experiment / engineering method slide</a:t>
+            </a:r>
+          </a:p>
+        </p:txBody>
+      </p:sp>
+    </p:spTree>
+    <p:extLst>
+      <p:ext uri="{BB962C8B-B14F-4D97-AF65-F5344CB8AC3E}">
+        <p14:creationId xmlns:p14="http://schemas.microsoft.com/office/powerpoint/2010/main" val="22142743"/>
+      </p:ext>
+    </p:extLst>
+  </p:cSld>
+  <p:clrMapOvr>
+    <a:masterClrMapping/>
+  </p:clrMapOvr>
+</p:sld>
+</file>
+
+<file path=ppt/slides/slide5.xml><?xml version="1.0" encoding="utf-8"?>
+<p:sld xmlns:a="http://schemas.openxmlformats.org/drawingml/2006/main" xmlns:r="http://schemas.openxmlformats.org/officeDocument/2006/relationships" xmlns:p="http://schemas.openxmlformats.org/presentationml/2006/main">
+  <p:cSld>
+    <p:spTree>
+      <p:nvGrpSpPr>
+        <p:cNvPr id="1" name=""/>
+        <p:cNvGrpSpPr/>
+        <p:nvPr/>
+      </p:nvGrpSpPr>
+      <p:grpSpPr>
+        <a:xfrm>
+          <a:off x="0" y="0"/>
+          <a:ext cx="0" cy="0"/>
+          <a:chOff x="0" y="0"/>
+          <a:chExt cx="0" cy="0"/>
+        </a:xfrm>
+      </p:grpSpPr>
+      <p:sp>
+        <p:nvSpPr>
+          <p:cNvPr id="2" name="Title 1">
+            <a:extLst>
+              <a:ext uri="{FF2B5EF4-FFF2-40B4-BE49-F238E27FC236}">
+                <a16:creationId xmlns:a16="http://schemas.microsoft.com/office/drawing/2014/main" id="{0372D214-10B0-CBD0-DA5F-3E0323BF36E6}"/>
+              </a:ext>
+            </a:extLst>
+          </p:cNvPr>
+          <p:cNvSpPr>
+            <a:spLocks noGrp="1"/>
+          </p:cNvSpPr>
+          <p:nvPr>
+            <p:ph type="title"/>
+          </p:nvPr>
+        </p:nvSpPr>
+        <p:spPr/>
+        <p:txBody>
+          <a:bodyPr/>
+          <a:lstStyle/>
+          <a:p>
+            <a:r>
+              <a:rPr lang="en-US" dirty="0"/>
+              <a:t>Our Results</a:t>
+            </a:r>
+          </a:p>
+        </p:txBody>
+      </p:sp>
+      <p:sp>
+        <p:nvSpPr>
+          <p:cNvPr id="3" name="Content Placeholder 2">
+            <a:extLst>
+              <a:ext uri="{FF2B5EF4-FFF2-40B4-BE49-F238E27FC236}">
+                <a16:creationId xmlns:a16="http://schemas.microsoft.com/office/drawing/2014/main" id="{A101D925-937F-4071-F512-24391AD1E114}"/>
+              </a:ext>
+            </a:extLst>
+          </p:cNvPr>
+          <p:cNvSpPr>
+            <a:spLocks noGrp="1"/>
+          </p:cNvSpPr>
+          <p:nvPr>
+            <p:ph idx="1"/>
+          </p:nvPr>
+        </p:nvSpPr>
+        <p:spPr/>
+        <p:txBody>
+          <a:bodyPr/>
+          <a:lstStyle/>
+          <a:p>
+            <a:endParaRPr lang="en-US"/>
+          </a:p>
+        </p:txBody>
+      </p:sp>
+    </p:spTree>
+    <p:extLst>
+      <p:ext uri="{BB962C8B-B14F-4D97-AF65-F5344CB8AC3E}">
+        <p14:creationId xmlns:p14="http://schemas.microsoft.com/office/powerpoint/2010/main" val="1709379"/>
+      </p:ext>
+    </p:extLst>
+  </p:cSld>
+  <p:clrMapOvr>
+    <a:masterClrMapping/>
+  </p:clrMapOvr>
+</p:sld>
+</file>
+
+<file path=ppt/slides/slide6.xml><?xml version="1.0" encoding="utf-8"?>
+<p:sld xmlns:a="http://schemas.openxmlformats.org/drawingml/2006/main" xmlns:r="http://schemas.openxmlformats.org/officeDocument/2006/relationships" xmlns:p="http://schemas.openxmlformats.org/presentationml/2006/main">
+  <p:cSld>
+    <p:spTree>
+      <p:nvGrpSpPr>
+        <p:cNvPr id="1" name=""/>
+        <p:cNvGrpSpPr/>
+        <p:nvPr/>
+      </p:nvGrpSpPr>
+      <p:grpSpPr>
+        <a:xfrm>
+          <a:off x="0" y="0"/>
+          <a:ext cx="0" cy="0"/>
+          <a:chOff x="0" y="0"/>
+          <a:chExt cx="0" cy="0"/>
+        </a:xfrm>
+      </p:grpSpPr>
+      <p:sp>
+        <p:nvSpPr>
+          <p:cNvPr id="2" name="Title 1">
+            <a:extLst>
+              <a:ext uri="{FF2B5EF4-FFF2-40B4-BE49-F238E27FC236}">
+                <a16:creationId xmlns:a16="http://schemas.microsoft.com/office/drawing/2014/main" id="{37B996A8-324B-4155-990B-F843E2A78828}"/>
+              </a:ext>
+            </a:extLst>
+          </p:cNvPr>
+          <p:cNvSpPr>
+            <a:spLocks noGrp="1"/>
+          </p:cNvSpPr>
+          <p:nvPr>
+            <p:ph type="title"/>
+          </p:nvPr>
+        </p:nvSpPr>
+        <p:spPr/>
+        <p:txBody>
+          <a:bodyPr/>
+          <a:lstStyle/>
+          <a:p>
+            <a:r>
+              <a:rPr lang="en-US" dirty="0"/>
+              <a:t>What is Promiscuous Pairing?</a:t>
+            </a:r>
+          </a:p>
+        </p:txBody>
+      </p:sp>
+      <p:sp>
+        <p:nvSpPr>
+          <p:cNvPr id="3" name="Content Placeholder 2">
+            <a:extLst>
+              <a:ext uri="{FF2B5EF4-FFF2-40B4-BE49-F238E27FC236}">
+                <a16:creationId xmlns:a16="http://schemas.microsoft.com/office/drawing/2014/main" id="{E6B9802D-7580-4777-794B-113CD2A7839A}"/>
+              </a:ext>
+            </a:extLst>
+          </p:cNvPr>
+          <p:cNvSpPr>
+            <a:spLocks noGrp="1"/>
+          </p:cNvSpPr>
+          <p:nvPr>
+            <p:ph idx="1"/>
+          </p:nvPr>
+        </p:nvSpPr>
+        <p:spPr/>
+        <p:txBody>
+          <a:bodyPr/>
+          <a:lstStyle/>
+          <a:p>
+            <a:endParaRPr lang="en-US"/>
+          </a:p>
+        </p:txBody>
+      </p:sp>
+    </p:spTree>
+    <p:extLst>
+      <p:ext uri="{BB962C8B-B14F-4D97-AF65-F5344CB8AC3E}">
+        <p14:creationId xmlns:p14="http://schemas.microsoft.com/office/powerpoint/2010/main" val="3357544226"/>
+      </p:ext>
+    </p:extLst>
+  </p:cSld>
+  <p:clrMapOvr>
+    <a:masterClrMapping/>
+  </p:clrMapOvr>
+</p:sld>
+</file>
+
+<file path=ppt/slides/slide7.xml><?xml version="1.0" encoding="utf-8"?>
+<p:sld xmlns:a="http://schemas.openxmlformats.org/drawingml/2006/main" xmlns:r="http://schemas.openxmlformats.org/officeDocument/2006/relationships" xmlns:p="http://schemas.openxmlformats.org/presentationml/2006/main">
+  <p:cSld>
+    <p:spTree>
+      <p:nvGrpSpPr>
+        <p:cNvPr id="1" name=""/>
+        <p:cNvGrpSpPr/>
+        <p:nvPr/>
+      </p:nvGrpSpPr>
+      <p:grpSpPr>
+        <a:xfrm>
+          <a:off x="0" y="0"/>
+          <a:ext cx="0" cy="0"/>
+          <a:chOff x="0" y="0"/>
+          <a:chExt cx="0" cy="0"/>
+        </a:xfrm>
+      </p:grpSpPr>
+      <p:sp>
+        <p:nvSpPr>
+          <p:cNvPr id="2" name="Title 1">
+            <a:extLst>
+              <a:ext uri="{FF2B5EF4-FFF2-40B4-BE49-F238E27FC236}">
                 <a16:creationId xmlns:a16="http://schemas.microsoft.com/office/drawing/2014/main" id="{B572B785-6703-3C29-FECB-15C747C60C8A}"/>
               </a:ext>
             </a:extLst>
@@ -3647,6 +6015,172 @@
     <p:extLst>
       <p:ext uri="{BB962C8B-B14F-4D97-AF65-F5344CB8AC3E}">
         <p14:creationId xmlns:p14="http://schemas.microsoft.com/office/powerpoint/2010/main" val="3051419815"/>
+      </p:ext>
+    </p:extLst>
+  </p:cSld>
+  <p:clrMapOvr>
+    <a:masterClrMapping/>
+  </p:clrMapOvr>
+</p:sld>
+</file>
+
+<file path=ppt/slides/slide8.xml><?xml version="1.0" encoding="utf-8"?>
+<p:sld xmlns:a="http://schemas.openxmlformats.org/drawingml/2006/main" xmlns:r="http://schemas.openxmlformats.org/officeDocument/2006/relationships" xmlns:p="http://schemas.openxmlformats.org/presentationml/2006/main">
+  <p:cSld>
+    <p:spTree>
+      <p:nvGrpSpPr>
+        <p:cNvPr id="1" name=""/>
+        <p:cNvGrpSpPr/>
+        <p:nvPr/>
+      </p:nvGrpSpPr>
+      <p:grpSpPr>
+        <a:xfrm>
+          <a:off x="0" y="0"/>
+          <a:ext cx="0" cy="0"/>
+          <a:chOff x="0" y="0"/>
+          <a:chExt cx="0" cy="0"/>
+        </a:xfrm>
+      </p:grpSpPr>
+      <p:sp>
+        <p:nvSpPr>
+          <p:cNvPr id="2" name="Title 1">
+            <a:extLst>
+              <a:ext uri="{FF2B5EF4-FFF2-40B4-BE49-F238E27FC236}">
+                <a16:creationId xmlns:a16="http://schemas.microsoft.com/office/drawing/2014/main" id="{8E58E2DE-F5FD-3140-5A61-B412D8CA73A3}"/>
+              </a:ext>
+            </a:extLst>
+          </p:cNvPr>
+          <p:cNvSpPr>
+            <a:spLocks noGrp="1"/>
+          </p:cNvSpPr>
+          <p:nvPr>
+            <p:ph type="title"/>
+          </p:nvPr>
+        </p:nvSpPr>
+        <p:spPr/>
+        <p:txBody>
+          <a:bodyPr/>
+          <a:lstStyle/>
+          <a:p>
+            <a:r>
+              <a:rPr lang="en-US" dirty="0"/>
+              <a:t>Other Teams</a:t>
+            </a:r>
+          </a:p>
+        </p:txBody>
+      </p:sp>
+      <p:sp>
+        <p:nvSpPr>
+          <p:cNvPr id="3" name="Content Placeholder 2">
+            <a:extLst>
+              <a:ext uri="{FF2B5EF4-FFF2-40B4-BE49-F238E27FC236}">
+                <a16:creationId xmlns:a16="http://schemas.microsoft.com/office/drawing/2014/main" id="{029742FA-6076-CB5B-5535-835CA0BB86EF}"/>
+              </a:ext>
+            </a:extLst>
+          </p:cNvPr>
+          <p:cNvSpPr>
+            <a:spLocks noGrp="1"/>
+          </p:cNvSpPr>
+          <p:nvPr>
+            <p:ph idx="1"/>
+          </p:nvPr>
+        </p:nvSpPr>
+        <p:spPr/>
+        <p:txBody>
+          <a:bodyPr/>
+          <a:lstStyle/>
+          <a:p>
+            <a:endParaRPr lang="en-US"/>
+          </a:p>
+        </p:txBody>
+      </p:sp>
+    </p:spTree>
+    <p:extLst>
+      <p:ext uri="{BB962C8B-B14F-4D97-AF65-F5344CB8AC3E}">
+        <p14:creationId xmlns:p14="http://schemas.microsoft.com/office/powerpoint/2010/main" val="310654357"/>
+      </p:ext>
+    </p:extLst>
+  </p:cSld>
+  <p:clrMapOvr>
+    <a:masterClrMapping/>
+  </p:clrMapOvr>
+</p:sld>
+</file>
+
+<file path=ppt/slides/slide9.xml><?xml version="1.0" encoding="utf-8"?>
+<p:sld xmlns:a="http://schemas.openxmlformats.org/drawingml/2006/main" xmlns:r="http://schemas.openxmlformats.org/officeDocument/2006/relationships" xmlns:p="http://schemas.openxmlformats.org/presentationml/2006/main">
+  <p:cSld>
+    <p:spTree>
+      <p:nvGrpSpPr>
+        <p:cNvPr id="1" name=""/>
+        <p:cNvGrpSpPr/>
+        <p:nvPr/>
+      </p:nvGrpSpPr>
+      <p:grpSpPr>
+        <a:xfrm>
+          <a:off x="0" y="0"/>
+          <a:ext cx="0" cy="0"/>
+          <a:chOff x="0" y="0"/>
+          <a:chExt cx="0" cy="0"/>
+        </a:xfrm>
+      </p:grpSpPr>
+      <p:sp>
+        <p:nvSpPr>
+          <p:cNvPr id="2" name="Title 1">
+            <a:extLst>
+              <a:ext uri="{FF2B5EF4-FFF2-40B4-BE49-F238E27FC236}">
+                <a16:creationId xmlns:a16="http://schemas.microsoft.com/office/drawing/2014/main" id="{F60437D5-A077-3862-5946-B85E45CB6D8A}"/>
+              </a:ext>
+            </a:extLst>
+          </p:cNvPr>
+          <p:cNvSpPr>
+            <a:spLocks noGrp="1"/>
+          </p:cNvSpPr>
+          <p:nvPr>
+            <p:ph type="title"/>
+          </p:nvPr>
+        </p:nvSpPr>
+        <p:spPr/>
+        <p:txBody>
+          <a:bodyPr/>
+          <a:lstStyle/>
+          <a:p>
+            <a:r>
+              <a:rPr lang="en-US" dirty="0"/>
+              <a:t>Change Patterns</a:t>
+            </a:r>
+          </a:p>
+        </p:txBody>
+      </p:sp>
+      <p:sp>
+        <p:nvSpPr>
+          <p:cNvPr id="3" name="Content Placeholder 2">
+            <a:extLst>
+              <a:ext uri="{FF2B5EF4-FFF2-40B4-BE49-F238E27FC236}">
+                <a16:creationId xmlns:a16="http://schemas.microsoft.com/office/drawing/2014/main" id="{90CC9237-F36E-A920-F3B0-3AA6B669758E}"/>
+              </a:ext>
+            </a:extLst>
+          </p:cNvPr>
+          <p:cNvSpPr>
+            <a:spLocks noGrp="1"/>
+          </p:cNvSpPr>
+          <p:nvPr>
+            <p:ph idx="1"/>
+          </p:nvPr>
+        </p:nvSpPr>
+        <p:spPr/>
+        <p:txBody>
+          <a:bodyPr/>
+          <a:lstStyle/>
+          <a:p>
+            <a:endParaRPr lang="en-US"/>
+          </a:p>
+        </p:txBody>
+      </p:sp>
+    </p:spTree>
+    <p:extLst>
+      <p:ext uri="{BB962C8B-B14F-4D97-AF65-F5344CB8AC3E}">
+        <p14:creationId xmlns:p14="http://schemas.microsoft.com/office/powerpoint/2010/main" val="3639305127"/>
       </p:ext>
     </p:extLst>
   </p:cSld>

</xml_diff>

<commit_message>
(craft) Added images for sharp section.
</commit_message>
<xml_diff>
--- a/Decks/Craft2023-PromiscuousPairingBeginnerMind.pptx
+++ b/Decks/Craft2023-PromiscuousPairingBeginnerMind.pptx
@@ -5,27 +5,30 @@
     <p:sldMasterId id="2147483660" r:id="rId1"/>
   </p:sldMasterIdLst>
   <p:notesMasterIdLst>
-    <p:notesMasterId r:id="rId20"/>
+    <p:notesMasterId r:id="rId23"/>
   </p:notesMasterIdLst>
   <p:sldIdLst>
     <p:sldId id="256" r:id="rId2"/>
-    <p:sldId id="260" r:id="rId3"/>
-    <p:sldId id="261" r:id="rId4"/>
-    <p:sldId id="262" r:id="rId5"/>
-    <p:sldId id="263" r:id="rId6"/>
-    <p:sldId id="257" r:id="rId7"/>
-    <p:sldId id="258" r:id="rId8"/>
-    <p:sldId id="264" r:id="rId9"/>
-    <p:sldId id="266" r:id="rId10"/>
-    <p:sldId id="265" r:id="rId11"/>
-    <p:sldId id="267" r:id="rId12"/>
-    <p:sldId id="268" r:id="rId13"/>
-    <p:sldId id="269" r:id="rId14"/>
-    <p:sldId id="270" r:id="rId15"/>
-    <p:sldId id="271" r:id="rId16"/>
-    <p:sldId id="272" r:id="rId17"/>
-    <p:sldId id="273" r:id="rId18"/>
-    <p:sldId id="274" r:id="rId19"/>
+    <p:sldId id="275" r:id="rId3"/>
+    <p:sldId id="276" r:id="rId4"/>
+    <p:sldId id="277" r:id="rId5"/>
+    <p:sldId id="278" r:id="rId6"/>
+    <p:sldId id="261" r:id="rId7"/>
+    <p:sldId id="262" r:id="rId8"/>
+    <p:sldId id="263" r:id="rId9"/>
+    <p:sldId id="257" r:id="rId10"/>
+    <p:sldId id="258" r:id="rId11"/>
+    <p:sldId id="264" r:id="rId12"/>
+    <p:sldId id="266" r:id="rId13"/>
+    <p:sldId id="265" r:id="rId14"/>
+    <p:sldId id="267" r:id="rId15"/>
+    <p:sldId id="268" r:id="rId16"/>
+    <p:sldId id="269" r:id="rId17"/>
+    <p:sldId id="270" r:id="rId18"/>
+    <p:sldId id="271" r:id="rId19"/>
+    <p:sldId id="272" r:id="rId20"/>
+    <p:sldId id="273" r:id="rId21"/>
+    <p:sldId id="274" r:id="rId22"/>
   </p:sldIdLst>
   <p:sldSz cx="12192000" cy="6858000"/>
   <p:notesSz cx="6858000" cy="9144000"/>
@@ -525,82 +528,26 @@
           <a:bodyPr/>
           <a:lstStyle/>
           <a:p>
+            <a:pPr marL="0" marR="0" lvl="0" indent="0" algn="l" defTabSz="914400" rtl="0" eaLnBrk="1" fontAlgn="auto" latinLnBrk="0" hangingPunct="1">
+              <a:lnSpc>
+                <a:spcPct val="100000"/>
+              </a:lnSpc>
+              <a:spcBef>
+                <a:spcPts val="0"/>
+              </a:spcBef>
+              <a:spcAft>
+                <a:spcPts val="0"/>
+              </a:spcAft>
+              <a:buClrTx/>
+              <a:buSzTx/>
+              <a:buFontTx/>
+              <a:buNone/>
+              <a:tabLst/>
+              <a:defRPr/>
+            </a:pPr>
             <a:r>
               <a:rPr lang="en-US" dirty="0"/>
               <a:t>We knew we had an excellent way to work when we were totally unable to do it without an egg timer. Let me step back.</a:t>
-            </a:r>
-          </a:p>
-          <a:p>
-            <a:endParaRPr lang="en-US" dirty="0"/>
-          </a:p>
-          <a:p>
-            <a:pPr marL="171450" indent="-171450">
-              <a:buFont typeface="Arial" panose="020B0604020202020204" pitchFamily="34" charset="0"/>
-              <a:buChar char="•"/>
-            </a:pPr>
-            <a:r>
-              <a:rPr lang="en-US" dirty="0"/>
-              <a:t>We paired 100% of the time. This was 2000, we had read the Extreme Programming White Book. Did it by the book, because couldn’t mess about.</a:t>
-            </a:r>
-          </a:p>
-          <a:p>
-            <a:pPr marL="171450" indent="-171450">
-              <a:buFont typeface="Arial" panose="020B0604020202020204" pitchFamily="34" charset="0"/>
-              <a:buChar char="•"/>
-            </a:pPr>
-            <a:r>
-              <a:rPr lang="en-US" dirty="0"/>
-              <a:t>Because we couldn’t mess about, we ran experiments &amp; did whatever worked.</a:t>
-            </a:r>
-          </a:p>
-          <a:p>
-            <a:pPr marL="171450" indent="-171450">
-              <a:buFont typeface="Arial" panose="020B0604020202020204" pitchFamily="34" charset="0"/>
-              <a:buChar char="•"/>
-            </a:pPr>
-            <a:r>
-              <a:rPr lang="en-US" dirty="0"/>
-              <a:t>Found some pairs were far more effective – even same people on different days.</a:t>
-            </a:r>
-          </a:p>
-          <a:p>
-            <a:pPr marL="171450" indent="-171450">
-              <a:buFont typeface="Arial" panose="020B0604020202020204" pitchFamily="34" charset="0"/>
-              <a:buChar char="•"/>
-            </a:pPr>
-            <a:r>
-              <a:rPr lang="en-US" dirty="0"/>
-              <a:t>Sought to establish why.</a:t>
-            </a:r>
-          </a:p>
-          <a:p>
-            <a:pPr marL="171450" indent="-171450">
-              <a:buFont typeface="Arial" panose="020B0604020202020204" pitchFamily="34" charset="0"/>
-              <a:buChar char="•"/>
-            </a:pPr>
-            <a:r>
-              <a:rPr lang="en-US" dirty="0"/>
-              <a:t>These were our results.</a:t>
-            </a:r>
-          </a:p>
-          <a:p>
-            <a:pPr marL="171450" indent="-171450">
-              <a:buFont typeface="Arial" panose="020B0604020202020204" pitchFamily="34" charset="0"/>
-              <a:buChar char="•"/>
-            </a:pPr>
-            <a:r>
-              <a:rPr lang="en-US" dirty="0"/>
-              <a:t>But most effective was also hardest.</a:t>
-            </a:r>
-          </a:p>
-          <a:p>
-            <a:pPr marL="171450" indent="-171450">
-              <a:buFont typeface="Arial" panose="020B0604020202020204" pitchFamily="34" charset="0"/>
-              <a:buChar char="•"/>
-            </a:pPr>
-            <a:r>
-              <a:rPr lang="en-US" dirty="0"/>
-              <a:t>Team chose to use the egg timer. Not because we like pain, but because we understood the data.</a:t>
             </a:r>
           </a:p>
         </p:txBody>
@@ -631,7 +578,7 @@
     </p:spTree>
     <p:extLst>
       <p:ext uri="{BB962C8B-B14F-4D97-AF65-F5344CB8AC3E}">
-        <p14:creationId xmlns:p14="http://schemas.microsoft.com/office/powerpoint/2010/main" val="901128009"/>
+        <p14:creationId xmlns:p14="http://schemas.microsoft.com/office/powerpoint/2010/main" val="2841788111"/>
       </p:ext>
     </p:extLst>
   </p:cSld>
@@ -685,34 +632,27 @@
           <a:bodyPr/>
           <a:lstStyle/>
           <a:p>
-            <a:r>
-              <a:rPr lang="en-US" dirty="0"/>
-              <a:t>Engineering Method</a:t>
-            </a:r>
-          </a:p>
-          <a:p>
-            <a:r>
-              <a:rPr lang="en-US" dirty="0"/>
-              <a:t>Goal: improve, even if it costs learning.</a:t>
-            </a:r>
-          </a:p>
-          <a:p>
-            <a:r>
-              <a:rPr lang="en-US" dirty="0"/>
-              <a:t>Assumes knowledge is present</a:t>
-            </a:r>
-          </a:p>
-          <a:p>
-            <a:r>
-              <a:rPr lang="en-US" dirty="0"/>
-              <a:t>Now apply &amp; refine best ideas.</a:t>
-            </a:r>
-          </a:p>
-          <a:p>
-            <a:r>
-              <a:rPr lang="en-US" dirty="0"/>
-              <a:t>Build consistency &amp; habits.</a:t>
-            </a:r>
+            <a:pPr marL="171450" indent="-171450">
+              <a:buFont typeface="Arial" panose="020B0604020202020204" pitchFamily="34" charset="0"/>
+              <a:buChar char="•"/>
+            </a:pPr>
+            <a:r>
+              <a:rPr lang="en-US" dirty="0"/>
+              <a:t>Mention MS team’s follow-up a year later</a:t>
+            </a:r>
+          </a:p>
+          <a:p>
+            <a:pPr marL="628650" lvl="1" indent="-171450">
+              <a:buFont typeface="Arial" panose="020B0604020202020204" pitchFamily="34" charset="0"/>
+              <a:buChar char="•"/>
+            </a:pPr>
+            <a:r>
+              <a:rPr lang="en-US" dirty="0"/>
+              <a:t>Surfaced all the problems. They had a traditional continuous improvement process, so couldn’t solve the problems in real time.</a:t>
+            </a:r>
+          </a:p>
+          <a:p>
+            <a:endParaRPr lang="en-US" dirty="0"/>
           </a:p>
         </p:txBody>
       </p:sp>
@@ -742,7 +682,7 @@
     </p:spTree>
     <p:extLst>
       <p:ext uri="{BB962C8B-B14F-4D97-AF65-F5344CB8AC3E}">
-        <p14:creationId xmlns:p14="http://schemas.microsoft.com/office/powerpoint/2010/main" val="3895911215"/>
+        <p14:creationId xmlns:p14="http://schemas.microsoft.com/office/powerpoint/2010/main" val="1704017679"/>
       </p:ext>
     </p:extLst>
   </p:cSld>
@@ -798,23 +738,20 @@
           <a:p>
             <a:r>
               <a:rPr lang="en-US" dirty="0"/>
-              <a:t>Overall: alternate discovery with implementation</a:t>
-            </a:r>
-          </a:p>
-          <a:p>
-            <a:r>
-              <a:rPr lang="en-US" dirty="0"/>
-              <a:t>Each week, know which you are doing for each facet of your work</a:t>
-            </a:r>
-          </a:p>
-          <a:p>
-            <a:r>
-              <a:rPr lang="en-US" dirty="0"/>
-              <a:t>Retro format: shorts &amp; longs. Shorts only apply for improvements, longs lead to experiments.</a:t>
-            </a:r>
-          </a:p>
-          <a:p>
-            <a:endParaRPr lang="en-US" dirty="0"/>
+              <a:t>4 parts of changing something: identify problem, generate ideas, decide among them, implement them (partially), verify them.</a:t>
+            </a:r>
+          </a:p>
+          <a:p>
+            <a:r>
+              <a:rPr lang="en-US" dirty="0"/>
+              <a:t>4 common orderings: governance, retro, stage magic, and experiment.</a:t>
+            </a:r>
+          </a:p>
+          <a:p>
+            <a:r>
+              <a:rPr lang="en-US" dirty="0"/>
+              <a:t>Governance and retro are similar, but governance does first 3 steps in different context from last 2. And both governance and retro often skip verify – leading to silent success &amp; failure.</a:t>
+            </a:r>
           </a:p>
         </p:txBody>
       </p:sp>
@@ -844,7 +781,7 @@
     </p:spTree>
     <p:extLst>
       <p:ext uri="{BB962C8B-B14F-4D97-AF65-F5344CB8AC3E}">
-        <p14:creationId xmlns:p14="http://schemas.microsoft.com/office/powerpoint/2010/main" val="1394533708"/>
+        <p14:creationId xmlns:p14="http://schemas.microsoft.com/office/powerpoint/2010/main" val="3169776868"/>
       </p:ext>
     </p:extLst>
   </p:cSld>
@@ -900,11 +837,96 @@
           <a:p>
             <a:r>
               <a:rPr lang="en-US" dirty="0"/>
-              <a:t>Choose it intentionally, based on data. Then improve it consistently.</a:t>
-            </a:r>
-          </a:p>
-          <a:p>
-            <a:endParaRPr lang="en-US" dirty="0"/>
+              <a:t>Scientific Method</a:t>
+            </a:r>
+          </a:p>
+          <a:p>
+            <a:r>
+              <a:rPr lang="en-US" dirty="0"/>
+              <a:t>Social experiments</a:t>
+            </a:r>
+          </a:p>
+          <a:p>
+            <a:r>
+              <a:rPr lang="en-US" dirty="0"/>
+              <a:t>Goal: maximize learning, not success. Even if it means intentionally doing the wrong thing – Wordle example.</a:t>
+            </a:r>
+          </a:p>
+          <a:p>
+            <a:r>
+              <a:rPr lang="en-US" dirty="0"/>
+              <a:t>Avoid obvious invalidity problems</a:t>
+            </a:r>
+          </a:p>
+          <a:p>
+            <a:pPr marL="171450" indent="-171450">
+              <a:buFont typeface="Arial" panose="020B0604020202020204" pitchFamily="34" charset="0"/>
+              <a:buChar char="•"/>
+            </a:pPr>
+            <a:r>
+              <a:rPr lang="en-US" dirty="0"/>
+              <a:t>Test multiple options, including the current state</a:t>
+            </a:r>
+          </a:p>
+          <a:p>
+            <a:pPr marL="171450" indent="-171450">
+              <a:buFont typeface="Arial" panose="020B0604020202020204" pitchFamily="34" charset="0"/>
+              <a:buChar char="•"/>
+            </a:pPr>
+            <a:r>
+              <a:rPr lang="en-US" dirty="0"/>
+              <a:t>Vary details within the practice</a:t>
+            </a:r>
+          </a:p>
+          <a:p>
+            <a:pPr marL="171450" indent="-171450">
+              <a:buFont typeface="Arial" panose="020B0604020202020204" pitchFamily="34" charset="0"/>
+              <a:buChar char="•"/>
+            </a:pPr>
+            <a:r>
+              <a:rPr lang="en-US" dirty="0"/>
+              <a:t>Use qualitative and quantitative measures</a:t>
+            </a:r>
+          </a:p>
+          <a:p>
+            <a:pPr marL="171450" indent="-171450">
+              <a:buFont typeface="Arial" panose="020B0604020202020204" pitchFamily="34" charset="0"/>
+              <a:buChar char="•"/>
+            </a:pPr>
+            <a:r>
+              <a:rPr lang="en-US" dirty="0"/>
+              <a:t>Measure one level up and out when possible</a:t>
+            </a:r>
+          </a:p>
+          <a:p>
+            <a:pPr marL="171450" indent="-171450">
+              <a:buFont typeface="Arial" panose="020B0604020202020204" pitchFamily="34" charset="0"/>
+              <a:buChar char="•"/>
+            </a:pPr>
+            <a:r>
+              <a:rPr lang="en-US" dirty="0"/>
+              <a:t>Measure invariants, to see if they do vary</a:t>
+            </a:r>
+          </a:p>
+          <a:p>
+            <a:pPr marL="171450" indent="-171450">
+              <a:buFont typeface="Arial" panose="020B0604020202020204" pitchFamily="34" charset="0"/>
+              <a:buChar char="•"/>
+            </a:pPr>
+            <a:r>
+              <a:rPr lang="en-US" dirty="0"/>
+              <a:t>Write down the results in real-time, not in a retro after</a:t>
+            </a:r>
+          </a:p>
+          <a:p>
+            <a:pPr marL="171450" indent="-171450">
+              <a:buFont typeface="Arial" panose="020B0604020202020204" pitchFamily="34" charset="0"/>
+              <a:buChar char="•"/>
+            </a:pPr>
+            <a:r>
+              <a:rPr lang="en-US" dirty="0"/>
+              <a:t>Don’t adopt anything; try everything</a:t>
+            </a:r>
           </a:p>
         </p:txBody>
       </p:sp>
@@ -925,7 +947,7 @@
           <a:p>
             <a:fld id="{2E396785-7325-4959-B34C-58C3AEDA50A1}" type="slidenum">
               <a:rPr lang="en-US" smtClean="0"/>
-              <a:t>16</a:t>
+              <a:t>13</a:t>
             </a:fld>
             <a:endParaRPr lang="en-US"/>
           </a:p>
@@ -934,7 +956,7 @@
     </p:spTree>
     <p:extLst>
       <p:ext uri="{BB962C8B-B14F-4D97-AF65-F5344CB8AC3E}">
-        <p14:creationId xmlns:p14="http://schemas.microsoft.com/office/powerpoint/2010/main" val="2271503796"/>
+        <p14:creationId xmlns:p14="http://schemas.microsoft.com/office/powerpoint/2010/main" val="1136876532"/>
       </p:ext>
     </p:extLst>
   </p:cSld>
@@ -988,7 +1010,34 @@
           <a:bodyPr/>
           <a:lstStyle/>
           <a:p>
-            <a:endParaRPr lang="en-US" dirty="0"/>
+            <a:r>
+              <a:rPr lang="en-US" dirty="0"/>
+              <a:t>Engineering Method</a:t>
+            </a:r>
+          </a:p>
+          <a:p>
+            <a:r>
+              <a:rPr lang="en-US" dirty="0"/>
+              <a:t>Goal: improve, even if it costs learning.</a:t>
+            </a:r>
+          </a:p>
+          <a:p>
+            <a:r>
+              <a:rPr lang="en-US" dirty="0"/>
+              <a:t>Assumes knowledge is present</a:t>
+            </a:r>
+          </a:p>
+          <a:p>
+            <a:r>
+              <a:rPr lang="en-US" dirty="0"/>
+              <a:t>Now apply &amp; refine best ideas.</a:t>
+            </a:r>
+          </a:p>
+          <a:p>
+            <a:r>
+              <a:rPr lang="en-US" dirty="0"/>
+              <a:t>Build consistency &amp; habits.</a:t>
+            </a:r>
           </a:p>
         </p:txBody>
       </p:sp>
@@ -1009,7 +1058,283 @@
           <a:p>
             <a:fld id="{2E396785-7325-4959-B34C-58C3AEDA50A1}" type="slidenum">
               <a:rPr lang="en-US" smtClean="0"/>
-              <a:t>17</a:t>
+              <a:t>14</a:t>
+            </a:fld>
+            <a:endParaRPr lang="en-US"/>
+          </a:p>
+        </p:txBody>
+      </p:sp>
+    </p:spTree>
+    <p:extLst>
+      <p:ext uri="{BB962C8B-B14F-4D97-AF65-F5344CB8AC3E}">
+        <p14:creationId xmlns:p14="http://schemas.microsoft.com/office/powerpoint/2010/main" val="3895911215"/>
+      </p:ext>
+    </p:extLst>
+  </p:cSld>
+  <p:clrMapOvr>
+    <a:masterClrMapping/>
+  </p:clrMapOvr>
+</p:notes>
+</file>
+
+<file path=ppt/notesSlides/notesSlide14.xml><?xml version="1.0" encoding="utf-8"?>
+<p:notes xmlns:a="http://schemas.openxmlformats.org/drawingml/2006/main" xmlns:r="http://schemas.openxmlformats.org/officeDocument/2006/relationships" xmlns:p="http://schemas.openxmlformats.org/presentationml/2006/main">
+  <p:cSld>
+    <p:spTree>
+      <p:nvGrpSpPr>
+        <p:cNvPr id="1" name=""/>
+        <p:cNvGrpSpPr/>
+        <p:nvPr/>
+      </p:nvGrpSpPr>
+      <p:grpSpPr>
+        <a:xfrm>
+          <a:off x="0" y="0"/>
+          <a:ext cx="0" cy="0"/>
+          <a:chOff x="0" y="0"/>
+          <a:chExt cx="0" cy="0"/>
+        </a:xfrm>
+      </p:grpSpPr>
+      <p:sp>
+        <p:nvSpPr>
+          <p:cNvPr id="2" name="Slide Image Placeholder 1"/>
+          <p:cNvSpPr>
+            <a:spLocks noGrp="1" noRot="1" noChangeAspect="1"/>
+          </p:cNvSpPr>
+          <p:nvPr>
+            <p:ph type="sldImg"/>
+          </p:nvPr>
+        </p:nvSpPr>
+        <p:spPr/>
+      </p:sp>
+      <p:sp>
+        <p:nvSpPr>
+          <p:cNvPr id="3" name="Notes Placeholder 2"/>
+          <p:cNvSpPr>
+            <a:spLocks noGrp="1"/>
+          </p:cNvSpPr>
+          <p:nvPr>
+            <p:ph type="body" idx="1"/>
+          </p:nvPr>
+        </p:nvSpPr>
+        <p:spPr/>
+        <p:txBody>
+          <a:bodyPr/>
+          <a:lstStyle/>
+          <a:p>
+            <a:r>
+              <a:rPr lang="en-US" dirty="0"/>
+              <a:t>Overall: alternate discovery with implementation</a:t>
+            </a:r>
+          </a:p>
+          <a:p>
+            <a:r>
+              <a:rPr lang="en-US" dirty="0"/>
+              <a:t>Each week, know which you are doing for each facet of your work</a:t>
+            </a:r>
+          </a:p>
+          <a:p>
+            <a:r>
+              <a:rPr lang="en-US" dirty="0"/>
+              <a:t>Retro format: shorts &amp; longs. Shorts only apply for improvements, longs lead to experiments.</a:t>
+            </a:r>
+          </a:p>
+          <a:p>
+            <a:endParaRPr lang="en-US" dirty="0"/>
+          </a:p>
+        </p:txBody>
+      </p:sp>
+      <p:sp>
+        <p:nvSpPr>
+          <p:cNvPr id="4" name="Slide Number Placeholder 3"/>
+          <p:cNvSpPr>
+            <a:spLocks noGrp="1"/>
+          </p:cNvSpPr>
+          <p:nvPr>
+            <p:ph type="sldNum" sz="quarter" idx="5"/>
+          </p:nvPr>
+        </p:nvSpPr>
+        <p:spPr/>
+        <p:txBody>
+          <a:bodyPr/>
+          <a:lstStyle/>
+          <a:p>
+            <a:fld id="{2E396785-7325-4959-B34C-58C3AEDA50A1}" type="slidenum">
+              <a:rPr lang="en-US" smtClean="0"/>
+              <a:t>15</a:t>
+            </a:fld>
+            <a:endParaRPr lang="en-US"/>
+          </a:p>
+        </p:txBody>
+      </p:sp>
+    </p:spTree>
+    <p:extLst>
+      <p:ext uri="{BB962C8B-B14F-4D97-AF65-F5344CB8AC3E}">
+        <p14:creationId xmlns:p14="http://schemas.microsoft.com/office/powerpoint/2010/main" val="1394533708"/>
+      </p:ext>
+    </p:extLst>
+  </p:cSld>
+  <p:clrMapOvr>
+    <a:masterClrMapping/>
+  </p:clrMapOvr>
+</p:notes>
+</file>
+
+<file path=ppt/notesSlides/notesSlide15.xml><?xml version="1.0" encoding="utf-8"?>
+<p:notes xmlns:a="http://schemas.openxmlformats.org/drawingml/2006/main" xmlns:r="http://schemas.openxmlformats.org/officeDocument/2006/relationships" xmlns:p="http://schemas.openxmlformats.org/presentationml/2006/main">
+  <p:cSld>
+    <p:spTree>
+      <p:nvGrpSpPr>
+        <p:cNvPr id="1" name=""/>
+        <p:cNvGrpSpPr/>
+        <p:nvPr/>
+      </p:nvGrpSpPr>
+      <p:grpSpPr>
+        <a:xfrm>
+          <a:off x="0" y="0"/>
+          <a:ext cx="0" cy="0"/>
+          <a:chOff x="0" y="0"/>
+          <a:chExt cx="0" cy="0"/>
+        </a:xfrm>
+      </p:grpSpPr>
+      <p:sp>
+        <p:nvSpPr>
+          <p:cNvPr id="2" name="Slide Image Placeholder 1"/>
+          <p:cNvSpPr>
+            <a:spLocks noGrp="1" noRot="1" noChangeAspect="1"/>
+          </p:cNvSpPr>
+          <p:nvPr>
+            <p:ph type="sldImg"/>
+          </p:nvPr>
+        </p:nvSpPr>
+        <p:spPr/>
+      </p:sp>
+      <p:sp>
+        <p:nvSpPr>
+          <p:cNvPr id="3" name="Notes Placeholder 2"/>
+          <p:cNvSpPr>
+            <a:spLocks noGrp="1"/>
+          </p:cNvSpPr>
+          <p:nvPr>
+            <p:ph type="body" idx="1"/>
+          </p:nvPr>
+        </p:nvSpPr>
+        <p:spPr/>
+        <p:txBody>
+          <a:bodyPr/>
+          <a:lstStyle/>
+          <a:p>
+            <a:r>
+              <a:rPr lang="en-US" dirty="0"/>
+              <a:t>Choose it intentionally, based on data. Then improve it consistently.</a:t>
+            </a:r>
+          </a:p>
+          <a:p>
+            <a:endParaRPr lang="en-US" dirty="0"/>
+          </a:p>
+        </p:txBody>
+      </p:sp>
+      <p:sp>
+        <p:nvSpPr>
+          <p:cNvPr id="4" name="Slide Number Placeholder 3"/>
+          <p:cNvSpPr>
+            <a:spLocks noGrp="1"/>
+          </p:cNvSpPr>
+          <p:nvPr>
+            <p:ph type="sldNum" sz="quarter" idx="5"/>
+          </p:nvPr>
+        </p:nvSpPr>
+        <p:spPr/>
+        <p:txBody>
+          <a:bodyPr/>
+          <a:lstStyle/>
+          <a:p>
+            <a:fld id="{2E396785-7325-4959-B34C-58C3AEDA50A1}" type="slidenum">
+              <a:rPr lang="en-US" smtClean="0"/>
+              <a:t>19</a:t>
+            </a:fld>
+            <a:endParaRPr lang="en-US"/>
+          </a:p>
+        </p:txBody>
+      </p:sp>
+    </p:spTree>
+    <p:extLst>
+      <p:ext uri="{BB962C8B-B14F-4D97-AF65-F5344CB8AC3E}">
+        <p14:creationId xmlns:p14="http://schemas.microsoft.com/office/powerpoint/2010/main" val="2271503796"/>
+      </p:ext>
+    </p:extLst>
+  </p:cSld>
+  <p:clrMapOvr>
+    <a:masterClrMapping/>
+  </p:clrMapOvr>
+</p:notes>
+</file>
+
+<file path=ppt/notesSlides/notesSlide16.xml><?xml version="1.0" encoding="utf-8"?>
+<p:notes xmlns:a="http://schemas.openxmlformats.org/drawingml/2006/main" xmlns:r="http://schemas.openxmlformats.org/officeDocument/2006/relationships" xmlns:p="http://schemas.openxmlformats.org/presentationml/2006/main">
+  <p:cSld>
+    <p:spTree>
+      <p:nvGrpSpPr>
+        <p:cNvPr id="1" name=""/>
+        <p:cNvGrpSpPr/>
+        <p:nvPr/>
+      </p:nvGrpSpPr>
+      <p:grpSpPr>
+        <a:xfrm>
+          <a:off x="0" y="0"/>
+          <a:ext cx="0" cy="0"/>
+          <a:chOff x="0" y="0"/>
+          <a:chExt cx="0" cy="0"/>
+        </a:xfrm>
+      </p:grpSpPr>
+      <p:sp>
+        <p:nvSpPr>
+          <p:cNvPr id="2" name="Slide Image Placeholder 1"/>
+          <p:cNvSpPr>
+            <a:spLocks noGrp="1" noRot="1" noChangeAspect="1"/>
+          </p:cNvSpPr>
+          <p:nvPr>
+            <p:ph type="sldImg"/>
+          </p:nvPr>
+        </p:nvSpPr>
+        <p:spPr/>
+      </p:sp>
+      <p:sp>
+        <p:nvSpPr>
+          <p:cNvPr id="3" name="Notes Placeholder 2"/>
+          <p:cNvSpPr>
+            <a:spLocks noGrp="1"/>
+          </p:cNvSpPr>
+          <p:nvPr>
+            <p:ph type="body" idx="1"/>
+          </p:nvPr>
+        </p:nvSpPr>
+        <p:spPr/>
+        <p:txBody>
+          <a:bodyPr/>
+          <a:lstStyle/>
+          <a:p>
+            <a:endParaRPr lang="en-US" dirty="0"/>
+          </a:p>
+        </p:txBody>
+      </p:sp>
+      <p:sp>
+        <p:nvSpPr>
+          <p:cNvPr id="4" name="Slide Number Placeholder 3"/>
+          <p:cNvSpPr>
+            <a:spLocks noGrp="1"/>
+          </p:cNvSpPr>
+          <p:nvPr>
+            <p:ph type="sldNum" sz="quarter" idx="5"/>
+          </p:nvPr>
+        </p:nvSpPr>
+        <p:spPr/>
+        <p:txBody>
+          <a:bodyPr/>
+          <a:lstStyle/>
+          <a:p>
+            <a:fld id="{2E396785-7325-4959-B34C-58C3AEDA50A1}" type="slidenum">
+              <a:rPr lang="en-US" smtClean="0"/>
+              <a:t>20</a:t>
             </a:fld>
             <a:endParaRPr lang="en-US"/>
           </a:p>
@@ -1072,19 +1397,47 @@
           <a:bodyPr/>
           <a:lstStyle/>
           <a:p>
-            <a:r>
-              <a:rPr lang="en-US" dirty="0"/>
-              <a:t>There are many ways to collaborate. PR, Peer, Pair, and Ensemble all work in different contexts. Many variations on each.</a:t>
+            <a:pPr marL="171450" indent="-171450">
+              <a:buFont typeface="Arial" panose="020B0604020202020204" pitchFamily="34" charset="0"/>
+              <a:buChar char="•"/>
+            </a:pPr>
+            <a:r>
+              <a:rPr lang="en-US" dirty="0"/>
+              <a:t>We paired 100% of the time.</a:t>
+            </a:r>
+          </a:p>
+          <a:p>
+            <a:pPr marL="171450" indent="-171450">
+              <a:buFont typeface="Arial" panose="020B0604020202020204" pitchFamily="34" charset="0"/>
+              <a:buChar char="•"/>
+            </a:pPr>
+            <a:r>
+              <a:rPr lang="en-US" dirty="0"/>
+              <a:t>This was 2000, we had read the Extreme Programming White Book.</a:t>
+            </a:r>
+          </a:p>
+          <a:p>
+            <a:pPr marL="171450" indent="-171450">
+              <a:buFont typeface="Arial" panose="020B0604020202020204" pitchFamily="34" charset="0"/>
+              <a:buChar char="•"/>
+            </a:pPr>
+            <a:r>
+              <a:rPr lang="en-US" dirty="0"/>
+              <a:t>Did it by the book, because couldn’t mess about.</a:t>
+            </a:r>
+          </a:p>
+          <a:p>
+            <a:pPr marL="171450" indent="-171450">
+              <a:buFont typeface="Arial" panose="020B0604020202020204" pitchFamily="34" charset="0"/>
+              <a:buChar char="•"/>
+            </a:pPr>
+            <a:r>
+              <a:rPr lang="en-US" dirty="0"/>
+              <a:t>Because we couldn’t mess about, we ran experiments &amp; did whatever worked.</a:t>
             </a:r>
           </a:p>
           <a:p>
             <a:endParaRPr lang="en-US" dirty="0"/>
-          </a:p>
-          <a:p>
-            <a:r>
-              <a:rPr lang="en-US" dirty="0"/>
-              <a:t>Intuition and ease may be misleading. Choose intentionally, based on data. And ease can be a valid factor!</a:t>
-            </a:r>
           </a:p>
         </p:txBody>
       </p:sp>
@@ -1114,7 +1467,7 @@
     </p:spTree>
     <p:extLst>
       <p:ext uri="{BB962C8B-B14F-4D97-AF65-F5344CB8AC3E}">
-        <p14:creationId xmlns:p14="http://schemas.microsoft.com/office/powerpoint/2010/main" val="2527625466"/>
+        <p14:creationId xmlns:p14="http://schemas.microsoft.com/office/powerpoint/2010/main" val="2881375045"/>
       </p:ext>
     </p:extLst>
   </p:cSld>
@@ -1168,112 +1521,33 @@
           <a:bodyPr/>
           <a:lstStyle/>
           <a:p>
-            <a:pPr marL="0" marR="0" lvl="0" indent="0" algn="l" defTabSz="914400" rtl="0" eaLnBrk="1" fontAlgn="auto" latinLnBrk="0" hangingPunct="1">
-              <a:lnSpc>
-                <a:spcPct val="100000"/>
-              </a:lnSpc>
-              <a:spcBef>
-                <a:spcPts val="0"/>
-              </a:spcBef>
-              <a:spcAft>
-                <a:spcPts val="0"/>
-              </a:spcAft>
-              <a:buClrTx/>
-              <a:buSzTx/>
-              <a:buFontTx/>
-              <a:buNone/>
-              <a:tabLst/>
-              <a:defRPr/>
+            <a:pPr marL="171450" indent="-171450">
+              <a:buFont typeface="Arial" panose="020B0604020202020204" pitchFamily="34" charset="0"/>
+              <a:buChar char="•"/>
             </a:pPr>
             <a:r>
               <a:rPr lang="en-US" dirty="0"/>
-              <a:t>Here’s where I make a recommendation about how you work.</a:t>
-            </a:r>
-          </a:p>
-          <a:p>
-            <a:pPr marL="0" marR="0" lvl="0" indent="0" algn="l" defTabSz="914400" rtl="0" eaLnBrk="1" fontAlgn="auto" latinLnBrk="0" hangingPunct="1">
-              <a:lnSpc>
-                <a:spcPct val="100000"/>
-              </a:lnSpc>
-              <a:spcBef>
-                <a:spcPts val="0"/>
-              </a:spcBef>
-              <a:spcAft>
-                <a:spcPts val="0"/>
-              </a:spcAft>
-              <a:buClrTx/>
-              <a:buSzTx/>
-              <a:buFontTx/>
-              <a:buNone/>
-              <a:tabLst/>
-              <a:defRPr/>
+              <a:t>Found some pairs were far more effective – even same people on different days.</a:t>
+            </a:r>
+          </a:p>
+          <a:p>
+            <a:pPr marL="171450" indent="-171450">
+              <a:buFont typeface="Arial" panose="020B0604020202020204" pitchFamily="34" charset="0"/>
+              <a:buChar char="•"/>
             </a:pPr>
-            <a:endParaRPr lang="en-US" dirty="0"/>
-          </a:p>
-          <a:p>
-            <a:pPr marL="0" marR="0" lvl="0" indent="0" algn="l" defTabSz="914400" rtl="0" eaLnBrk="1" fontAlgn="auto" latinLnBrk="0" hangingPunct="1">
-              <a:lnSpc>
-                <a:spcPct val="100000"/>
-              </a:lnSpc>
-              <a:spcBef>
-                <a:spcPts val="0"/>
-              </a:spcBef>
-              <a:spcAft>
-                <a:spcPts val="0"/>
-              </a:spcAft>
-              <a:buClrTx/>
-              <a:buSzTx/>
-              <a:buFontTx/>
-              <a:buNone/>
-              <a:tabLst/>
-              <a:defRPr/>
+            <a:r>
+              <a:rPr lang="en-US" dirty="0"/>
+              <a:t>Sought to establish why.</a:t>
+            </a:r>
+          </a:p>
+          <a:p>
+            <a:pPr marL="171450" indent="-171450">
+              <a:buFont typeface="Arial" panose="020B0604020202020204" pitchFamily="34" charset="0"/>
+              <a:buChar char="•"/>
             </a:pPr>
             <a:r>
               <a:rPr lang="en-US" dirty="0"/>
-              <a:t>…and because this is a talk about Pairing, I’m going to recommend…that you change your retro.</a:t>
-            </a:r>
-          </a:p>
-          <a:p>
-            <a:pPr marL="0" marR="0" lvl="0" indent="0" algn="l" defTabSz="914400" rtl="0" eaLnBrk="1" fontAlgn="auto" latinLnBrk="0" hangingPunct="1">
-              <a:lnSpc>
-                <a:spcPct val="100000"/>
-              </a:lnSpc>
-              <a:spcBef>
-                <a:spcPts val="0"/>
-              </a:spcBef>
-              <a:spcAft>
-                <a:spcPts val="0"/>
-              </a:spcAft>
-              <a:buClrTx/>
-              <a:buSzTx/>
-              <a:buFontTx/>
-              <a:buNone/>
-              <a:tabLst/>
-              <a:defRPr/>
-            </a:pPr>
-            <a:endParaRPr lang="en-US" dirty="0"/>
-          </a:p>
-          <a:p>
-            <a:pPr marL="0" marR="0" lvl="0" indent="0" algn="l" defTabSz="914400" rtl="0" eaLnBrk="1" fontAlgn="auto" latinLnBrk="0" hangingPunct="1">
-              <a:lnSpc>
-                <a:spcPct val="100000"/>
-              </a:lnSpc>
-              <a:spcBef>
-                <a:spcPts val="0"/>
-              </a:spcBef>
-              <a:spcAft>
-                <a:spcPts val="0"/>
-              </a:spcAft>
-              <a:buClrTx/>
-              <a:buSzTx/>
-              <a:buFontTx/>
-              <a:buNone/>
-              <a:tabLst/>
-              <a:defRPr/>
-            </a:pPr>
-            <a:r>
-              <a:rPr lang="en-US" dirty="0"/>
-              <a:t>Start using data and lightweight experiments in your continuous improvement process (replaces traditional retro)</a:t>
+              <a:t>These were our results.</a:t>
             </a:r>
           </a:p>
           <a:p>
@@ -1307,7 +1581,7 @@
     </p:spTree>
     <p:extLst>
       <p:ext uri="{BB962C8B-B14F-4D97-AF65-F5344CB8AC3E}">
-        <p14:creationId xmlns:p14="http://schemas.microsoft.com/office/powerpoint/2010/main" val="1178756113"/>
+        <p14:creationId xmlns:p14="http://schemas.microsoft.com/office/powerpoint/2010/main" val="3586372068"/>
       </p:ext>
     </p:extLst>
   </p:cSld>
@@ -1361,39 +1635,33 @@
           <a:bodyPr/>
           <a:lstStyle/>
           <a:p>
-            <a:r>
-              <a:rPr lang="en-US" dirty="0"/>
-              <a:t>But first let’s talk about pairing</a:t>
-            </a:r>
-          </a:p>
-          <a:p>
-            <a:endParaRPr lang="en-US" dirty="0"/>
-          </a:p>
-          <a:p>
             <a:pPr marL="171450" indent="-171450">
               <a:buFont typeface="Arial" panose="020B0604020202020204" pitchFamily="34" charset="0"/>
               <a:buChar char="•"/>
             </a:pPr>
             <a:r>
               <a:rPr lang="en-US" dirty="0"/>
-              <a:t>Walk through our results</a:t>
-            </a:r>
-          </a:p>
-          <a:p>
-            <a:pPr marL="0" lvl="0" indent="0">
+              <a:t>But most effective was also hardest.</a:t>
+            </a:r>
+          </a:p>
+          <a:p>
+            <a:pPr marL="171450" indent="-171450">
               <a:buFont typeface="Arial" panose="020B0604020202020204" pitchFamily="34" charset="0"/>
-              <a:buNone/>
+              <a:buChar char="•"/>
             </a:pPr>
-            <a:endParaRPr lang="en-US" dirty="0"/>
-          </a:p>
-          <a:p>
-            <a:pPr marL="0" lvl="0" indent="0">
+            <a:r>
+              <a:rPr lang="en-US" dirty="0"/>
+              <a:t>Team chose to use the egg timer. Not because we like pain, but because we understood the data.</a:t>
+            </a:r>
+          </a:p>
+          <a:p>
+            <a:pPr marL="171450" indent="-171450">
               <a:buFont typeface="Arial" panose="020B0604020202020204" pitchFamily="34" charset="0"/>
-              <a:buNone/>
+              <a:buChar char="•"/>
             </a:pPr>
             <a:r>
               <a:rPr lang="en-US" dirty="0"/>
-              <a:t>…so if you’re going to pair promiscuously, make sure you experiment well!</a:t>
+              <a:t>Having finished Discovery, we now needed to Improve. And that means changing habits. For which we needs support, such as tools.</a:t>
             </a:r>
           </a:p>
         </p:txBody>
@@ -1424,7 +1692,7 @@
     </p:spTree>
     <p:extLst>
       <p:ext uri="{BB962C8B-B14F-4D97-AF65-F5344CB8AC3E}">
-        <p14:creationId xmlns:p14="http://schemas.microsoft.com/office/powerpoint/2010/main" val="1966691023"/>
+        <p14:creationId xmlns:p14="http://schemas.microsoft.com/office/powerpoint/2010/main" val="1453725967"/>
       </p:ext>
     </p:extLst>
   </p:cSld>
@@ -1480,7 +1748,16 @@
           <a:p>
             <a:r>
               <a:rPr lang="en-US" dirty="0"/>
-              <a:t>Speaker notes for slide 1</a:t>
+              <a:t>There are many ways to collaborate. PR, Peer, Pair, and Ensemble all work in different contexts. Many variations on each.</a:t>
+            </a:r>
+          </a:p>
+          <a:p>
+            <a:endParaRPr lang="en-US" dirty="0"/>
+          </a:p>
+          <a:p>
+            <a:r>
+              <a:rPr lang="en-US" dirty="0"/>
+              <a:t>Intuition and ease may be misleading. Choose intentionally, based on data. And ease can be a valid factor!</a:t>
             </a:r>
           </a:p>
         </p:txBody>
@@ -1511,7 +1788,7 @@
     </p:spTree>
     <p:extLst>
       <p:ext uri="{BB962C8B-B14F-4D97-AF65-F5344CB8AC3E}">
-        <p14:creationId xmlns:p14="http://schemas.microsoft.com/office/powerpoint/2010/main" val="1605974872"/>
+        <p14:creationId xmlns:p14="http://schemas.microsoft.com/office/powerpoint/2010/main" val="2527625466"/>
       </p:ext>
     </p:extLst>
   </p:cSld>
@@ -1565,18 +1842,112 @@
           <a:bodyPr/>
           <a:lstStyle/>
           <a:p>
-            <a:r>
-              <a:rPr lang="en-US" dirty="0"/>
-              <a:t>Not really. Mob vs Promiscuous Pair vs slow Pair vs Peer vs Solo/PR feature comparison</a:t>
-            </a:r>
-          </a:p>
-          <a:p>
+            <a:pPr marL="0" marR="0" lvl="0" indent="0" algn="l" defTabSz="914400" rtl="0" eaLnBrk="1" fontAlgn="auto" latinLnBrk="0" hangingPunct="1">
+              <a:lnSpc>
+                <a:spcPct val="100000"/>
+              </a:lnSpc>
+              <a:spcBef>
+                <a:spcPts val="0"/>
+              </a:spcBef>
+              <a:spcAft>
+                <a:spcPts val="0"/>
+              </a:spcAft>
+              <a:buClrTx/>
+              <a:buSzTx/>
+              <a:buFontTx/>
+              <a:buNone/>
+              <a:tabLst/>
+              <a:defRPr/>
+            </a:pPr>
+            <a:r>
+              <a:rPr lang="en-US" dirty="0"/>
+              <a:t>Here’s where I make a recommendation about how you work.</a:t>
+            </a:r>
+          </a:p>
+          <a:p>
+            <a:pPr marL="0" marR="0" lvl="0" indent="0" algn="l" defTabSz="914400" rtl="0" eaLnBrk="1" fontAlgn="auto" latinLnBrk="0" hangingPunct="1">
+              <a:lnSpc>
+                <a:spcPct val="100000"/>
+              </a:lnSpc>
+              <a:spcBef>
+                <a:spcPts val="0"/>
+              </a:spcBef>
+              <a:spcAft>
+                <a:spcPts val="0"/>
+              </a:spcAft>
+              <a:buClrTx/>
+              <a:buSzTx/>
+              <a:buFontTx/>
+              <a:buNone/>
+              <a:tabLst/>
+              <a:defRPr/>
+            </a:pPr>
             <a:endParaRPr lang="en-US" dirty="0"/>
           </a:p>
           <a:p>
-            <a:r>
-              <a:rPr lang="en-US" dirty="0"/>
-              <a:t>But these are all generalizations. Different teams see different results. Different contexts need different things. So run the experiments yourself and choose.</a:t>
+            <a:pPr marL="0" marR="0" lvl="0" indent="0" algn="l" defTabSz="914400" rtl="0" eaLnBrk="1" fontAlgn="auto" latinLnBrk="0" hangingPunct="1">
+              <a:lnSpc>
+                <a:spcPct val="100000"/>
+              </a:lnSpc>
+              <a:spcBef>
+                <a:spcPts val="0"/>
+              </a:spcBef>
+              <a:spcAft>
+                <a:spcPts val="0"/>
+              </a:spcAft>
+              <a:buClrTx/>
+              <a:buSzTx/>
+              <a:buFontTx/>
+              <a:buNone/>
+              <a:tabLst/>
+              <a:defRPr/>
+            </a:pPr>
+            <a:r>
+              <a:rPr lang="en-US" dirty="0"/>
+              <a:t>…and because this is a talk about Pairing, I’m going to recommend…that you change your retro.</a:t>
+            </a:r>
+          </a:p>
+          <a:p>
+            <a:pPr marL="0" marR="0" lvl="0" indent="0" algn="l" defTabSz="914400" rtl="0" eaLnBrk="1" fontAlgn="auto" latinLnBrk="0" hangingPunct="1">
+              <a:lnSpc>
+                <a:spcPct val="100000"/>
+              </a:lnSpc>
+              <a:spcBef>
+                <a:spcPts val="0"/>
+              </a:spcBef>
+              <a:spcAft>
+                <a:spcPts val="0"/>
+              </a:spcAft>
+              <a:buClrTx/>
+              <a:buSzTx/>
+              <a:buFontTx/>
+              <a:buNone/>
+              <a:tabLst/>
+              <a:defRPr/>
+            </a:pPr>
+            <a:endParaRPr lang="en-US" dirty="0"/>
+          </a:p>
+          <a:p>
+            <a:pPr marL="0" marR="0" lvl="0" indent="0" algn="l" defTabSz="914400" rtl="0" eaLnBrk="1" fontAlgn="auto" latinLnBrk="0" hangingPunct="1">
+              <a:lnSpc>
+                <a:spcPct val="100000"/>
+              </a:lnSpc>
+              <a:spcBef>
+                <a:spcPts val="0"/>
+              </a:spcBef>
+              <a:spcAft>
+                <a:spcPts val="0"/>
+              </a:spcAft>
+              <a:buClrTx/>
+              <a:buSzTx/>
+              <a:buFontTx/>
+              <a:buNone/>
+              <a:tabLst/>
+              <a:defRPr/>
+            </a:pPr>
+            <a:r>
+              <a:rPr lang="en-US" dirty="0"/>
+              <a:t>Start using data and lightweight experiments in your continuous improvement process (replaces traditional retro)</a:t>
             </a:r>
           </a:p>
           <a:p>
@@ -1610,7 +1981,7 @@
     </p:spTree>
     <p:extLst>
       <p:ext uri="{BB962C8B-B14F-4D97-AF65-F5344CB8AC3E}">
-        <p14:creationId xmlns:p14="http://schemas.microsoft.com/office/powerpoint/2010/main" val="1406372321"/>
+        <p14:creationId xmlns:p14="http://schemas.microsoft.com/office/powerpoint/2010/main" val="1178756113"/>
       </p:ext>
     </p:extLst>
   </p:cSld>
@@ -1664,27 +2035,40 @@
           <a:bodyPr/>
           <a:lstStyle/>
           <a:p>
+            <a:r>
+              <a:rPr lang="en-US" dirty="0"/>
+              <a:t>But first let’s talk about pairing</a:t>
+            </a:r>
+          </a:p>
+          <a:p>
+            <a:endParaRPr lang="en-US" dirty="0"/>
+          </a:p>
+          <a:p>
             <a:pPr marL="171450" indent="-171450">
               <a:buFont typeface="Arial" panose="020B0604020202020204" pitchFamily="34" charset="0"/>
               <a:buChar char="•"/>
             </a:pPr>
             <a:r>
               <a:rPr lang="en-US" dirty="0"/>
-              <a:t>Mention MS team’s follow-up a year later</a:t>
-            </a:r>
-          </a:p>
-          <a:p>
-            <a:pPr marL="628650" lvl="1" indent="-171450">
+              <a:t>Walk through our results</a:t>
+            </a:r>
+          </a:p>
+          <a:p>
+            <a:pPr marL="0" lvl="0" indent="0">
               <a:buFont typeface="Arial" panose="020B0604020202020204" pitchFamily="34" charset="0"/>
-              <a:buChar char="•"/>
+              <a:buNone/>
             </a:pPr>
-            <a:r>
-              <a:rPr lang="en-US" dirty="0"/>
-              <a:t>Surfaced all the problems. They had a traditional continuous improvement process, so couldn’t solve the problems in real time.</a:t>
-            </a:r>
-          </a:p>
-          <a:p>
             <a:endParaRPr lang="en-US" dirty="0"/>
+          </a:p>
+          <a:p>
+            <a:pPr marL="0" lvl="0" indent="0">
+              <a:buFont typeface="Arial" panose="020B0604020202020204" pitchFamily="34" charset="0"/>
+              <a:buNone/>
+            </a:pPr>
+            <a:r>
+              <a:rPr lang="en-US" dirty="0"/>
+              <a:t>…so if you’re going to pair promiscuously, make sure you experiment well!</a:t>
+            </a:r>
           </a:p>
         </p:txBody>
       </p:sp>
@@ -1714,7 +2098,7 @@
     </p:spTree>
     <p:extLst>
       <p:ext uri="{BB962C8B-B14F-4D97-AF65-F5344CB8AC3E}">
-        <p14:creationId xmlns:p14="http://schemas.microsoft.com/office/powerpoint/2010/main" val="1704017679"/>
+        <p14:creationId xmlns:p14="http://schemas.microsoft.com/office/powerpoint/2010/main" val="1966691023"/>
       </p:ext>
     </p:extLst>
   </p:cSld>
@@ -1770,19 +2154,7 @@
           <a:p>
             <a:r>
               <a:rPr lang="en-US" dirty="0"/>
-              <a:t>4 parts of changing something: identify problem, generate ideas, decide among them, implement them (partially), verify them.</a:t>
-            </a:r>
-          </a:p>
-          <a:p>
-            <a:r>
-              <a:rPr lang="en-US" dirty="0"/>
-              <a:t>4 common orderings: governance, retro, stage magic, and experiment.</a:t>
-            </a:r>
-          </a:p>
-          <a:p>
-            <a:r>
-              <a:rPr lang="en-US" dirty="0"/>
-              <a:t>Governance and retro are similar, but governance does first 3 steps in different context from last 2. And both governance and retro often skip verify – leading to silent success &amp; failure.</a:t>
+              <a:t>Speaker notes for slide 1</a:t>
             </a:r>
           </a:p>
         </p:txBody>
@@ -1813,7 +2185,7 @@
     </p:spTree>
     <p:extLst>
       <p:ext uri="{BB962C8B-B14F-4D97-AF65-F5344CB8AC3E}">
-        <p14:creationId xmlns:p14="http://schemas.microsoft.com/office/powerpoint/2010/main" val="3169776868"/>
+        <p14:creationId xmlns:p14="http://schemas.microsoft.com/office/powerpoint/2010/main" val="1605974872"/>
       </p:ext>
     </p:extLst>
   </p:cSld>
@@ -1869,96 +2241,20 @@
           <a:p>
             <a:r>
               <a:rPr lang="en-US" dirty="0"/>
-              <a:t>Scientific Method</a:t>
-            </a:r>
-          </a:p>
-          <a:p>
-            <a:r>
-              <a:rPr lang="en-US" dirty="0"/>
-              <a:t>Social experiments</a:t>
-            </a:r>
-          </a:p>
-          <a:p>
-            <a:r>
-              <a:rPr lang="en-US" dirty="0"/>
-              <a:t>Goal: maximize learning, not success. Even if it means intentionally doing the wrong thing – Wordle example.</a:t>
-            </a:r>
-          </a:p>
-          <a:p>
-            <a:r>
-              <a:rPr lang="en-US" dirty="0"/>
-              <a:t>Avoid obvious invalidity problems</a:t>
-            </a:r>
-          </a:p>
-          <a:p>
-            <a:pPr marL="171450" indent="-171450">
-              <a:buFont typeface="Arial" panose="020B0604020202020204" pitchFamily="34" charset="0"/>
-              <a:buChar char="•"/>
-            </a:pPr>
-            <a:r>
-              <a:rPr lang="en-US" dirty="0"/>
-              <a:t>Test multiple options, including the current state</a:t>
-            </a:r>
-          </a:p>
-          <a:p>
-            <a:pPr marL="171450" indent="-171450">
-              <a:buFont typeface="Arial" panose="020B0604020202020204" pitchFamily="34" charset="0"/>
-              <a:buChar char="•"/>
-            </a:pPr>
-            <a:r>
-              <a:rPr lang="en-US" dirty="0"/>
-              <a:t>Vary details within the practice</a:t>
-            </a:r>
-          </a:p>
-          <a:p>
-            <a:pPr marL="171450" indent="-171450">
-              <a:buFont typeface="Arial" panose="020B0604020202020204" pitchFamily="34" charset="0"/>
-              <a:buChar char="•"/>
-            </a:pPr>
-            <a:r>
-              <a:rPr lang="en-US" dirty="0"/>
-              <a:t>Use qualitative and quantitative measures</a:t>
-            </a:r>
-          </a:p>
-          <a:p>
-            <a:pPr marL="171450" indent="-171450">
-              <a:buFont typeface="Arial" panose="020B0604020202020204" pitchFamily="34" charset="0"/>
-              <a:buChar char="•"/>
-            </a:pPr>
-            <a:r>
-              <a:rPr lang="en-US" dirty="0"/>
-              <a:t>Measure one level up and out when possible</a:t>
-            </a:r>
-          </a:p>
-          <a:p>
-            <a:pPr marL="171450" indent="-171450">
-              <a:buFont typeface="Arial" panose="020B0604020202020204" pitchFamily="34" charset="0"/>
-              <a:buChar char="•"/>
-            </a:pPr>
-            <a:r>
-              <a:rPr lang="en-US" dirty="0"/>
-              <a:t>Measure invariants, to see if they do vary</a:t>
-            </a:r>
-          </a:p>
-          <a:p>
-            <a:pPr marL="171450" indent="-171450">
-              <a:buFont typeface="Arial" panose="020B0604020202020204" pitchFamily="34" charset="0"/>
-              <a:buChar char="•"/>
-            </a:pPr>
-            <a:r>
-              <a:rPr lang="en-US" dirty="0"/>
-              <a:t>Write down the results in real-time, not in a retro after</a:t>
-            </a:r>
-          </a:p>
-          <a:p>
-            <a:pPr marL="171450" indent="-171450">
-              <a:buFont typeface="Arial" panose="020B0604020202020204" pitchFamily="34" charset="0"/>
-              <a:buChar char="•"/>
-            </a:pPr>
-            <a:r>
-              <a:rPr lang="en-US" dirty="0"/>
-              <a:t>Don’t adopt anything; try everything</a:t>
-            </a:r>
+              <a:t>Not really. Mob vs Promiscuous Pair vs slow Pair vs Peer vs Solo/PR feature comparison</a:t>
+            </a:r>
+          </a:p>
+          <a:p>
+            <a:endParaRPr lang="en-US" dirty="0"/>
+          </a:p>
+          <a:p>
+            <a:r>
+              <a:rPr lang="en-US" dirty="0"/>
+              <a:t>But these are all generalizations. Different teams see different results. Different contexts need different things. So run the experiments yourself and choose.</a:t>
+            </a:r>
+          </a:p>
+          <a:p>
+            <a:endParaRPr lang="en-US" dirty="0"/>
           </a:p>
         </p:txBody>
       </p:sp>
@@ -1988,7 +2284,7 @@
     </p:spTree>
     <p:extLst>
       <p:ext uri="{BB962C8B-B14F-4D97-AF65-F5344CB8AC3E}">
-        <p14:creationId xmlns:p14="http://schemas.microsoft.com/office/powerpoint/2010/main" val="1136876532"/>
+        <p14:creationId xmlns:p14="http://schemas.microsoft.com/office/powerpoint/2010/main" val="1406372321"/>
       </p:ext>
     </p:extLst>
   </p:cSld>
@@ -4712,7 +5008,7 @@
           <p:cNvPr id="2" name="Title 1">
             <a:extLst>
               <a:ext uri="{FF2B5EF4-FFF2-40B4-BE49-F238E27FC236}">
-                <a16:creationId xmlns:a16="http://schemas.microsoft.com/office/drawing/2014/main" id="{E66FDEC9-024F-6212-4D66-375FD1458F48}"/>
+                <a16:creationId xmlns:a16="http://schemas.microsoft.com/office/drawing/2014/main" id="{B572B785-6703-3C29-FECB-15C747C60C8A}"/>
               </a:ext>
             </a:extLst>
           </p:cNvPr>
@@ -4725,12 +5021,14 @@
         </p:nvSpPr>
         <p:spPr/>
         <p:txBody>
-          <a:bodyPr/>
-          <a:lstStyle/>
-          <a:p>
-            <a:r>
-              <a:rPr lang="en-US" dirty="0"/>
-              <a:t>Discovering</a:t>
+          <a:bodyPr>
+            <a:normAutofit fontScale="90000"/>
+          </a:bodyPr>
+          <a:lstStyle/>
+          <a:p>
+            <a:r>
+              <a:rPr lang="en-US" dirty="0"/>
+              <a:t>Isn’t This Obsoleted by Ensemble (Mob) Programming?</a:t>
             </a:r>
           </a:p>
         </p:txBody>
@@ -4740,7 +5038,7 @@
           <p:cNvPr id="3" name="Content Placeholder 2">
             <a:extLst>
               <a:ext uri="{FF2B5EF4-FFF2-40B4-BE49-F238E27FC236}">
-                <a16:creationId xmlns:a16="http://schemas.microsoft.com/office/drawing/2014/main" id="{DE65B0D9-3553-0873-9064-905082CFEF76}"/>
+                <a16:creationId xmlns:a16="http://schemas.microsoft.com/office/drawing/2014/main" id="{DD1C81B1-188A-24B0-27EF-64CCEBD3D9B0}"/>
               </a:ext>
             </a:extLst>
           </p:cNvPr>
@@ -4763,7 +5061,7 @@
     </p:spTree>
     <p:extLst>
       <p:ext uri="{BB962C8B-B14F-4D97-AF65-F5344CB8AC3E}">
-        <p14:creationId xmlns:p14="http://schemas.microsoft.com/office/powerpoint/2010/main" val="2690004034"/>
+        <p14:creationId xmlns:p14="http://schemas.microsoft.com/office/powerpoint/2010/main" val="3051419815"/>
       </p:ext>
     </p:extLst>
   </p:cSld>
@@ -4795,7 +5093,7 @@
           <p:cNvPr id="2" name="Title 1">
             <a:extLst>
               <a:ext uri="{FF2B5EF4-FFF2-40B4-BE49-F238E27FC236}">
-                <a16:creationId xmlns:a16="http://schemas.microsoft.com/office/drawing/2014/main" id="{026E08C8-8B95-0BDE-BA2D-EDDA96924B22}"/>
+                <a16:creationId xmlns:a16="http://schemas.microsoft.com/office/drawing/2014/main" id="{8E58E2DE-F5FD-3140-5A61-B412D8CA73A3}"/>
               </a:ext>
             </a:extLst>
           </p:cNvPr>
@@ -4813,7 +5111,7 @@
           <a:p>
             <a:r>
               <a:rPr lang="en-US" dirty="0"/>
-              <a:t>Improving</a:t>
+              <a:t>Other Teams</a:t>
             </a:r>
           </a:p>
         </p:txBody>
@@ -4823,7 +5121,7 @@
           <p:cNvPr id="3" name="Content Placeholder 2">
             <a:extLst>
               <a:ext uri="{FF2B5EF4-FFF2-40B4-BE49-F238E27FC236}">
-                <a16:creationId xmlns:a16="http://schemas.microsoft.com/office/drawing/2014/main" id="{30F458B9-3214-61F6-F55C-FBE49373D5A2}"/>
+                <a16:creationId xmlns:a16="http://schemas.microsoft.com/office/drawing/2014/main" id="{029742FA-6076-CB5B-5535-835CA0BB86EF}"/>
               </a:ext>
             </a:extLst>
           </p:cNvPr>
@@ -4846,7 +5144,7 @@
     </p:spTree>
     <p:extLst>
       <p:ext uri="{BB962C8B-B14F-4D97-AF65-F5344CB8AC3E}">
-        <p14:creationId xmlns:p14="http://schemas.microsoft.com/office/powerpoint/2010/main" val="1315325954"/>
+        <p14:creationId xmlns:p14="http://schemas.microsoft.com/office/powerpoint/2010/main" val="310654357"/>
       </p:ext>
     </p:extLst>
   </p:cSld>
@@ -4878,7 +5176,7 @@
           <p:cNvPr id="2" name="Title 1">
             <a:extLst>
               <a:ext uri="{FF2B5EF4-FFF2-40B4-BE49-F238E27FC236}">
-                <a16:creationId xmlns:a16="http://schemas.microsoft.com/office/drawing/2014/main" id="{A08C284F-8E83-1FFC-600E-6A88764C3599}"/>
+                <a16:creationId xmlns:a16="http://schemas.microsoft.com/office/drawing/2014/main" id="{F60437D5-A077-3862-5946-B85E45CB6D8A}"/>
               </a:ext>
             </a:extLst>
           </p:cNvPr>
@@ -4896,7 +5194,7 @@
           <a:p>
             <a:r>
               <a:rPr lang="en-US" dirty="0"/>
-              <a:t>Structure: overview</a:t>
+              <a:t>Change Patterns</a:t>
             </a:r>
           </a:p>
         </p:txBody>
@@ -4906,7 +5204,7 @@
           <p:cNvPr id="3" name="Content Placeholder 2">
             <a:extLst>
               <a:ext uri="{FF2B5EF4-FFF2-40B4-BE49-F238E27FC236}">
-                <a16:creationId xmlns:a16="http://schemas.microsoft.com/office/drawing/2014/main" id="{5A7E2A3B-6C6F-E699-3514-508DC738D209}"/>
+                <a16:creationId xmlns:a16="http://schemas.microsoft.com/office/drawing/2014/main" id="{90CC9237-F36E-A920-F3B0-3AA6B669758E}"/>
               </a:ext>
             </a:extLst>
           </p:cNvPr>
@@ -4929,7 +5227,7 @@
     </p:spTree>
     <p:extLst>
       <p:ext uri="{BB962C8B-B14F-4D97-AF65-F5344CB8AC3E}">
-        <p14:creationId xmlns:p14="http://schemas.microsoft.com/office/powerpoint/2010/main" val="1571871775"/>
+        <p14:creationId xmlns:p14="http://schemas.microsoft.com/office/powerpoint/2010/main" val="3639305127"/>
       </p:ext>
     </p:extLst>
   </p:cSld>
@@ -4961,7 +5259,7 @@
           <p:cNvPr id="2" name="Title 1">
             <a:extLst>
               <a:ext uri="{FF2B5EF4-FFF2-40B4-BE49-F238E27FC236}">
-                <a16:creationId xmlns:a16="http://schemas.microsoft.com/office/drawing/2014/main" id="{3C7AF96F-753D-CBFB-A2E8-E9890411F0C8}"/>
+                <a16:creationId xmlns:a16="http://schemas.microsoft.com/office/drawing/2014/main" id="{E66FDEC9-024F-6212-4D66-375FD1458F48}"/>
               </a:ext>
             </a:extLst>
           </p:cNvPr>
@@ -4979,7 +5277,7 @@
           <a:p>
             <a:r>
               <a:rPr lang="en-US" dirty="0"/>
-              <a:t>Discovery – how-to</a:t>
+              <a:t>Discovering</a:t>
             </a:r>
           </a:p>
         </p:txBody>
@@ -4989,7 +5287,7 @@
           <p:cNvPr id="3" name="Content Placeholder 2">
             <a:extLst>
               <a:ext uri="{FF2B5EF4-FFF2-40B4-BE49-F238E27FC236}">
-                <a16:creationId xmlns:a16="http://schemas.microsoft.com/office/drawing/2014/main" id="{F2D78617-A0C6-D616-97BF-07B84D07CFE1}"/>
+                <a16:creationId xmlns:a16="http://schemas.microsoft.com/office/drawing/2014/main" id="{DE65B0D9-3553-0873-9064-905082CFEF76}"/>
               </a:ext>
             </a:extLst>
           </p:cNvPr>
@@ -5012,7 +5310,7 @@
     </p:spTree>
     <p:extLst>
       <p:ext uri="{BB962C8B-B14F-4D97-AF65-F5344CB8AC3E}">
-        <p14:creationId xmlns:p14="http://schemas.microsoft.com/office/powerpoint/2010/main" val="2811714190"/>
+        <p14:creationId xmlns:p14="http://schemas.microsoft.com/office/powerpoint/2010/main" val="2690004034"/>
       </p:ext>
     </p:extLst>
   </p:cSld>
@@ -5044,7 +5342,7 @@
           <p:cNvPr id="2" name="Title 1">
             <a:extLst>
               <a:ext uri="{FF2B5EF4-FFF2-40B4-BE49-F238E27FC236}">
-                <a16:creationId xmlns:a16="http://schemas.microsoft.com/office/drawing/2014/main" id="{77C8A617-1C2E-68FB-4C49-7538F0B53927}"/>
+                <a16:creationId xmlns:a16="http://schemas.microsoft.com/office/drawing/2014/main" id="{026E08C8-8B95-0BDE-BA2D-EDDA96924B22}"/>
               </a:ext>
             </a:extLst>
           </p:cNvPr>
@@ -5062,7 +5360,7 @@
           <a:p>
             <a:r>
               <a:rPr lang="en-US" dirty="0"/>
-              <a:t>Improvement – how-to</a:t>
+              <a:t>Improving</a:t>
             </a:r>
           </a:p>
         </p:txBody>
@@ -5072,7 +5370,7 @@
           <p:cNvPr id="3" name="Content Placeholder 2">
             <a:extLst>
               <a:ext uri="{FF2B5EF4-FFF2-40B4-BE49-F238E27FC236}">
-                <a16:creationId xmlns:a16="http://schemas.microsoft.com/office/drawing/2014/main" id="{BFEEF9B7-7A3B-968D-BF69-7498A8D0AC2E}"/>
+                <a16:creationId xmlns:a16="http://schemas.microsoft.com/office/drawing/2014/main" id="{30F458B9-3214-61F6-F55C-FBE49373D5A2}"/>
               </a:ext>
             </a:extLst>
           </p:cNvPr>
@@ -5088,29 +5386,14 @@
           <a:bodyPr/>
           <a:lstStyle/>
           <a:p>
-            <a:r>
-              <a:rPr lang="en-US" dirty="0"/>
-              <a:t>Focus on habits &amp; fluency</a:t>
-            </a:r>
-          </a:p>
-          <a:p>
-            <a:r>
-              <a:rPr lang="en-US" dirty="0"/>
-              <a:t>Start by getting to consistency</a:t>
-            </a:r>
-          </a:p>
-          <a:p>
-            <a:r>
-              <a:rPr lang="en-US" dirty="0"/>
-              <a:t>Then refine the habit</a:t>
-            </a:r>
+            <a:endParaRPr lang="en-US"/>
           </a:p>
         </p:txBody>
       </p:sp>
     </p:spTree>
     <p:extLst>
       <p:ext uri="{BB962C8B-B14F-4D97-AF65-F5344CB8AC3E}">
-        <p14:creationId xmlns:p14="http://schemas.microsoft.com/office/powerpoint/2010/main" val="4125958910"/>
+        <p14:creationId xmlns:p14="http://schemas.microsoft.com/office/powerpoint/2010/main" val="1315325954"/>
       </p:ext>
     </p:extLst>
   </p:cSld>
@@ -5142,7 +5425,7 @@
           <p:cNvPr id="2" name="Title 1">
             <a:extLst>
               <a:ext uri="{FF2B5EF4-FFF2-40B4-BE49-F238E27FC236}">
-                <a16:creationId xmlns:a16="http://schemas.microsoft.com/office/drawing/2014/main" id="{9F201C76-E7A8-D58E-C3C7-15CBAD5FAC34}"/>
+                <a16:creationId xmlns:a16="http://schemas.microsoft.com/office/drawing/2014/main" id="{A08C284F-8E83-1FFC-600E-6A88764C3599}"/>
               </a:ext>
             </a:extLst>
           </p:cNvPr>
@@ -5160,7 +5443,7 @@
           <a:p>
             <a:r>
               <a:rPr lang="en-US" dirty="0"/>
-              <a:t>Week structure</a:t>
+              <a:t>Structure: overview</a:t>
             </a:r>
           </a:p>
         </p:txBody>
@@ -5170,7 +5453,7 @@
           <p:cNvPr id="3" name="Content Placeholder 2">
             <a:extLst>
               <a:ext uri="{FF2B5EF4-FFF2-40B4-BE49-F238E27FC236}">
-                <a16:creationId xmlns:a16="http://schemas.microsoft.com/office/drawing/2014/main" id="{39130E3B-2AFE-B589-182D-A44AC9DA4649}"/>
+                <a16:creationId xmlns:a16="http://schemas.microsoft.com/office/drawing/2014/main" id="{5A7E2A3B-6C6F-E699-3514-508DC738D209}"/>
               </a:ext>
             </a:extLst>
           </p:cNvPr>
@@ -5186,44 +5469,14 @@
           <a:bodyPr/>
           <a:lstStyle/>
           <a:p>
-            <a:r>
-              <a:rPr lang="en-US" dirty="0"/>
-              <a:t>Retro (planning portion): longs &amp; shorts</a:t>
-            </a:r>
-          </a:p>
-          <a:p>
-            <a:r>
-              <a:rPr lang="en-US" dirty="0"/>
-              <a:t>Discover 1 thing + Improve 0-1, or</a:t>
-            </a:r>
-          </a:p>
-          <a:p>
-            <a:r>
-              <a:rPr lang="en-US" dirty="0"/>
-              <a:t>Discover 0 things + Improve 1-3</a:t>
-            </a:r>
-          </a:p>
-          <a:p>
-            <a:r>
-              <a:rPr lang="en-US" dirty="0"/>
-              <a:t>Retro (demo portion) analyze results, make decisions</a:t>
-            </a:r>
-          </a:p>
-          <a:p>
-            <a:endParaRPr lang="en-US" dirty="0"/>
-          </a:p>
-          <a:p>
-            <a:r>
-              <a:rPr lang="en-US" dirty="0"/>
-              <a:t>Note: this means your improvement week starts/ends about 10 min into your retro meeting!</a:t>
-            </a:r>
+            <a:endParaRPr lang="en-US"/>
           </a:p>
         </p:txBody>
       </p:sp>
     </p:spTree>
     <p:extLst>
       <p:ext uri="{BB962C8B-B14F-4D97-AF65-F5344CB8AC3E}">
-        <p14:creationId xmlns:p14="http://schemas.microsoft.com/office/powerpoint/2010/main" val="1956938991"/>
+        <p14:creationId xmlns:p14="http://schemas.microsoft.com/office/powerpoint/2010/main" val="1571871775"/>
       </p:ext>
     </p:extLst>
   </p:cSld>
@@ -5255,7 +5508,7 @@
           <p:cNvPr id="2" name="Title 1">
             <a:extLst>
               <a:ext uri="{FF2B5EF4-FFF2-40B4-BE49-F238E27FC236}">
-                <a16:creationId xmlns:a16="http://schemas.microsoft.com/office/drawing/2014/main" id="{337547C3-A153-778D-BE32-B8F90668A1A8}"/>
+                <a16:creationId xmlns:a16="http://schemas.microsoft.com/office/drawing/2014/main" id="{3C7AF96F-753D-CBFB-A2E8-E9890411F0C8}"/>
               </a:ext>
             </a:extLst>
           </p:cNvPr>
@@ -5273,7 +5526,7 @@
           <a:p>
             <a:r>
               <a:rPr lang="en-US" dirty="0"/>
-              <a:t>Your Collaboration Style</a:t>
+              <a:t>Discovery – how-to</a:t>
             </a:r>
           </a:p>
         </p:txBody>
@@ -5283,7 +5536,7 @@
           <p:cNvPr id="3" name="Content Placeholder 2">
             <a:extLst>
               <a:ext uri="{FF2B5EF4-FFF2-40B4-BE49-F238E27FC236}">
-                <a16:creationId xmlns:a16="http://schemas.microsoft.com/office/drawing/2014/main" id="{343FC8CF-C9F8-C55F-E0FA-74260E322EB2}"/>
+                <a16:creationId xmlns:a16="http://schemas.microsoft.com/office/drawing/2014/main" id="{F2D78617-A0C6-D616-97BF-07B84D07CFE1}"/>
               </a:ext>
             </a:extLst>
           </p:cNvPr>
@@ -5306,7 +5559,7 @@
     </p:spTree>
     <p:extLst>
       <p:ext uri="{BB962C8B-B14F-4D97-AF65-F5344CB8AC3E}">
-        <p14:creationId xmlns:p14="http://schemas.microsoft.com/office/powerpoint/2010/main" val="1384430317"/>
+        <p14:creationId xmlns:p14="http://schemas.microsoft.com/office/powerpoint/2010/main" val="2811714190"/>
       </p:ext>
     </p:extLst>
   </p:cSld>
@@ -5338,7 +5591,7 @@
           <p:cNvPr id="2" name="Title 1">
             <a:extLst>
               <a:ext uri="{FF2B5EF4-FFF2-40B4-BE49-F238E27FC236}">
-                <a16:creationId xmlns:a16="http://schemas.microsoft.com/office/drawing/2014/main" id="{71CA4DAE-8F1F-10EB-FEF0-7F132A28860E}"/>
+                <a16:creationId xmlns:a16="http://schemas.microsoft.com/office/drawing/2014/main" id="{77C8A617-1C2E-68FB-4C49-7538F0B53927}"/>
               </a:ext>
             </a:extLst>
           </p:cNvPr>
@@ -5351,14 +5604,12 @@
         </p:nvSpPr>
         <p:spPr/>
         <p:txBody>
-          <a:bodyPr>
-            <a:normAutofit/>
-          </a:bodyPr>
-          <a:lstStyle/>
-          <a:p>
-            <a:r>
-              <a:rPr lang="en-US" dirty="0"/>
-              <a:t>First Next Step: Swap your Retro</a:t>
+          <a:bodyPr/>
+          <a:lstStyle/>
+          <a:p>
+            <a:r>
+              <a:rPr lang="en-US" dirty="0"/>
+              <a:t>Improvement – how-to</a:t>
             </a:r>
           </a:p>
         </p:txBody>
@@ -5368,7 +5619,7 @@
           <p:cNvPr id="3" name="Content Placeholder 2">
             <a:extLst>
               <a:ext uri="{FF2B5EF4-FFF2-40B4-BE49-F238E27FC236}">
-                <a16:creationId xmlns:a16="http://schemas.microsoft.com/office/drawing/2014/main" id="{FCD0505E-6A36-CBC3-30DB-1ED5D15BFE62}"/>
+                <a16:creationId xmlns:a16="http://schemas.microsoft.com/office/drawing/2014/main" id="{BFEEF9B7-7A3B-968D-BF69-7498A8D0AC2E}"/>
               </a:ext>
             </a:extLst>
           </p:cNvPr>
@@ -5384,14 +5635,29 @@
           <a:bodyPr/>
           <a:lstStyle/>
           <a:p>
-            <a:endParaRPr lang="en-US"/>
+            <a:r>
+              <a:rPr lang="en-US" dirty="0"/>
+              <a:t>Focus on habits &amp; fluency</a:t>
+            </a:r>
+          </a:p>
+          <a:p>
+            <a:r>
+              <a:rPr lang="en-US" dirty="0"/>
+              <a:t>Start by getting to consistency</a:t>
+            </a:r>
+          </a:p>
+          <a:p>
+            <a:r>
+              <a:rPr lang="en-US" dirty="0"/>
+              <a:t>Then refine the habit</a:t>
+            </a:r>
           </a:p>
         </p:txBody>
       </p:sp>
     </p:spTree>
     <p:extLst>
       <p:ext uri="{BB962C8B-B14F-4D97-AF65-F5344CB8AC3E}">
-        <p14:creationId xmlns:p14="http://schemas.microsoft.com/office/powerpoint/2010/main" val="672966753"/>
+        <p14:creationId xmlns:p14="http://schemas.microsoft.com/office/powerpoint/2010/main" val="4125958910"/>
       </p:ext>
     </p:extLst>
   </p:cSld>
@@ -5423,7 +5689,7 @@
           <p:cNvPr id="2" name="Title 1">
             <a:extLst>
               <a:ext uri="{FF2B5EF4-FFF2-40B4-BE49-F238E27FC236}">
-                <a16:creationId xmlns:a16="http://schemas.microsoft.com/office/drawing/2014/main" id="{0CCB2085-43F4-8573-398A-7B670AF76D43}"/>
+                <a16:creationId xmlns:a16="http://schemas.microsoft.com/office/drawing/2014/main" id="{9F201C76-E7A8-D58E-C3C7-15CBAD5FAC34}"/>
               </a:ext>
             </a:extLst>
           </p:cNvPr>
@@ -5441,7 +5707,7 @@
           <a:p>
             <a:r>
               <a:rPr lang="en-US" dirty="0"/>
-              <a:t>Ask me Anything / Resources</a:t>
+              <a:t>Week structure</a:t>
             </a:r>
           </a:p>
         </p:txBody>
@@ -5451,7 +5717,7 @@
           <p:cNvPr id="3" name="Content Placeholder 2">
             <a:extLst>
               <a:ext uri="{FF2B5EF4-FFF2-40B4-BE49-F238E27FC236}">
-                <a16:creationId xmlns:a16="http://schemas.microsoft.com/office/drawing/2014/main" id="{746B55EF-4D2A-2F22-DDE7-390086895E65}"/>
+                <a16:creationId xmlns:a16="http://schemas.microsoft.com/office/drawing/2014/main" id="{39130E3B-2AFE-B589-182D-A44AC9DA4649}"/>
               </a:ext>
             </a:extLst>
           </p:cNvPr>
@@ -5469,7 +5735,34 @@
           <a:p>
             <a:r>
               <a:rPr lang="en-US" dirty="0"/>
-              <a:t>QR code</a:t>
+              <a:t>Retro (planning portion): longs &amp; shorts</a:t>
+            </a:r>
+          </a:p>
+          <a:p>
+            <a:r>
+              <a:rPr lang="en-US" dirty="0"/>
+              <a:t>Discover 1 thing + Improve 0-1, or</a:t>
+            </a:r>
+          </a:p>
+          <a:p>
+            <a:r>
+              <a:rPr lang="en-US" dirty="0"/>
+              <a:t>Discover 0 things + Improve 1-3</a:t>
+            </a:r>
+          </a:p>
+          <a:p>
+            <a:r>
+              <a:rPr lang="en-US" dirty="0"/>
+              <a:t>Retro (demo portion) analyze results, make decisions</a:t>
+            </a:r>
+          </a:p>
+          <a:p>
+            <a:endParaRPr lang="en-US" dirty="0"/>
+          </a:p>
+          <a:p>
+            <a:r>
+              <a:rPr lang="en-US" dirty="0"/>
+              <a:t>Note: this means your improvement week starts/ends about 10 min into your retro meeting!</a:t>
             </a:r>
           </a:p>
         </p:txBody>
@@ -5477,7 +5770,90 @@
     </p:spTree>
     <p:extLst>
       <p:ext uri="{BB962C8B-B14F-4D97-AF65-F5344CB8AC3E}">
-        <p14:creationId xmlns:p14="http://schemas.microsoft.com/office/powerpoint/2010/main" val="3303992412"/>
+        <p14:creationId xmlns:p14="http://schemas.microsoft.com/office/powerpoint/2010/main" val="1956938991"/>
+      </p:ext>
+    </p:extLst>
+  </p:cSld>
+  <p:clrMapOvr>
+    <a:masterClrMapping/>
+  </p:clrMapOvr>
+</p:sld>
+</file>
+
+<file path=ppt/slides/slide19.xml><?xml version="1.0" encoding="utf-8"?>
+<p:sld xmlns:a="http://schemas.openxmlformats.org/drawingml/2006/main" xmlns:r="http://schemas.openxmlformats.org/officeDocument/2006/relationships" xmlns:p="http://schemas.openxmlformats.org/presentationml/2006/main">
+  <p:cSld>
+    <p:spTree>
+      <p:nvGrpSpPr>
+        <p:cNvPr id="1" name=""/>
+        <p:cNvGrpSpPr/>
+        <p:nvPr/>
+      </p:nvGrpSpPr>
+      <p:grpSpPr>
+        <a:xfrm>
+          <a:off x="0" y="0"/>
+          <a:ext cx="0" cy="0"/>
+          <a:chOff x="0" y="0"/>
+          <a:chExt cx="0" cy="0"/>
+        </a:xfrm>
+      </p:grpSpPr>
+      <p:sp>
+        <p:nvSpPr>
+          <p:cNvPr id="2" name="Title 1">
+            <a:extLst>
+              <a:ext uri="{FF2B5EF4-FFF2-40B4-BE49-F238E27FC236}">
+                <a16:creationId xmlns:a16="http://schemas.microsoft.com/office/drawing/2014/main" id="{337547C3-A153-778D-BE32-B8F90668A1A8}"/>
+              </a:ext>
+            </a:extLst>
+          </p:cNvPr>
+          <p:cNvSpPr>
+            <a:spLocks noGrp="1"/>
+          </p:cNvSpPr>
+          <p:nvPr>
+            <p:ph type="title"/>
+          </p:nvPr>
+        </p:nvSpPr>
+        <p:spPr/>
+        <p:txBody>
+          <a:bodyPr/>
+          <a:lstStyle/>
+          <a:p>
+            <a:r>
+              <a:rPr lang="en-US" dirty="0"/>
+              <a:t>Your Collaboration Style</a:t>
+            </a:r>
+          </a:p>
+        </p:txBody>
+      </p:sp>
+      <p:sp>
+        <p:nvSpPr>
+          <p:cNvPr id="3" name="Content Placeholder 2">
+            <a:extLst>
+              <a:ext uri="{FF2B5EF4-FFF2-40B4-BE49-F238E27FC236}">
+                <a16:creationId xmlns:a16="http://schemas.microsoft.com/office/drawing/2014/main" id="{343FC8CF-C9F8-C55F-E0FA-74260E322EB2}"/>
+              </a:ext>
+            </a:extLst>
+          </p:cNvPr>
+          <p:cNvSpPr>
+            <a:spLocks noGrp="1"/>
+          </p:cNvSpPr>
+          <p:nvPr>
+            <p:ph idx="1"/>
+          </p:nvPr>
+        </p:nvSpPr>
+        <p:spPr/>
+        <p:txBody>
+          <a:bodyPr/>
+          <a:lstStyle/>
+          <a:p>
+            <a:endParaRPr lang="en-US"/>
+          </a:p>
+        </p:txBody>
+      </p:sp>
+    </p:spTree>
+    <p:extLst>
+      <p:ext uri="{BB962C8B-B14F-4D97-AF65-F5344CB8AC3E}">
+        <p14:creationId xmlns:p14="http://schemas.microsoft.com/office/powerpoint/2010/main" val="1384430317"/>
       </p:ext>
     </p:extLst>
   </p:cSld>
@@ -5504,91 +5880,228 @@
           <a:chExt cx="0" cy="0"/>
         </a:xfrm>
       </p:grpSpPr>
-      <p:sp>
-        <p:nvSpPr>
-          <p:cNvPr id="2" name="Title 1">
-            <a:extLst>
-              <a:ext uri="{FF2B5EF4-FFF2-40B4-BE49-F238E27FC236}">
-                <a16:creationId xmlns:a16="http://schemas.microsoft.com/office/drawing/2014/main" id="{EBE9E6D3-61EB-7A28-2129-DEE8B5EDFBEE}"/>
-              </a:ext>
-            </a:extLst>
-          </p:cNvPr>
-          <p:cNvSpPr>
-            <a:spLocks noGrp="1"/>
-          </p:cNvSpPr>
-          <p:nvPr>
-            <p:ph type="title"/>
-          </p:nvPr>
-        </p:nvSpPr>
-        <p:spPr/>
-        <p:txBody>
-          <a:bodyPr/>
-          <a:lstStyle/>
-          <a:p>
-            <a:endParaRPr lang="en-US"/>
-          </a:p>
-        </p:txBody>
-      </p:sp>
-      <p:sp>
-        <p:nvSpPr>
-          <p:cNvPr id="3" name="Content Placeholder 2">
-            <a:extLst>
-              <a:ext uri="{FF2B5EF4-FFF2-40B4-BE49-F238E27FC236}">
-                <a16:creationId xmlns:a16="http://schemas.microsoft.com/office/drawing/2014/main" id="{5EE111E0-D1BE-5C18-7BB8-29E9C671F396}"/>
-              </a:ext>
-            </a:extLst>
-          </p:cNvPr>
-          <p:cNvSpPr>
-            <a:spLocks noGrp="1"/>
-          </p:cNvSpPr>
-          <p:nvPr>
-            <p:ph idx="1"/>
-          </p:nvPr>
-        </p:nvSpPr>
-        <p:spPr/>
-        <p:txBody>
-          <a:bodyPr/>
-          <a:lstStyle/>
-          <a:p>
-            <a:r>
-              <a:rPr lang="en-US" dirty="0"/>
-              <a:t>This will become multiple slides:</a:t>
-            </a:r>
-          </a:p>
-          <a:p>
-            <a:pPr lvl="1"/>
-            <a:r>
-              <a:rPr lang="en-US" dirty="0"/>
-              <a:t>Egg timer</a:t>
-            </a:r>
-          </a:p>
-          <a:p>
-            <a:pPr lvl="1"/>
-            <a:r>
-              <a:rPr lang="en-US" dirty="0"/>
-              <a:t>XP white book</a:t>
-            </a:r>
-          </a:p>
-          <a:p>
-            <a:pPr lvl="1"/>
-            <a:r>
-              <a:rPr lang="en-US" dirty="0"/>
-              <a:t>Our results</a:t>
-            </a:r>
-          </a:p>
-          <a:p>
-            <a:pPr lvl="1"/>
-            <a:r>
-              <a:rPr lang="en-US" dirty="0"/>
-              <a:t>Our results + egg timer</a:t>
-            </a:r>
-          </a:p>
-        </p:txBody>
-      </p:sp>
+      <p:pic>
+        <p:nvPicPr>
+          <p:cNvPr id="1026" name="Picture 2" descr="2 HOUR MECHANICAL TIMER - Woodbridge Kitchen Company">
+            <a:extLst>
+              <a:ext uri="{FF2B5EF4-FFF2-40B4-BE49-F238E27FC236}">
+                <a16:creationId xmlns:a16="http://schemas.microsoft.com/office/drawing/2014/main" id="{BAC1DFD1-32DE-4169-861B-C003F3005C8A}"/>
+              </a:ext>
+            </a:extLst>
+          </p:cNvPr>
+          <p:cNvPicPr>
+            <a:picLocks noChangeAspect="1" noChangeArrowheads="1"/>
+          </p:cNvPicPr>
+          <p:nvPr/>
+        </p:nvPicPr>
+        <p:blipFill>
+          <a:blip r:embed="rId3">
+            <a:extLst>
+              <a:ext uri="{28A0092B-C50C-407E-A947-70E740481C1C}">
+                <a14:useLocalDpi xmlns:a14="http://schemas.microsoft.com/office/drawing/2010/main" val="0"/>
+              </a:ext>
+            </a:extLst>
+          </a:blip>
+          <a:srcRect/>
+          <a:stretch>
+            <a:fillRect/>
+          </a:stretch>
+        </p:blipFill>
+        <p:spPr bwMode="auto">
+          <a:xfrm>
+            <a:off x="2667000" y="0"/>
+            <a:ext cx="6858000" cy="6858000"/>
+          </a:xfrm>
+          <a:prstGeom prst="rect">
+            <a:avLst/>
+          </a:prstGeom>
+          <a:noFill/>
+          <a:extLst>
+            <a:ext uri="{909E8E84-426E-40DD-AFC4-6F175D3DCCD1}">
+              <a14:hiddenFill xmlns:a14="http://schemas.microsoft.com/office/drawing/2010/main">
+                <a:solidFill>
+                  <a:srgbClr val="FFFFFF"/>
+                </a:solidFill>
+              </a14:hiddenFill>
+            </a:ext>
+          </a:extLst>
+        </p:spPr>
+      </p:pic>
     </p:spTree>
     <p:extLst>
       <p:ext uri="{BB962C8B-B14F-4D97-AF65-F5344CB8AC3E}">
-        <p14:creationId xmlns:p14="http://schemas.microsoft.com/office/powerpoint/2010/main" val="907666451"/>
+        <p14:creationId xmlns:p14="http://schemas.microsoft.com/office/powerpoint/2010/main" val="3276822427"/>
+      </p:ext>
+    </p:extLst>
+  </p:cSld>
+  <p:clrMapOvr>
+    <a:masterClrMapping/>
+  </p:clrMapOvr>
+</p:sld>
+</file>
+
+<file path=ppt/slides/slide20.xml><?xml version="1.0" encoding="utf-8"?>
+<p:sld xmlns:a="http://schemas.openxmlformats.org/drawingml/2006/main" xmlns:r="http://schemas.openxmlformats.org/officeDocument/2006/relationships" xmlns:p="http://schemas.openxmlformats.org/presentationml/2006/main">
+  <p:cSld>
+    <p:spTree>
+      <p:nvGrpSpPr>
+        <p:cNvPr id="1" name=""/>
+        <p:cNvGrpSpPr/>
+        <p:nvPr/>
+      </p:nvGrpSpPr>
+      <p:grpSpPr>
+        <a:xfrm>
+          <a:off x="0" y="0"/>
+          <a:ext cx="0" cy="0"/>
+          <a:chOff x="0" y="0"/>
+          <a:chExt cx="0" cy="0"/>
+        </a:xfrm>
+      </p:grpSpPr>
+      <p:sp>
+        <p:nvSpPr>
+          <p:cNvPr id="2" name="Title 1">
+            <a:extLst>
+              <a:ext uri="{FF2B5EF4-FFF2-40B4-BE49-F238E27FC236}">
+                <a16:creationId xmlns:a16="http://schemas.microsoft.com/office/drawing/2014/main" id="{71CA4DAE-8F1F-10EB-FEF0-7F132A28860E}"/>
+              </a:ext>
+            </a:extLst>
+          </p:cNvPr>
+          <p:cNvSpPr>
+            <a:spLocks noGrp="1"/>
+          </p:cNvSpPr>
+          <p:nvPr>
+            <p:ph type="title"/>
+          </p:nvPr>
+        </p:nvSpPr>
+        <p:spPr/>
+        <p:txBody>
+          <a:bodyPr>
+            <a:normAutofit/>
+          </a:bodyPr>
+          <a:lstStyle/>
+          <a:p>
+            <a:r>
+              <a:rPr lang="en-US" dirty="0"/>
+              <a:t>First Next Step: Swap your Retro</a:t>
+            </a:r>
+          </a:p>
+        </p:txBody>
+      </p:sp>
+      <p:sp>
+        <p:nvSpPr>
+          <p:cNvPr id="3" name="Content Placeholder 2">
+            <a:extLst>
+              <a:ext uri="{FF2B5EF4-FFF2-40B4-BE49-F238E27FC236}">
+                <a16:creationId xmlns:a16="http://schemas.microsoft.com/office/drawing/2014/main" id="{FCD0505E-6A36-CBC3-30DB-1ED5D15BFE62}"/>
+              </a:ext>
+            </a:extLst>
+          </p:cNvPr>
+          <p:cNvSpPr>
+            <a:spLocks noGrp="1"/>
+          </p:cNvSpPr>
+          <p:nvPr>
+            <p:ph idx="1"/>
+          </p:nvPr>
+        </p:nvSpPr>
+        <p:spPr/>
+        <p:txBody>
+          <a:bodyPr/>
+          <a:lstStyle/>
+          <a:p>
+            <a:endParaRPr lang="en-US"/>
+          </a:p>
+        </p:txBody>
+      </p:sp>
+    </p:spTree>
+    <p:extLst>
+      <p:ext uri="{BB962C8B-B14F-4D97-AF65-F5344CB8AC3E}">
+        <p14:creationId xmlns:p14="http://schemas.microsoft.com/office/powerpoint/2010/main" val="672966753"/>
+      </p:ext>
+    </p:extLst>
+  </p:cSld>
+  <p:clrMapOvr>
+    <a:masterClrMapping/>
+  </p:clrMapOvr>
+</p:sld>
+</file>
+
+<file path=ppt/slides/slide21.xml><?xml version="1.0" encoding="utf-8"?>
+<p:sld xmlns:a="http://schemas.openxmlformats.org/drawingml/2006/main" xmlns:r="http://schemas.openxmlformats.org/officeDocument/2006/relationships" xmlns:p="http://schemas.openxmlformats.org/presentationml/2006/main">
+  <p:cSld>
+    <p:spTree>
+      <p:nvGrpSpPr>
+        <p:cNvPr id="1" name=""/>
+        <p:cNvGrpSpPr/>
+        <p:nvPr/>
+      </p:nvGrpSpPr>
+      <p:grpSpPr>
+        <a:xfrm>
+          <a:off x="0" y="0"/>
+          <a:ext cx="0" cy="0"/>
+          <a:chOff x="0" y="0"/>
+          <a:chExt cx="0" cy="0"/>
+        </a:xfrm>
+      </p:grpSpPr>
+      <p:sp>
+        <p:nvSpPr>
+          <p:cNvPr id="2" name="Title 1">
+            <a:extLst>
+              <a:ext uri="{FF2B5EF4-FFF2-40B4-BE49-F238E27FC236}">
+                <a16:creationId xmlns:a16="http://schemas.microsoft.com/office/drawing/2014/main" id="{0CCB2085-43F4-8573-398A-7B670AF76D43}"/>
+              </a:ext>
+            </a:extLst>
+          </p:cNvPr>
+          <p:cNvSpPr>
+            <a:spLocks noGrp="1"/>
+          </p:cNvSpPr>
+          <p:nvPr>
+            <p:ph type="title"/>
+          </p:nvPr>
+        </p:nvSpPr>
+        <p:spPr/>
+        <p:txBody>
+          <a:bodyPr/>
+          <a:lstStyle/>
+          <a:p>
+            <a:r>
+              <a:rPr lang="en-US" dirty="0"/>
+              <a:t>Ask me Anything / Resources</a:t>
+            </a:r>
+          </a:p>
+        </p:txBody>
+      </p:sp>
+      <p:sp>
+        <p:nvSpPr>
+          <p:cNvPr id="3" name="Content Placeholder 2">
+            <a:extLst>
+              <a:ext uri="{FF2B5EF4-FFF2-40B4-BE49-F238E27FC236}">
+                <a16:creationId xmlns:a16="http://schemas.microsoft.com/office/drawing/2014/main" id="{746B55EF-4D2A-2F22-DDE7-390086895E65}"/>
+              </a:ext>
+            </a:extLst>
+          </p:cNvPr>
+          <p:cNvSpPr>
+            <a:spLocks noGrp="1"/>
+          </p:cNvSpPr>
+          <p:nvPr>
+            <p:ph idx="1"/>
+          </p:nvPr>
+        </p:nvSpPr>
+        <p:spPr/>
+        <p:txBody>
+          <a:bodyPr/>
+          <a:lstStyle/>
+          <a:p>
+            <a:r>
+              <a:rPr lang="en-US" dirty="0"/>
+              <a:t>QR code</a:t>
+            </a:r>
+          </a:p>
+        </p:txBody>
+      </p:sp>
+    </p:spTree>
+    <p:extLst>
+      <p:ext uri="{BB962C8B-B14F-4D97-AF65-F5344CB8AC3E}">
+        <p14:creationId xmlns:p14="http://schemas.microsoft.com/office/powerpoint/2010/main" val="3303992412"/>
       </p:ext>
     </p:extLst>
   </p:cSld>
@@ -5615,63 +6128,57 @@
           <a:chExt cx="0" cy="0"/>
         </a:xfrm>
       </p:grpSpPr>
-      <p:sp>
-        <p:nvSpPr>
-          <p:cNvPr id="2" name="Title 1">
-            <a:extLst>
-              <a:ext uri="{FF2B5EF4-FFF2-40B4-BE49-F238E27FC236}">
-                <a16:creationId xmlns:a16="http://schemas.microsoft.com/office/drawing/2014/main" id="{C7A19533-9BCE-DDF6-5FCC-CAF4C2054439}"/>
-              </a:ext>
-            </a:extLst>
-          </p:cNvPr>
-          <p:cNvSpPr>
-            <a:spLocks noGrp="1"/>
-          </p:cNvSpPr>
-          <p:nvPr>
-            <p:ph type="title"/>
-          </p:nvPr>
-        </p:nvSpPr>
-        <p:spPr/>
-        <p:txBody>
-          <a:bodyPr/>
-          <a:lstStyle/>
-          <a:p>
-            <a:r>
-              <a:rPr lang="en-US" dirty="0"/>
-              <a:t>Choose How to Collaborate</a:t>
-            </a:r>
-          </a:p>
-        </p:txBody>
-      </p:sp>
-      <p:sp>
-        <p:nvSpPr>
-          <p:cNvPr id="3" name="Content Placeholder 2">
-            <a:extLst>
-              <a:ext uri="{FF2B5EF4-FFF2-40B4-BE49-F238E27FC236}">
-                <a16:creationId xmlns:a16="http://schemas.microsoft.com/office/drawing/2014/main" id="{8B16E928-6B09-F8A0-D5F4-74CDAC89405A}"/>
-              </a:ext>
-            </a:extLst>
-          </p:cNvPr>
-          <p:cNvSpPr>
-            <a:spLocks noGrp="1"/>
-          </p:cNvSpPr>
-          <p:nvPr>
-            <p:ph idx="1"/>
-          </p:nvPr>
-        </p:nvSpPr>
-        <p:spPr/>
-        <p:txBody>
-          <a:bodyPr/>
-          <a:lstStyle/>
-          <a:p>
-            <a:endParaRPr lang="en-US"/>
-          </a:p>
-        </p:txBody>
-      </p:sp>
+      <p:pic>
+        <p:nvPicPr>
+          <p:cNvPr id="2050" name="Picture 2" descr="Extreme Programming Explained: Embrace Change - Picture 1 of 1">
+            <a:extLst>
+              <a:ext uri="{FF2B5EF4-FFF2-40B4-BE49-F238E27FC236}">
+                <a16:creationId xmlns:a16="http://schemas.microsoft.com/office/drawing/2014/main" id="{875E5102-4C9E-2544-24C9-E84B8170CC02}"/>
+              </a:ext>
+            </a:extLst>
+          </p:cNvPr>
+          <p:cNvPicPr>
+            <a:picLocks noChangeAspect="1" noChangeArrowheads="1"/>
+          </p:cNvPicPr>
+          <p:nvPr/>
+        </p:nvPicPr>
+        <p:blipFill>
+          <a:blip r:embed="rId3">
+            <a:extLst>
+              <a:ext uri="{28A0092B-C50C-407E-A947-70E740481C1C}">
+                <a14:useLocalDpi xmlns:a14="http://schemas.microsoft.com/office/drawing/2010/main" val="0"/>
+              </a:ext>
+            </a:extLst>
+          </a:blip>
+          <a:srcRect/>
+          <a:stretch>
+            <a:fillRect/>
+          </a:stretch>
+        </p:blipFill>
+        <p:spPr bwMode="auto">
+          <a:xfrm>
+            <a:off x="3425588" y="82178"/>
+            <a:ext cx="5377217" cy="6739257"/>
+          </a:xfrm>
+          <a:prstGeom prst="rect">
+            <a:avLst/>
+          </a:prstGeom>
+          <a:noFill/>
+          <a:extLst>
+            <a:ext uri="{909E8E84-426E-40DD-AFC4-6F175D3DCCD1}">
+              <a14:hiddenFill xmlns:a14="http://schemas.microsoft.com/office/drawing/2010/main">
+                <a:solidFill>
+                  <a:srgbClr val="FFFFFF"/>
+                </a:solidFill>
+              </a14:hiddenFill>
+            </a:ext>
+          </a:extLst>
+        </p:spPr>
+      </p:pic>
     </p:spTree>
     <p:extLst>
       <p:ext uri="{BB962C8B-B14F-4D97-AF65-F5344CB8AC3E}">
-        <p14:creationId xmlns:p14="http://schemas.microsoft.com/office/powerpoint/2010/main" val="972508822"/>
+        <p14:creationId xmlns:p14="http://schemas.microsoft.com/office/powerpoint/2010/main" val="1393936036"/>
       </p:ext>
     </p:extLst>
   </p:cSld>
@@ -5698,64 +6205,68 @@
           <a:chExt cx="0" cy="0"/>
         </a:xfrm>
       </p:grpSpPr>
-      <p:sp>
-        <p:nvSpPr>
-          <p:cNvPr id="2" name="Title 1">
-            <a:extLst>
-              <a:ext uri="{FF2B5EF4-FFF2-40B4-BE49-F238E27FC236}">
-                <a16:creationId xmlns:a16="http://schemas.microsoft.com/office/drawing/2014/main" id="{04AEDA35-7173-AB53-F552-515CDF02E2C0}"/>
-              </a:ext>
-            </a:extLst>
-          </p:cNvPr>
-          <p:cNvSpPr>
-            <a:spLocks noGrp="1"/>
-          </p:cNvSpPr>
-          <p:nvPr>
-            <p:ph type="title"/>
-          </p:nvPr>
-        </p:nvSpPr>
-        <p:spPr/>
-        <p:txBody>
-          <a:bodyPr/>
-          <a:lstStyle/>
-          <a:p>
-            <a:r>
-              <a:rPr lang="en-US" dirty="0"/>
-              <a:t>Recommendation</a:t>
-            </a:r>
-          </a:p>
-        </p:txBody>
-      </p:sp>
-      <p:sp>
-        <p:nvSpPr>
-          <p:cNvPr id="3" name="Content Placeholder 2">
-            <a:extLst>
-              <a:ext uri="{FF2B5EF4-FFF2-40B4-BE49-F238E27FC236}">
-                <a16:creationId xmlns:a16="http://schemas.microsoft.com/office/drawing/2014/main" id="{7451BDDA-FCBD-A1DE-D366-8A2B8A3FF1FF}"/>
-              </a:ext>
-            </a:extLst>
-          </p:cNvPr>
-          <p:cNvSpPr>
-            <a:spLocks noGrp="1"/>
-          </p:cNvSpPr>
-          <p:nvPr>
-            <p:ph idx="1"/>
-          </p:nvPr>
-        </p:nvSpPr>
-        <p:spPr/>
-        <p:txBody>
-          <a:bodyPr/>
-          <a:lstStyle/>
-          <a:p>
-            <a:r>
-              <a:rPr lang="en-US" dirty="0"/>
-              <a:t>Start off with pairing slide</a:t>
-            </a:r>
-          </a:p>
-          <a:p>
-            <a:r>
-              <a:rPr lang="en-US" dirty="0"/>
-              <a:t>Switch to experiment / engineering method slide</a:t>
+      <p:pic>
+        <p:nvPicPr>
+          <p:cNvPr id="3" name="Picture 2">
+            <a:extLst>
+              <a:ext uri="{FF2B5EF4-FFF2-40B4-BE49-F238E27FC236}">
+                <a16:creationId xmlns:a16="http://schemas.microsoft.com/office/drawing/2014/main" id="{070BC060-9E06-98A9-9D89-2EEED63A3D74}"/>
+              </a:ext>
+            </a:extLst>
+          </p:cNvPr>
+          <p:cNvPicPr>
+            <a:picLocks noChangeAspect="1"/>
+          </p:cNvPicPr>
+          <p:nvPr/>
+        </p:nvPicPr>
+        <p:blipFill>
+          <a:blip r:embed="rId3"/>
+          <a:stretch>
+            <a:fillRect/>
+          </a:stretch>
+        </p:blipFill>
+        <p:spPr>
+          <a:xfrm>
+            <a:off x="624324" y="0"/>
+            <a:ext cx="9059956" cy="6858000"/>
+          </a:xfrm>
+          <a:prstGeom prst="rect">
+            <a:avLst/>
+          </a:prstGeom>
+        </p:spPr>
+      </p:pic>
+      <p:sp>
+        <p:nvSpPr>
+          <p:cNvPr id="4" name="TextBox 3">
+            <a:extLst>
+              <a:ext uri="{FF2B5EF4-FFF2-40B4-BE49-F238E27FC236}">
+                <a16:creationId xmlns:a16="http://schemas.microsoft.com/office/drawing/2014/main" id="{78F4D132-60A3-A295-BF80-FEA2BD37F40B}"/>
+              </a:ext>
+            </a:extLst>
+          </p:cNvPr>
+          <p:cNvSpPr txBox="1"/>
+          <p:nvPr/>
+        </p:nvSpPr>
+        <p:spPr>
+          <a:xfrm flipH="1">
+            <a:off x="2231633" y="6005014"/>
+            <a:ext cx="5845338" cy="369332"/>
+          </a:xfrm>
+          <a:prstGeom prst="rect">
+            <a:avLst/>
+          </a:prstGeom>
+          <a:noFill/>
+        </p:spPr>
+        <p:txBody>
+          <a:bodyPr wrap="square" rtlCol="0">
+            <a:spAutoFit/>
+          </a:bodyPr>
+          <a:lstStyle/>
+          <a:p>
+            <a:pPr algn="ctr"/>
+            <a:r>
+              <a:rPr lang="en-US" dirty="0"/>
+              <a:t>Pairing Duration (hours)</a:t>
             </a:r>
           </a:p>
         </p:txBody>
@@ -5763,7 +6274,7 @@
     </p:spTree>
     <p:extLst>
       <p:ext uri="{BB962C8B-B14F-4D97-AF65-F5344CB8AC3E}">
-        <p14:creationId xmlns:p14="http://schemas.microsoft.com/office/powerpoint/2010/main" val="22142743"/>
+        <p14:creationId xmlns:p14="http://schemas.microsoft.com/office/powerpoint/2010/main" val="1480436203"/>
       </p:ext>
     </p:extLst>
   </p:cSld>
@@ -5790,63 +6301,57 @@
           <a:chExt cx="0" cy="0"/>
         </a:xfrm>
       </p:grpSpPr>
-      <p:sp>
-        <p:nvSpPr>
-          <p:cNvPr id="2" name="Title 1">
-            <a:extLst>
-              <a:ext uri="{FF2B5EF4-FFF2-40B4-BE49-F238E27FC236}">
-                <a16:creationId xmlns:a16="http://schemas.microsoft.com/office/drawing/2014/main" id="{0372D214-10B0-CBD0-DA5F-3E0323BF36E6}"/>
-              </a:ext>
-            </a:extLst>
-          </p:cNvPr>
-          <p:cNvSpPr>
-            <a:spLocks noGrp="1"/>
-          </p:cNvSpPr>
-          <p:nvPr>
-            <p:ph type="title"/>
-          </p:nvPr>
-        </p:nvSpPr>
-        <p:spPr/>
-        <p:txBody>
-          <a:bodyPr/>
-          <a:lstStyle/>
-          <a:p>
-            <a:r>
-              <a:rPr lang="en-US" dirty="0"/>
-              <a:t>Our Results</a:t>
-            </a:r>
-          </a:p>
-        </p:txBody>
-      </p:sp>
-      <p:sp>
-        <p:nvSpPr>
-          <p:cNvPr id="3" name="Content Placeholder 2">
-            <a:extLst>
-              <a:ext uri="{FF2B5EF4-FFF2-40B4-BE49-F238E27FC236}">
-                <a16:creationId xmlns:a16="http://schemas.microsoft.com/office/drawing/2014/main" id="{A101D925-937F-4071-F512-24391AD1E114}"/>
-              </a:ext>
-            </a:extLst>
-          </p:cNvPr>
-          <p:cNvSpPr>
-            <a:spLocks noGrp="1"/>
-          </p:cNvSpPr>
-          <p:nvPr>
-            <p:ph idx="1"/>
-          </p:nvPr>
-        </p:nvSpPr>
-        <p:spPr/>
-        <p:txBody>
-          <a:bodyPr/>
-          <a:lstStyle/>
-          <a:p>
-            <a:endParaRPr lang="en-US"/>
-          </a:p>
-        </p:txBody>
-      </p:sp>
+      <p:pic>
+        <p:nvPicPr>
+          <p:cNvPr id="1026" name="Picture 2" descr="2 HOUR MECHANICAL TIMER - Woodbridge Kitchen Company">
+            <a:extLst>
+              <a:ext uri="{FF2B5EF4-FFF2-40B4-BE49-F238E27FC236}">
+                <a16:creationId xmlns:a16="http://schemas.microsoft.com/office/drawing/2014/main" id="{BAC1DFD1-32DE-4169-861B-C003F3005C8A}"/>
+              </a:ext>
+            </a:extLst>
+          </p:cNvPr>
+          <p:cNvPicPr>
+            <a:picLocks noChangeAspect="1" noChangeArrowheads="1"/>
+          </p:cNvPicPr>
+          <p:nvPr/>
+        </p:nvPicPr>
+        <p:blipFill>
+          <a:blip r:embed="rId3">
+            <a:extLst>
+              <a:ext uri="{28A0092B-C50C-407E-A947-70E740481C1C}">
+                <a14:useLocalDpi xmlns:a14="http://schemas.microsoft.com/office/drawing/2010/main" val="0"/>
+              </a:ext>
+            </a:extLst>
+          </a:blip>
+          <a:srcRect/>
+          <a:stretch>
+            <a:fillRect/>
+          </a:stretch>
+        </p:blipFill>
+        <p:spPr bwMode="auto">
+          <a:xfrm>
+            <a:off x="2667000" y="0"/>
+            <a:ext cx="6858000" cy="6858000"/>
+          </a:xfrm>
+          <a:prstGeom prst="rect">
+            <a:avLst/>
+          </a:prstGeom>
+          <a:noFill/>
+          <a:extLst>
+            <a:ext uri="{909E8E84-426E-40DD-AFC4-6F175D3DCCD1}">
+              <a14:hiddenFill xmlns:a14="http://schemas.microsoft.com/office/drawing/2010/main">
+                <a:solidFill>
+                  <a:srgbClr val="FFFFFF"/>
+                </a:solidFill>
+              </a14:hiddenFill>
+            </a:ext>
+          </a:extLst>
+        </p:spPr>
+      </p:pic>
     </p:spTree>
     <p:extLst>
       <p:ext uri="{BB962C8B-B14F-4D97-AF65-F5344CB8AC3E}">
-        <p14:creationId xmlns:p14="http://schemas.microsoft.com/office/powerpoint/2010/main" val="1709379"/>
+        <p14:creationId xmlns:p14="http://schemas.microsoft.com/office/powerpoint/2010/main" val="688929921"/>
       </p:ext>
     </p:extLst>
   </p:cSld>
@@ -5878,7 +6383,7 @@
           <p:cNvPr id="2" name="Title 1">
             <a:extLst>
               <a:ext uri="{FF2B5EF4-FFF2-40B4-BE49-F238E27FC236}">
-                <a16:creationId xmlns:a16="http://schemas.microsoft.com/office/drawing/2014/main" id="{37B996A8-324B-4155-990B-F843E2A78828}"/>
+                <a16:creationId xmlns:a16="http://schemas.microsoft.com/office/drawing/2014/main" id="{C7A19533-9BCE-DDF6-5FCC-CAF4C2054439}"/>
               </a:ext>
             </a:extLst>
           </p:cNvPr>
@@ -5896,7 +6401,7 @@
           <a:p>
             <a:r>
               <a:rPr lang="en-US" dirty="0"/>
-              <a:t>What is Promiscuous Pairing?</a:t>
+              <a:t>Choose How to Collaborate</a:t>
             </a:r>
           </a:p>
         </p:txBody>
@@ -5906,7 +6411,7 @@
           <p:cNvPr id="3" name="Content Placeholder 2">
             <a:extLst>
               <a:ext uri="{FF2B5EF4-FFF2-40B4-BE49-F238E27FC236}">
-                <a16:creationId xmlns:a16="http://schemas.microsoft.com/office/drawing/2014/main" id="{E6B9802D-7580-4777-794B-113CD2A7839A}"/>
+                <a16:creationId xmlns:a16="http://schemas.microsoft.com/office/drawing/2014/main" id="{8B16E928-6B09-F8A0-D5F4-74CDAC89405A}"/>
               </a:ext>
             </a:extLst>
           </p:cNvPr>
@@ -5929,7 +6434,7 @@
     </p:spTree>
     <p:extLst>
       <p:ext uri="{BB962C8B-B14F-4D97-AF65-F5344CB8AC3E}">
-        <p14:creationId xmlns:p14="http://schemas.microsoft.com/office/powerpoint/2010/main" val="3357544226"/>
+        <p14:creationId xmlns:p14="http://schemas.microsoft.com/office/powerpoint/2010/main" val="972508822"/>
       </p:ext>
     </p:extLst>
   </p:cSld>
@@ -5961,7 +6466,7 @@
           <p:cNvPr id="2" name="Title 1">
             <a:extLst>
               <a:ext uri="{FF2B5EF4-FFF2-40B4-BE49-F238E27FC236}">
-                <a16:creationId xmlns:a16="http://schemas.microsoft.com/office/drawing/2014/main" id="{B572B785-6703-3C29-FECB-15C747C60C8A}"/>
+                <a16:creationId xmlns:a16="http://schemas.microsoft.com/office/drawing/2014/main" id="{04AEDA35-7173-AB53-F552-515CDF02E2C0}"/>
               </a:ext>
             </a:extLst>
           </p:cNvPr>
@@ -5974,14 +6479,12 @@
         </p:nvSpPr>
         <p:spPr/>
         <p:txBody>
-          <a:bodyPr>
-            <a:normAutofit fontScale="90000"/>
-          </a:bodyPr>
-          <a:lstStyle/>
-          <a:p>
-            <a:r>
-              <a:rPr lang="en-US" dirty="0"/>
-              <a:t>Isn’t This Obsoleted by Ensemble (Mob) Programming?</a:t>
+          <a:bodyPr/>
+          <a:lstStyle/>
+          <a:p>
+            <a:r>
+              <a:rPr lang="en-US" dirty="0"/>
+              <a:t>Recommendation</a:t>
             </a:r>
           </a:p>
         </p:txBody>
@@ -5991,7 +6494,7 @@
           <p:cNvPr id="3" name="Content Placeholder 2">
             <a:extLst>
               <a:ext uri="{FF2B5EF4-FFF2-40B4-BE49-F238E27FC236}">
-                <a16:creationId xmlns:a16="http://schemas.microsoft.com/office/drawing/2014/main" id="{DD1C81B1-188A-24B0-27EF-64CCEBD3D9B0}"/>
+                <a16:creationId xmlns:a16="http://schemas.microsoft.com/office/drawing/2014/main" id="{7451BDDA-FCBD-A1DE-D366-8A2B8A3FF1FF}"/>
               </a:ext>
             </a:extLst>
           </p:cNvPr>
@@ -6007,14 +6510,23 @@
           <a:bodyPr/>
           <a:lstStyle/>
           <a:p>
-            <a:endParaRPr lang="en-US"/>
+            <a:r>
+              <a:rPr lang="en-US" dirty="0"/>
+              <a:t>Start off with pairing slide</a:t>
+            </a:r>
+          </a:p>
+          <a:p>
+            <a:r>
+              <a:rPr lang="en-US" dirty="0"/>
+              <a:t>Switch to experiment / engineering method slide</a:t>
+            </a:r>
           </a:p>
         </p:txBody>
       </p:sp>
     </p:spTree>
     <p:extLst>
       <p:ext uri="{BB962C8B-B14F-4D97-AF65-F5344CB8AC3E}">
-        <p14:creationId xmlns:p14="http://schemas.microsoft.com/office/powerpoint/2010/main" val="3051419815"/>
+        <p14:creationId xmlns:p14="http://schemas.microsoft.com/office/powerpoint/2010/main" val="22142743"/>
       </p:ext>
     </p:extLst>
   </p:cSld>
@@ -6046,7 +6558,7 @@
           <p:cNvPr id="2" name="Title 1">
             <a:extLst>
               <a:ext uri="{FF2B5EF4-FFF2-40B4-BE49-F238E27FC236}">
-                <a16:creationId xmlns:a16="http://schemas.microsoft.com/office/drawing/2014/main" id="{8E58E2DE-F5FD-3140-5A61-B412D8CA73A3}"/>
+                <a16:creationId xmlns:a16="http://schemas.microsoft.com/office/drawing/2014/main" id="{0372D214-10B0-CBD0-DA5F-3E0323BF36E6}"/>
               </a:ext>
             </a:extLst>
           </p:cNvPr>
@@ -6064,7 +6576,7 @@
           <a:p>
             <a:r>
               <a:rPr lang="en-US" dirty="0"/>
-              <a:t>Other Teams</a:t>
+              <a:t>Our Results</a:t>
             </a:r>
           </a:p>
         </p:txBody>
@@ -6074,7 +6586,7 @@
           <p:cNvPr id="3" name="Content Placeholder 2">
             <a:extLst>
               <a:ext uri="{FF2B5EF4-FFF2-40B4-BE49-F238E27FC236}">
-                <a16:creationId xmlns:a16="http://schemas.microsoft.com/office/drawing/2014/main" id="{029742FA-6076-CB5B-5535-835CA0BB86EF}"/>
+                <a16:creationId xmlns:a16="http://schemas.microsoft.com/office/drawing/2014/main" id="{A101D925-937F-4071-F512-24391AD1E114}"/>
               </a:ext>
             </a:extLst>
           </p:cNvPr>
@@ -6097,7 +6609,7 @@
     </p:spTree>
     <p:extLst>
       <p:ext uri="{BB962C8B-B14F-4D97-AF65-F5344CB8AC3E}">
-        <p14:creationId xmlns:p14="http://schemas.microsoft.com/office/powerpoint/2010/main" val="310654357"/>
+        <p14:creationId xmlns:p14="http://schemas.microsoft.com/office/powerpoint/2010/main" val="1709379"/>
       </p:ext>
     </p:extLst>
   </p:cSld>
@@ -6129,7 +6641,7 @@
           <p:cNvPr id="2" name="Title 1">
             <a:extLst>
               <a:ext uri="{FF2B5EF4-FFF2-40B4-BE49-F238E27FC236}">
-                <a16:creationId xmlns:a16="http://schemas.microsoft.com/office/drawing/2014/main" id="{F60437D5-A077-3862-5946-B85E45CB6D8A}"/>
+                <a16:creationId xmlns:a16="http://schemas.microsoft.com/office/drawing/2014/main" id="{37B996A8-324B-4155-990B-F843E2A78828}"/>
               </a:ext>
             </a:extLst>
           </p:cNvPr>
@@ -6147,7 +6659,7 @@
           <a:p>
             <a:r>
               <a:rPr lang="en-US" dirty="0"/>
-              <a:t>Change Patterns</a:t>
+              <a:t>What is Promiscuous Pairing?</a:t>
             </a:r>
           </a:p>
         </p:txBody>
@@ -6157,7 +6669,7 @@
           <p:cNvPr id="3" name="Content Placeholder 2">
             <a:extLst>
               <a:ext uri="{FF2B5EF4-FFF2-40B4-BE49-F238E27FC236}">
-                <a16:creationId xmlns:a16="http://schemas.microsoft.com/office/drawing/2014/main" id="{90CC9237-F36E-A920-F3B0-3AA6B669758E}"/>
+                <a16:creationId xmlns:a16="http://schemas.microsoft.com/office/drawing/2014/main" id="{E6B9802D-7580-4777-794B-113CD2A7839A}"/>
               </a:ext>
             </a:extLst>
           </p:cNvPr>
@@ -6180,7 +6692,7 @@
     </p:spTree>
     <p:extLst>
       <p:ext uri="{BB962C8B-B14F-4D97-AF65-F5344CB8AC3E}">
-        <p14:creationId xmlns:p14="http://schemas.microsoft.com/office/powerpoint/2010/main" val="3639305127"/>
+        <p14:creationId xmlns:p14="http://schemas.microsoft.com/office/powerpoint/2010/main" val="3357544226"/>
       </p:ext>
     </p:extLst>
   </p:cSld>

</xml_diff>

<commit_message>
(craft) Final deck ready to present.
</commit_message>
<xml_diff>
--- a/Decks/Craft2023-PromiscuousPairingBeginnerMind.pptx
+++ b/Decks/Craft2023-PromiscuousPairingBeginnerMind.pptx
@@ -5,7 +5,7 @@
     <p:sldMasterId id="2147483660" r:id="rId1"/>
   </p:sldMasterIdLst>
   <p:notesMasterIdLst>
-    <p:notesMasterId r:id="rId32"/>
+    <p:notesMasterId r:id="rId33"/>
   </p:notesMasterIdLst>
   <p:sldIdLst>
     <p:sldId id="256" r:id="rId2"/>
@@ -35,9 +35,10 @@
     <p:sldId id="268" r:id="rId26"/>
     <p:sldId id="265" r:id="rId27"/>
     <p:sldId id="267" r:id="rId28"/>
-    <p:sldId id="292" r:id="rId29"/>
-    <p:sldId id="291" r:id="rId30"/>
-    <p:sldId id="295" r:id="rId31"/>
+    <p:sldId id="296" r:id="rId29"/>
+    <p:sldId id="292" r:id="rId30"/>
+    <p:sldId id="291" r:id="rId31"/>
+    <p:sldId id="295" r:id="rId32"/>
   </p:sldIdLst>
   <p:sldSz cx="12192000" cy="6858000"/>
   <p:notesSz cx="6858000" cy="9144000"/>
@@ -33643,6 +33644,361 @@
           <a:p>
             <a:r>
               <a:rPr lang="en-US" dirty="0"/>
+              <a:t>Let’s discuss the benefits of promiscuity!</a:t>
+            </a:r>
+          </a:p>
+        </p:txBody>
+      </p:sp>
+      <p:sp>
+        <p:nvSpPr>
+          <p:cNvPr id="4" name="Slide Number Placeholder 3"/>
+          <p:cNvSpPr>
+            <a:spLocks noGrp="1"/>
+          </p:cNvSpPr>
+          <p:nvPr>
+            <p:ph type="sldNum" sz="quarter" idx="5"/>
+          </p:nvPr>
+        </p:nvSpPr>
+        <p:spPr/>
+        <p:txBody>
+          <a:bodyPr/>
+          <a:lstStyle/>
+          <a:p>
+            <a:fld id="{2E396785-7325-4959-B34C-58C3AEDA50A1}" type="slidenum">
+              <a:rPr lang="en-US" smtClean="0"/>
+              <a:t>11</a:t>
+            </a:fld>
+            <a:endParaRPr lang="en-US"/>
+          </a:p>
+        </p:txBody>
+      </p:sp>
+    </p:spTree>
+    <p:extLst>
+      <p:ext uri="{BB962C8B-B14F-4D97-AF65-F5344CB8AC3E}">
+        <p14:creationId xmlns:p14="http://schemas.microsoft.com/office/powerpoint/2010/main" val="3443767014"/>
+      </p:ext>
+    </p:extLst>
+  </p:cSld>
+  <p:clrMapOvr>
+    <a:masterClrMapping/>
+  </p:clrMapOvr>
+</p:notes>
+</file>
+
+<file path=ppt/notesSlides/notesSlide11.xml><?xml version="1.0" encoding="utf-8"?>
+<p:notes xmlns:a="http://schemas.openxmlformats.org/drawingml/2006/main" xmlns:r="http://schemas.openxmlformats.org/officeDocument/2006/relationships" xmlns:p="http://schemas.openxmlformats.org/presentationml/2006/main">
+  <p:cSld>
+    <p:spTree>
+      <p:nvGrpSpPr>
+        <p:cNvPr id="1" name=""/>
+        <p:cNvGrpSpPr/>
+        <p:nvPr/>
+      </p:nvGrpSpPr>
+      <p:grpSpPr>
+        <a:xfrm>
+          <a:off x="0" y="0"/>
+          <a:ext cx="0" cy="0"/>
+          <a:chOff x="0" y="0"/>
+          <a:chExt cx="0" cy="0"/>
+        </a:xfrm>
+      </p:grpSpPr>
+      <p:sp>
+        <p:nvSpPr>
+          <p:cNvPr id="2" name="Slide Image Placeholder 1"/>
+          <p:cNvSpPr>
+            <a:spLocks noGrp="1" noRot="1" noChangeAspect="1"/>
+          </p:cNvSpPr>
+          <p:nvPr>
+            <p:ph type="sldImg"/>
+          </p:nvPr>
+        </p:nvSpPr>
+        <p:spPr/>
+      </p:sp>
+      <p:sp>
+        <p:nvSpPr>
+          <p:cNvPr id="3" name="Notes Placeholder 2"/>
+          <p:cNvSpPr>
+            <a:spLocks noGrp="1"/>
+          </p:cNvSpPr>
+          <p:nvPr>
+            <p:ph type="body" idx="1"/>
+          </p:nvPr>
+        </p:nvSpPr>
+        <p:spPr/>
+        <p:txBody>
+          <a:bodyPr/>
+          <a:lstStyle/>
+          <a:p>
+            <a:r>
+              <a:rPr lang="en-US" dirty="0"/>
+              <a:t>Lots of ways to pair. We experimented.</a:t>
+            </a:r>
+          </a:p>
+          <a:p>
+            <a:endParaRPr lang="en-US" dirty="0"/>
+          </a:p>
+          <a:p>
+            <a:pPr marL="171450" indent="-171450">
+              <a:buFont typeface="Arial" panose="020B0604020202020204" pitchFamily="34" charset="0"/>
+              <a:buChar char="•"/>
+            </a:pPr>
+            <a:r>
+              <a:rPr lang="en-US" dirty="0"/>
+              <a:t>Walk through our results.</a:t>
+            </a:r>
+          </a:p>
+          <a:p>
+            <a:pPr marL="171450" indent="-171450">
+              <a:buFont typeface="Arial" panose="020B0604020202020204" pitchFamily="34" charset="0"/>
+              <a:buChar char="•"/>
+            </a:pPr>
+            <a:r>
+              <a:rPr lang="en-US" dirty="0"/>
+              <a:t>Surprises:</a:t>
+            </a:r>
+          </a:p>
+          <a:p>
+            <a:pPr marL="628650" lvl="1" indent="-171450">
+              <a:buFont typeface="Arial" panose="020B0604020202020204" pitchFamily="34" charset="0"/>
+              <a:buChar char="•"/>
+            </a:pPr>
+            <a:r>
+              <a:rPr lang="en-US" dirty="0"/>
+              <a:t>Optimal swap time was short!</a:t>
+            </a:r>
+          </a:p>
+          <a:p>
+            <a:pPr marL="628650" lvl="1" indent="-171450">
+              <a:buFont typeface="Arial" panose="020B0604020202020204" pitchFamily="34" charset="0"/>
+              <a:buChar char="•"/>
+            </a:pPr>
+            <a:r>
+              <a:rPr lang="en-US" dirty="0"/>
+              <a:t>Shorter than our intended experiment – added variations.</a:t>
+            </a:r>
+          </a:p>
+          <a:p>
+            <a:pPr marL="628650" lvl="1" indent="-171450">
+              <a:buFont typeface="Arial" panose="020B0604020202020204" pitchFamily="34" charset="0"/>
+              <a:buChar char="•"/>
+            </a:pPr>
+            <a:r>
+              <a:rPr lang="en-US" dirty="0"/>
+              <a:t>Better to avoid experts!</a:t>
+            </a:r>
+          </a:p>
+          <a:p>
+            <a:pPr marL="171450" indent="-171450">
+              <a:buFont typeface="Arial" panose="020B0604020202020204" pitchFamily="34" charset="0"/>
+              <a:buChar char="•"/>
+            </a:pPr>
+            <a:r>
+              <a:rPr lang="en-US" dirty="0"/>
+              <a:t>Surprises:</a:t>
+            </a:r>
+          </a:p>
+          <a:p>
+            <a:pPr marL="628650" lvl="1" indent="-171450">
+              <a:buFont typeface="Arial" panose="020B0604020202020204" pitchFamily="34" charset="0"/>
+              <a:buChar char="•"/>
+            </a:pPr>
+            <a:r>
+              <a:rPr lang="en-US" dirty="0"/>
+              <a:t>Choosing for the week allowed optimal matching task to person…and performed worst!</a:t>
+            </a:r>
+          </a:p>
+          <a:p>
+            <a:pPr marL="0" indent="0">
+              <a:buFont typeface="Arial" panose="020B0604020202020204" pitchFamily="34" charset="0"/>
+              <a:buNone/>
+            </a:pPr>
+            <a:endParaRPr lang="en-US" dirty="0"/>
+          </a:p>
+          <a:p>
+            <a:pPr marL="0" indent="0">
+              <a:buFont typeface="Arial" panose="020B0604020202020204" pitchFamily="34" charset="0"/>
+              <a:buNone/>
+            </a:pPr>
+            <a:r>
+              <a:rPr lang="en-US" dirty="0"/>
+              <a:t>I didn’t report it in the paper, but we also tracked red card rate (explain).</a:t>
+            </a:r>
+          </a:p>
+          <a:p>
+            <a:pPr marL="0" indent="0">
+              <a:buFont typeface="Arial" panose="020B0604020202020204" pitchFamily="34" charset="0"/>
+              <a:buNone/>
+            </a:pPr>
+            <a:endParaRPr lang="en-US" dirty="0"/>
+          </a:p>
+          <a:p>
+            <a:pPr marL="0" indent="0">
+              <a:buFont typeface="Arial" panose="020B0604020202020204" pitchFamily="34" charset="0"/>
+              <a:buNone/>
+            </a:pPr>
+            <a:r>
+              <a:rPr lang="en-US" dirty="0"/>
+              <a:t>Red rate was unaffected by swap strategy, except for one case. Avoid experts + fast swap -&gt; complete rotation -&gt; fewer bugs</a:t>
+            </a:r>
+          </a:p>
+          <a:p>
+            <a:pPr marL="0" indent="0">
+              <a:buFont typeface="Arial" panose="020B0604020202020204" pitchFamily="34" charset="0"/>
+              <a:buNone/>
+            </a:pPr>
+            <a:r>
+              <a:rPr lang="en-US" dirty="0"/>
+              <a:t>Surprise!</a:t>
+            </a:r>
+          </a:p>
+          <a:p>
+            <a:pPr marL="0" indent="0">
+              <a:buFont typeface="Arial" panose="020B0604020202020204" pitchFamily="34" charset="0"/>
+              <a:buNone/>
+            </a:pPr>
+            <a:r>
+              <a:rPr lang="en-US" dirty="0"/>
+              <a:t>Step function, but only 20% or so better.</a:t>
+            </a:r>
+          </a:p>
+          <a:p>
+            <a:pPr marL="0" indent="0">
+              <a:buFont typeface="Arial" panose="020B0604020202020204" pitchFamily="34" charset="0"/>
+              <a:buNone/>
+            </a:pPr>
+            <a:endParaRPr lang="en-US" dirty="0"/>
+          </a:p>
+          <a:p>
+            <a:pPr marL="0" indent="0">
+              <a:buFont typeface="Arial" panose="020B0604020202020204" pitchFamily="34" charset="0"/>
+              <a:buNone/>
+            </a:pPr>
+            <a:r>
+              <a:rPr lang="en-US" dirty="0"/>
+              <a:t>One interesting interpretation: most pairing experiments are doomed to fail.</a:t>
+            </a:r>
+          </a:p>
+          <a:p>
+            <a:pPr marL="0" indent="0">
+              <a:buFont typeface="Arial" panose="020B0604020202020204" pitchFamily="34" charset="0"/>
+              <a:buNone/>
+            </a:pPr>
+            <a:r>
+              <a:rPr lang="en-US" dirty="0"/>
+              <a:t>(red vs blue)</a:t>
+            </a:r>
+          </a:p>
+          <a:p>
+            <a:pPr marL="0" indent="0">
+              <a:buFont typeface="Arial" panose="020B0604020202020204" pitchFamily="34" charset="0"/>
+              <a:buNone/>
+            </a:pPr>
+            <a:endParaRPr lang="en-US" dirty="0"/>
+          </a:p>
+          <a:p>
+            <a:pPr marL="0" indent="0">
+              <a:buFont typeface="Arial" panose="020B0604020202020204" pitchFamily="34" charset="0"/>
+              <a:buNone/>
+            </a:pPr>
+            <a:r>
+              <a:rPr lang="en-US" dirty="0"/>
+              <a:t>But we got to see all the data. So duh!</a:t>
+            </a:r>
+          </a:p>
+          <a:p>
+            <a:pPr marL="0" indent="0">
+              <a:buFont typeface="Arial" panose="020B0604020202020204" pitchFamily="34" charset="0"/>
+              <a:buNone/>
+            </a:pPr>
+            <a:r>
+              <a:rPr lang="en-US" dirty="0"/>
+              <a:t>Real experiment, not just comparing 2 options.</a:t>
+            </a:r>
+          </a:p>
+        </p:txBody>
+      </p:sp>
+      <p:sp>
+        <p:nvSpPr>
+          <p:cNvPr id="4" name="Slide Number Placeholder 3"/>
+          <p:cNvSpPr>
+            <a:spLocks noGrp="1"/>
+          </p:cNvSpPr>
+          <p:nvPr>
+            <p:ph type="sldNum" sz="quarter" idx="5"/>
+          </p:nvPr>
+        </p:nvSpPr>
+        <p:spPr/>
+        <p:txBody>
+          <a:bodyPr/>
+          <a:lstStyle/>
+          <a:p>
+            <a:fld id="{2E396785-7325-4959-B34C-58C3AEDA50A1}" type="slidenum">
+              <a:rPr lang="en-US" smtClean="0"/>
+              <a:t>12</a:t>
+            </a:fld>
+            <a:endParaRPr lang="en-US"/>
+          </a:p>
+        </p:txBody>
+      </p:sp>
+    </p:spTree>
+    <p:extLst>
+      <p:ext uri="{BB962C8B-B14F-4D97-AF65-F5344CB8AC3E}">
+        <p14:creationId xmlns:p14="http://schemas.microsoft.com/office/powerpoint/2010/main" val="2003283927"/>
+      </p:ext>
+    </p:extLst>
+  </p:cSld>
+  <p:clrMapOvr>
+    <a:masterClrMapping/>
+  </p:clrMapOvr>
+</p:notes>
+</file>
+
+<file path=ppt/notesSlides/notesSlide12.xml><?xml version="1.0" encoding="utf-8"?>
+<p:notes xmlns:a="http://schemas.openxmlformats.org/drawingml/2006/main" xmlns:r="http://schemas.openxmlformats.org/officeDocument/2006/relationships" xmlns:p="http://schemas.openxmlformats.org/presentationml/2006/main">
+  <p:cSld>
+    <p:spTree>
+      <p:nvGrpSpPr>
+        <p:cNvPr id="1" name=""/>
+        <p:cNvGrpSpPr/>
+        <p:nvPr/>
+      </p:nvGrpSpPr>
+      <p:grpSpPr>
+        <a:xfrm>
+          <a:off x="0" y="0"/>
+          <a:ext cx="0" cy="0"/>
+          <a:chOff x="0" y="0"/>
+          <a:chExt cx="0" cy="0"/>
+        </a:xfrm>
+      </p:grpSpPr>
+      <p:sp>
+        <p:nvSpPr>
+          <p:cNvPr id="2" name="Slide Image Placeholder 1"/>
+          <p:cNvSpPr>
+            <a:spLocks noGrp="1" noRot="1" noChangeAspect="1"/>
+          </p:cNvSpPr>
+          <p:nvPr>
+            <p:ph type="sldImg"/>
+          </p:nvPr>
+        </p:nvSpPr>
+        <p:spPr/>
+      </p:sp>
+      <p:sp>
+        <p:nvSpPr>
+          <p:cNvPr id="3" name="Notes Placeholder 2"/>
+          <p:cNvSpPr>
+            <a:spLocks noGrp="1"/>
+          </p:cNvSpPr>
+          <p:nvPr>
+            <p:ph type="body" idx="1"/>
+          </p:nvPr>
+        </p:nvSpPr>
+        <p:spPr/>
+        <p:txBody>
+          <a:bodyPr/>
+          <a:lstStyle/>
+          <a:p>
+            <a:r>
+              <a:rPr lang="en-US" dirty="0"/>
               <a:t>Explain each point</a:t>
             </a:r>
           </a:p>
@@ -33661,7 +34017,13 @@
           <a:p>
             <a:r>
               <a:rPr lang="en-US" dirty="0"/>
-              <a:t>But the data showed it to be optimal. We eventually found a theory to explain the data – Beginner’s Mind.</a:t>
+              <a:t>But of course. Data found surprises -&gt; practice breaks intuition.</a:t>
+            </a:r>
+          </a:p>
+          <a:p>
+            <a:r>
+              <a:rPr lang="en-US" dirty="0"/>
+              <a:t>Found a theory a year later – Beginner’s Mind. -&gt; didn’t change much</a:t>
             </a:r>
           </a:p>
           <a:p>
@@ -33670,7 +34032,7 @@
           <a:p>
             <a:r>
               <a:rPr lang="en-US" dirty="0"/>
-              <a:t>Note: the practice came first. The theory was more than a year after we had mastered the practice, and the theory didn’t change much. That’s the opposite of most instruction, most advice, blogs, etc.</a:t>
+              <a:t>Practice first -&gt; theory / mindset whatever -&gt; opposite of most instruction, advice</a:t>
             </a:r>
           </a:p>
           <a:p>
@@ -33720,7 +34082,7 @@
 </p:notes>
 </file>
 
-<file path=ppt/notesSlides/notesSlide11.xml><?xml version="1.0" encoding="utf-8"?>
+<file path=ppt/notesSlides/notesSlide13.xml><?xml version="1.0" encoding="utf-8"?>
 <p:notes xmlns:a="http://schemas.openxmlformats.org/drawingml/2006/main" xmlns:r="http://schemas.openxmlformats.org/officeDocument/2006/relationships" xmlns:p="http://schemas.openxmlformats.org/presentationml/2006/main">
   <p:cSld>
     <p:spTree>
@@ -33816,7 +34178,7 @@
 </p:notes>
 </file>
 
-<file path=ppt/notesSlides/notesSlide12.xml><?xml version="1.0" encoding="utf-8"?>
+<file path=ppt/notesSlides/notesSlide14.xml><?xml version="1.0" encoding="utf-8"?>
 <p:notes xmlns:a="http://schemas.openxmlformats.org/drawingml/2006/main" xmlns:r="http://schemas.openxmlformats.org/officeDocument/2006/relationships" xmlns:p="http://schemas.openxmlformats.org/presentationml/2006/main">
   <p:cSld>
     <p:spTree>
@@ -33862,7 +34224,22 @@
           <a:p>
             <a:r>
               <a:rPr lang="en-US" dirty="0"/>
-              <a:t>Not really. Mob vs Promiscuous Pair vs slow Pair vs Peer vs Solo/PR feature comparison</a:t>
+              <a:t>Not really.</a:t>
+            </a:r>
+          </a:p>
+          <a:p>
+            <a:r>
+              <a:rPr lang="en-US" dirty="0"/>
+              <a:t>List many options -&gt; compare some features -&gt; no definitive set</a:t>
+            </a:r>
+          </a:p>
+          <a:p>
+            <a:endParaRPr lang="en-US" dirty="0"/>
+          </a:p>
+          <a:p>
+            <a:r>
+              <a:rPr lang="en-US" dirty="0"/>
+              <a:t>I’ve observed -&gt; green top; blue good enough</a:t>
             </a:r>
           </a:p>
           <a:p>
@@ -33936,7 +34313,7 @@
 </p:notes>
 </file>
 
-<file path=ppt/notesSlides/notesSlide13.xml><?xml version="1.0" encoding="utf-8"?>
+<file path=ppt/notesSlides/notesSlide15.xml><?xml version="1.0" encoding="utf-8"?>
 <p:notes xmlns:a="http://schemas.openxmlformats.org/drawingml/2006/main" xmlns:r="http://schemas.openxmlformats.org/officeDocument/2006/relationships" xmlns:p="http://schemas.openxmlformats.org/presentationml/2006/main">
   <p:cSld>
     <p:spTree>
@@ -33986,7 +34363,7 @@
             </a:pPr>
             <a:r>
               <a:rPr lang="en-US" dirty="0"/>
-              <a:t>MS team follow-up. One big finding. (click)</a:t>
+              <a:t>Team did -&gt; One big finding. (click)</a:t>
             </a:r>
           </a:p>
           <a:p>
@@ -34013,7 +34390,17 @@
             </a:pPr>
             <a:r>
               <a:rPr lang="en-US" dirty="0"/>
-              <a:t>Amplified all the existing problems.</a:t>
+              <a:t>Reproduced our results, and</a:t>
+            </a:r>
+          </a:p>
+          <a:p>
+            <a:pPr marL="628650" lvl="1" indent="-171450">
+              <a:buFont typeface="Arial" panose="020B0604020202020204" pitchFamily="34" charset="0"/>
+              <a:buChar char="•"/>
+            </a:pPr>
+            <a:r>
+              <a:rPr lang="en-US" dirty="0"/>
+              <a:t>It amplified all the existing problems.</a:t>
             </a:r>
           </a:p>
           <a:p>
@@ -34084,242 +34471,6 @@
 </p:notes>
 </file>
 
-<file path=ppt/notesSlides/notesSlide14.xml><?xml version="1.0" encoding="utf-8"?>
-<p:notes xmlns:a="http://schemas.openxmlformats.org/drawingml/2006/main" xmlns:r="http://schemas.openxmlformats.org/officeDocument/2006/relationships" xmlns:p="http://schemas.openxmlformats.org/presentationml/2006/main">
-  <p:cSld>
-    <p:spTree>
-      <p:nvGrpSpPr>
-        <p:cNvPr id="1" name=""/>
-        <p:cNvGrpSpPr/>
-        <p:nvPr/>
-      </p:nvGrpSpPr>
-      <p:grpSpPr>
-        <a:xfrm>
-          <a:off x="0" y="0"/>
-          <a:ext cx="0" cy="0"/>
-          <a:chOff x="0" y="0"/>
-          <a:chExt cx="0" cy="0"/>
-        </a:xfrm>
-      </p:grpSpPr>
-      <p:sp>
-        <p:nvSpPr>
-          <p:cNvPr id="2" name="Slide Image Placeholder 1"/>
-          <p:cNvSpPr>
-            <a:spLocks noGrp="1" noRot="1" noChangeAspect="1"/>
-          </p:cNvSpPr>
-          <p:nvPr>
-            <p:ph type="sldImg"/>
-          </p:nvPr>
-        </p:nvSpPr>
-        <p:spPr/>
-      </p:sp>
-      <p:sp>
-        <p:nvSpPr>
-          <p:cNvPr id="3" name="Notes Placeholder 2"/>
-          <p:cNvSpPr>
-            <a:spLocks noGrp="1"/>
-          </p:cNvSpPr>
-          <p:nvPr>
-            <p:ph type="body" idx="1"/>
-          </p:nvPr>
-        </p:nvSpPr>
-        <p:spPr/>
-        <p:txBody>
-          <a:bodyPr/>
-          <a:lstStyle/>
-          <a:p>
-            <a:r>
-              <a:rPr lang="en-US" dirty="0"/>
-              <a:t>Many ways to make a change. All have same parts, but different order.</a:t>
-            </a:r>
-          </a:p>
-          <a:p>
-            <a:endParaRPr lang="en-US" dirty="0"/>
-          </a:p>
-          <a:p>
-            <a:r>
-              <a:rPr lang="en-US" dirty="0"/>
-              <a:t>Parts: identify problem, generate ideas (diverge), decide among them (converge), implement them (partially), verify them (pass or fail).</a:t>
-            </a:r>
-          </a:p>
-          <a:p>
-            <a:endParaRPr lang="en-US" dirty="0"/>
-          </a:p>
-          <a:p>
-            <a:r>
-              <a:rPr lang="en-US" dirty="0" err="1"/>
-              <a:t>Rqt</a:t>
-            </a:r>
-            <a:r>
-              <a:rPr lang="en-US" dirty="0"/>
-              <a:t>: </a:t>
-            </a:r>
-            <a:r>
-              <a:rPr lang="en-US" dirty="0" err="1"/>
-              <a:t>impl</a:t>
-            </a:r>
-            <a:r>
-              <a:rPr lang="en-US" dirty="0"/>
-              <a:t> before verify, and </a:t>
-            </a:r>
-            <a:r>
-              <a:rPr lang="en-US" dirty="0" err="1"/>
-              <a:t>impl</a:t>
-            </a:r>
-            <a:r>
-              <a:rPr lang="en-US" dirty="0"/>
-              <a:t>, choose, and verify must all be after ideas</a:t>
-            </a:r>
-          </a:p>
-        </p:txBody>
-      </p:sp>
-      <p:sp>
-        <p:nvSpPr>
-          <p:cNvPr id="4" name="Slide Number Placeholder 3"/>
-          <p:cNvSpPr>
-            <a:spLocks noGrp="1"/>
-          </p:cNvSpPr>
-          <p:nvPr>
-            <p:ph type="sldNum" sz="quarter" idx="5"/>
-          </p:nvPr>
-        </p:nvSpPr>
-        <p:spPr/>
-        <p:txBody>
-          <a:bodyPr/>
-          <a:lstStyle/>
-          <a:p>
-            <a:fld id="{2E396785-7325-4959-B34C-58C3AEDA50A1}" type="slidenum">
-              <a:rPr lang="en-US" smtClean="0"/>
-              <a:t>18</a:t>
-            </a:fld>
-            <a:endParaRPr lang="en-US"/>
-          </a:p>
-        </p:txBody>
-      </p:sp>
-    </p:spTree>
-    <p:extLst>
-      <p:ext uri="{BB962C8B-B14F-4D97-AF65-F5344CB8AC3E}">
-        <p14:creationId xmlns:p14="http://schemas.microsoft.com/office/powerpoint/2010/main" val="3169776868"/>
-      </p:ext>
-    </p:extLst>
-  </p:cSld>
-  <p:clrMapOvr>
-    <a:masterClrMapping/>
-  </p:clrMapOvr>
-</p:notes>
-</file>
-
-<file path=ppt/notesSlides/notesSlide15.xml><?xml version="1.0" encoding="utf-8"?>
-<p:notes xmlns:a="http://schemas.openxmlformats.org/drawingml/2006/main" xmlns:r="http://schemas.openxmlformats.org/officeDocument/2006/relationships" xmlns:p="http://schemas.openxmlformats.org/presentationml/2006/main">
-  <p:cSld>
-    <p:spTree>
-      <p:nvGrpSpPr>
-        <p:cNvPr id="1" name=""/>
-        <p:cNvGrpSpPr/>
-        <p:nvPr/>
-      </p:nvGrpSpPr>
-      <p:grpSpPr>
-        <a:xfrm>
-          <a:off x="0" y="0"/>
-          <a:ext cx="0" cy="0"/>
-          <a:chOff x="0" y="0"/>
-          <a:chExt cx="0" cy="0"/>
-        </a:xfrm>
-      </p:grpSpPr>
-      <p:sp>
-        <p:nvSpPr>
-          <p:cNvPr id="2" name="Slide Image Placeholder 1"/>
-          <p:cNvSpPr>
-            <a:spLocks noGrp="1" noRot="1" noChangeAspect="1"/>
-          </p:cNvSpPr>
-          <p:nvPr>
-            <p:ph type="sldImg"/>
-          </p:nvPr>
-        </p:nvSpPr>
-        <p:spPr/>
-      </p:sp>
-      <p:sp>
-        <p:nvSpPr>
-          <p:cNvPr id="3" name="Notes Placeholder 2"/>
-          <p:cNvSpPr>
-            <a:spLocks noGrp="1"/>
-          </p:cNvSpPr>
-          <p:nvPr>
-            <p:ph type="body" idx="1"/>
-          </p:nvPr>
-        </p:nvSpPr>
-        <p:spPr/>
-        <p:txBody>
-          <a:bodyPr/>
-          <a:lstStyle/>
-          <a:p>
-            <a:r>
-              <a:rPr lang="en-US" dirty="0"/>
-              <a:t>2 contexts</a:t>
-            </a:r>
-          </a:p>
-          <a:p>
-            <a:r>
-              <a:rPr lang="en-US" dirty="0"/>
-              <a:t>Usually lacks formal verify</a:t>
-            </a:r>
-          </a:p>
-          <a:p>
-            <a:r>
-              <a:rPr lang="en-US" dirty="0"/>
-              <a:t>Will succeed or fail</a:t>
-            </a:r>
-          </a:p>
-          <a:p>
-            <a:r>
-              <a:rPr lang="en-US" dirty="0"/>
-              <a:t>Only team knows result; leaders appear clueless</a:t>
-            </a:r>
-          </a:p>
-          <a:p>
-            <a:r>
-              <a:rPr lang="en-US" dirty="0"/>
-              <a:t>Breaks trust</a:t>
-            </a:r>
-          </a:p>
-        </p:txBody>
-      </p:sp>
-      <p:sp>
-        <p:nvSpPr>
-          <p:cNvPr id="4" name="Slide Number Placeholder 3"/>
-          <p:cNvSpPr>
-            <a:spLocks noGrp="1"/>
-          </p:cNvSpPr>
-          <p:nvPr>
-            <p:ph type="sldNum" sz="quarter" idx="5"/>
-          </p:nvPr>
-        </p:nvSpPr>
-        <p:spPr/>
-        <p:txBody>
-          <a:bodyPr/>
-          <a:lstStyle/>
-          <a:p>
-            <a:fld id="{2E396785-7325-4959-B34C-58C3AEDA50A1}" type="slidenum">
-              <a:rPr lang="en-US" smtClean="0"/>
-              <a:t>19</a:t>
-            </a:fld>
-            <a:endParaRPr lang="en-US"/>
-          </a:p>
-        </p:txBody>
-      </p:sp>
-    </p:spTree>
-    <p:extLst>
-      <p:ext uri="{BB962C8B-B14F-4D97-AF65-F5344CB8AC3E}">
-        <p14:creationId xmlns:p14="http://schemas.microsoft.com/office/powerpoint/2010/main" val="2067075583"/>
-      </p:ext>
-    </p:extLst>
-  </p:cSld>
-  <p:clrMapOvr>
-    <a:masterClrMapping/>
-  </p:clrMapOvr>
-</p:notes>
-</file>
-
 <file path=ppt/notesSlides/notesSlide16.xml><?xml version="1.0" encoding="utf-8"?>
 <p:notes xmlns:a="http://schemas.openxmlformats.org/drawingml/2006/main" xmlns:r="http://schemas.openxmlformats.org/officeDocument/2006/relationships" xmlns:p="http://schemas.openxmlformats.org/presentationml/2006/main">
   <p:cSld>
@@ -34366,6 +34517,299 @@
           <a:p>
             <a:r>
               <a:rPr lang="en-US" dirty="0"/>
+              <a:t>Many ways -&gt; same parts / different order.</a:t>
+            </a:r>
+          </a:p>
+          <a:p>
+            <a:endParaRPr lang="en-US" dirty="0"/>
+          </a:p>
+          <a:p>
+            <a:r>
+              <a:rPr lang="en-US" dirty="0"/>
+              <a:t>identify problem</a:t>
+            </a:r>
+          </a:p>
+          <a:p>
+            <a:r>
+              <a:rPr lang="en-US" dirty="0"/>
+              <a:t>generate ideas -&gt; (diverge),</a:t>
+            </a:r>
+          </a:p>
+          <a:p>
+            <a:r>
+              <a:rPr lang="en-US" dirty="0"/>
+              <a:t>decide among them -&gt; (converge),</a:t>
+            </a:r>
+          </a:p>
+          <a:p>
+            <a:r>
+              <a:rPr lang="en-US" dirty="0"/>
+              <a:t>implement them -&gt; (partially),</a:t>
+            </a:r>
+          </a:p>
+          <a:p>
+            <a:r>
+              <a:rPr lang="en-US" dirty="0"/>
+              <a:t>verify them -&gt; (pass or fail).</a:t>
+            </a:r>
+          </a:p>
+          <a:p>
+            <a:endParaRPr lang="en-US" dirty="0"/>
+          </a:p>
+          <a:p>
+            <a:r>
+              <a:rPr lang="en-US" dirty="0" err="1"/>
+              <a:t>Rqt</a:t>
+            </a:r>
+            <a:r>
+              <a:rPr lang="en-US" dirty="0"/>
+              <a:t>:</a:t>
+            </a:r>
+          </a:p>
+          <a:p>
+            <a:r>
+              <a:rPr lang="en-US" dirty="0"/>
+              <a:t>Verify always present, even if skipped</a:t>
+            </a:r>
+          </a:p>
+          <a:p>
+            <a:r>
+              <a:rPr lang="en-US" dirty="0" err="1"/>
+              <a:t>impl</a:t>
+            </a:r>
+            <a:r>
+              <a:rPr lang="en-US" dirty="0"/>
+              <a:t> before verify,</a:t>
+            </a:r>
+          </a:p>
+          <a:p>
+            <a:r>
+              <a:rPr lang="en-US" dirty="0"/>
+              <a:t>Ideas before </a:t>
+            </a:r>
+            <a:r>
+              <a:rPr lang="en-US" dirty="0" err="1"/>
+              <a:t>impl</a:t>
+            </a:r>
+            <a:r>
+              <a:rPr lang="en-US" dirty="0"/>
+              <a:t>, choose, and verify</a:t>
+            </a:r>
+          </a:p>
+        </p:txBody>
+      </p:sp>
+      <p:sp>
+        <p:nvSpPr>
+          <p:cNvPr id="4" name="Slide Number Placeholder 3"/>
+          <p:cNvSpPr>
+            <a:spLocks noGrp="1"/>
+          </p:cNvSpPr>
+          <p:nvPr>
+            <p:ph type="sldNum" sz="quarter" idx="5"/>
+          </p:nvPr>
+        </p:nvSpPr>
+        <p:spPr/>
+        <p:txBody>
+          <a:bodyPr/>
+          <a:lstStyle/>
+          <a:p>
+            <a:fld id="{2E396785-7325-4959-B34C-58C3AEDA50A1}" type="slidenum">
+              <a:rPr lang="en-US" smtClean="0"/>
+              <a:t>18</a:t>
+            </a:fld>
+            <a:endParaRPr lang="en-US"/>
+          </a:p>
+        </p:txBody>
+      </p:sp>
+    </p:spTree>
+    <p:extLst>
+      <p:ext uri="{BB962C8B-B14F-4D97-AF65-F5344CB8AC3E}">
+        <p14:creationId xmlns:p14="http://schemas.microsoft.com/office/powerpoint/2010/main" val="3169776868"/>
+      </p:ext>
+    </p:extLst>
+  </p:cSld>
+  <p:clrMapOvr>
+    <a:masterClrMapping/>
+  </p:clrMapOvr>
+</p:notes>
+</file>
+
+<file path=ppt/notesSlides/notesSlide17.xml><?xml version="1.0" encoding="utf-8"?>
+<p:notes xmlns:a="http://schemas.openxmlformats.org/drawingml/2006/main" xmlns:r="http://schemas.openxmlformats.org/officeDocument/2006/relationships" xmlns:p="http://schemas.openxmlformats.org/presentationml/2006/main">
+  <p:cSld>
+    <p:spTree>
+      <p:nvGrpSpPr>
+        <p:cNvPr id="1" name=""/>
+        <p:cNvGrpSpPr/>
+        <p:nvPr/>
+      </p:nvGrpSpPr>
+      <p:grpSpPr>
+        <a:xfrm>
+          <a:off x="0" y="0"/>
+          <a:ext cx="0" cy="0"/>
+          <a:chOff x="0" y="0"/>
+          <a:chExt cx="0" cy="0"/>
+        </a:xfrm>
+      </p:grpSpPr>
+      <p:sp>
+        <p:nvSpPr>
+          <p:cNvPr id="2" name="Slide Image Placeholder 1"/>
+          <p:cNvSpPr>
+            <a:spLocks noGrp="1" noRot="1" noChangeAspect="1"/>
+          </p:cNvSpPr>
+          <p:nvPr>
+            <p:ph type="sldImg"/>
+          </p:nvPr>
+        </p:nvSpPr>
+        <p:spPr/>
+      </p:sp>
+      <p:sp>
+        <p:nvSpPr>
+          <p:cNvPr id="3" name="Notes Placeholder 2"/>
+          <p:cNvSpPr>
+            <a:spLocks noGrp="1"/>
+          </p:cNvSpPr>
+          <p:nvPr>
+            <p:ph type="body" idx="1"/>
+          </p:nvPr>
+        </p:nvSpPr>
+        <p:spPr/>
+        <p:txBody>
+          <a:bodyPr/>
+          <a:lstStyle/>
+          <a:p>
+            <a:r>
+              <a:rPr lang="en-US" dirty="0" err="1"/>
+              <a:t>Mgr</a:t>
+            </a:r>
+            <a:r>
+              <a:rPr lang="en-US" dirty="0"/>
+              <a:t> or architect edict</a:t>
+            </a:r>
+          </a:p>
+          <a:p>
+            <a:endParaRPr lang="en-US" dirty="0"/>
+          </a:p>
+          <a:p>
+            <a:r>
+              <a:rPr lang="en-US" dirty="0"/>
+              <a:t>2 contexts</a:t>
+            </a:r>
+          </a:p>
+          <a:p>
+            <a:r>
+              <a:rPr lang="en-US" dirty="0"/>
+              <a:t>Usually lacks formal verify</a:t>
+            </a:r>
+          </a:p>
+          <a:p>
+            <a:r>
+              <a:rPr lang="en-US" dirty="0"/>
+              <a:t>Will succeed or fail</a:t>
+            </a:r>
+          </a:p>
+          <a:p>
+            <a:r>
+              <a:rPr lang="en-US" dirty="0"/>
+              <a:t>Only team knows result; leaders appear clueless</a:t>
+            </a:r>
+          </a:p>
+          <a:p>
+            <a:r>
+              <a:rPr lang="en-US" dirty="0"/>
+              <a:t>Breaks trust from teams to leaders</a:t>
+            </a:r>
+          </a:p>
+        </p:txBody>
+      </p:sp>
+      <p:sp>
+        <p:nvSpPr>
+          <p:cNvPr id="4" name="Slide Number Placeholder 3"/>
+          <p:cNvSpPr>
+            <a:spLocks noGrp="1"/>
+          </p:cNvSpPr>
+          <p:nvPr>
+            <p:ph type="sldNum" sz="quarter" idx="5"/>
+          </p:nvPr>
+        </p:nvSpPr>
+        <p:spPr/>
+        <p:txBody>
+          <a:bodyPr/>
+          <a:lstStyle/>
+          <a:p>
+            <a:fld id="{2E396785-7325-4959-B34C-58C3AEDA50A1}" type="slidenum">
+              <a:rPr lang="en-US" smtClean="0"/>
+              <a:t>19</a:t>
+            </a:fld>
+            <a:endParaRPr lang="en-US"/>
+          </a:p>
+        </p:txBody>
+      </p:sp>
+    </p:spTree>
+    <p:extLst>
+      <p:ext uri="{BB962C8B-B14F-4D97-AF65-F5344CB8AC3E}">
+        <p14:creationId xmlns:p14="http://schemas.microsoft.com/office/powerpoint/2010/main" val="2067075583"/>
+      </p:ext>
+    </p:extLst>
+  </p:cSld>
+  <p:clrMapOvr>
+    <a:masterClrMapping/>
+  </p:clrMapOvr>
+</p:notes>
+</file>
+
+<file path=ppt/notesSlides/notesSlide18.xml><?xml version="1.0" encoding="utf-8"?>
+<p:notes xmlns:a="http://schemas.openxmlformats.org/drawingml/2006/main" xmlns:r="http://schemas.openxmlformats.org/officeDocument/2006/relationships" xmlns:p="http://schemas.openxmlformats.org/presentationml/2006/main">
+  <p:cSld>
+    <p:spTree>
+      <p:nvGrpSpPr>
+        <p:cNvPr id="1" name=""/>
+        <p:cNvGrpSpPr/>
+        <p:nvPr/>
+      </p:nvGrpSpPr>
+      <p:grpSpPr>
+        <a:xfrm>
+          <a:off x="0" y="0"/>
+          <a:ext cx="0" cy="0"/>
+          <a:chOff x="0" y="0"/>
+          <a:chExt cx="0" cy="0"/>
+        </a:xfrm>
+      </p:grpSpPr>
+      <p:sp>
+        <p:nvSpPr>
+          <p:cNvPr id="2" name="Slide Image Placeholder 1"/>
+          <p:cNvSpPr>
+            <a:spLocks noGrp="1" noRot="1" noChangeAspect="1"/>
+          </p:cNvSpPr>
+          <p:nvPr>
+            <p:ph type="sldImg"/>
+          </p:nvPr>
+        </p:nvSpPr>
+        <p:spPr/>
+      </p:sp>
+      <p:sp>
+        <p:nvSpPr>
+          <p:cNvPr id="3" name="Notes Placeholder 2"/>
+          <p:cNvSpPr>
+            <a:spLocks noGrp="1"/>
+          </p:cNvSpPr>
+          <p:nvPr>
+            <p:ph type="body" idx="1"/>
+          </p:nvPr>
+        </p:nvSpPr>
+        <p:spPr/>
+        <p:txBody>
+          <a:bodyPr/>
+          <a:lstStyle/>
+          <a:p>
+            <a:r>
+              <a:rPr lang="en-US" dirty="0"/>
+              <a:t>Same approach / decision process, just local</a:t>
+            </a:r>
+          </a:p>
+          <a:p>
+            <a:r>
+              <a:rPr lang="en-US" dirty="0"/>
               <a:t>Still often missing verify</a:t>
             </a:r>
           </a:p>
@@ -34379,6 +34823,24 @@
             <a:r>
               <a:rPr lang="en-US" dirty="0"/>
               <a:t>Failures will come back in future retro</a:t>
+            </a:r>
+          </a:p>
+          <a:p>
+            <a:r>
+              <a:rPr lang="en-US" dirty="0"/>
+              <a:t>Will succeed eventually</a:t>
+            </a:r>
+          </a:p>
+          <a:p>
+            <a:r>
+              <a:rPr lang="en-US" dirty="0"/>
+              <a:t>Looks wasteful / chaotic from outside</a:t>
+            </a:r>
+          </a:p>
+          <a:p>
+            <a:r>
+              <a:rPr lang="en-US" dirty="0"/>
+              <a:t>Breaks trust from leaders to teams</a:t>
             </a:r>
           </a:p>
         </p:txBody>
@@ -34419,7 +34881,7 @@
 </p:notes>
 </file>
 
-<file path=ppt/notesSlides/notesSlide17.xml><?xml version="1.0" encoding="utf-8"?>
+<file path=ppt/notesSlides/notesSlide19.xml><?xml version="1.0" encoding="utf-8"?>
 <p:notes xmlns:a="http://schemas.openxmlformats.org/drawingml/2006/main" xmlns:r="http://schemas.openxmlformats.org/officeDocument/2006/relationships" xmlns:p="http://schemas.openxmlformats.org/presentationml/2006/main">
   <p:cSld>
     <p:spTree>
@@ -34477,6 +34939,58 @@
               <a:t>Usually works, because you choose a problem that makes the verification pass!</a:t>
             </a:r>
           </a:p>
+          <a:p>
+            <a:r>
+              <a:rPr lang="en-US" dirty="0"/>
+              <a:t>Looks intentional and successful; reinforces trust</a:t>
+            </a:r>
+          </a:p>
+          <a:p>
+            <a:pPr marL="0" marR="0" lvl="0" indent="0" algn="l" defTabSz="914400" rtl="0" eaLnBrk="1" fontAlgn="auto" latinLnBrk="0" hangingPunct="1">
+              <a:lnSpc>
+                <a:spcPct val="100000"/>
+              </a:lnSpc>
+              <a:spcBef>
+                <a:spcPts val="0"/>
+              </a:spcBef>
+              <a:spcAft>
+                <a:spcPts val="0"/>
+              </a:spcAft>
+              <a:buClrTx/>
+              <a:buSzTx/>
+              <a:buFontTx/>
+              <a:buNone/>
+              <a:tabLst/>
+              <a:defRPr/>
+            </a:pPr>
+            <a:endParaRPr lang="en-US" dirty="0"/>
+          </a:p>
+          <a:p>
+            <a:pPr marL="0" marR="0" lvl="0" indent="0" algn="l" defTabSz="914400" rtl="0" eaLnBrk="1" fontAlgn="auto" latinLnBrk="0" hangingPunct="1">
+              <a:lnSpc>
+                <a:spcPct val="100000"/>
+              </a:lnSpc>
+              <a:spcBef>
+                <a:spcPts val="0"/>
+              </a:spcBef>
+              <a:spcAft>
+                <a:spcPts val="0"/>
+              </a:spcAft>
+              <a:buClrTx/>
+              <a:buSzTx/>
+              <a:buFontTx/>
+              <a:buNone/>
+              <a:tabLst/>
+              <a:defRPr/>
+            </a:pPr>
+            <a:r>
+              <a:rPr lang="en-US" dirty="0"/>
+              <a:t>But often misses your key problem</a:t>
+            </a:r>
+          </a:p>
+          <a:p>
+            <a:endParaRPr lang="en-US" dirty="0"/>
+          </a:p>
         </p:txBody>
       </p:sp>
       <p:sp>
@@ -34506,198 +35020,6 @@
     <p:extLst>
       <p:ext uri="{BB962C8B-B14F-4D97-AF65-F5344CB8AC3E}">
         <p14:creationId xmlns:p14="http://schemas.microsoft.com/office/powerpoint/2010/main" val="1090915862"/>
-      </p:ext>
-    </p:extLst>
-  </p:cSld>
-  <p:clrMapOvr>
-    <a:masterClrMapping/>
-  </p:clrMapOvr>
-</p:notes>
-</file>
-
-<file path=ppt/notesSlides/notesSlide18.xml><?xml version="1.0" encoding="utf-8"?>
-<p:notes xmlns:a="http://schemas.openxmlformats.org/drawingml/2006/main" xmlns:r="http://schemas.openxmlformats.org/officeDocument/2006/relationships" xmlns:p="http://schemas.openxmlformats.org/presentationml/2006/main">
-  <p:cSld>
-    <p:spTree>
-      <p:nvGrpSpPr>
-        <p:cNvPr id="1" name=""/>
-        <p:cNvGrpSpPr/>
-        <p:nvPr/>
-      </p:nvGrpSpPr>
-      <p:grpSpPr>
-        <a:xfrm>
-          <a:off x="0" y="0"/>
-          <a:ext cx="0" cy="0"/>
-          <a:chOff x="0" y="0"/>
-          <a:chExt cx="0" cy="0"/>
-        </a:xfrm>
-      </p:grpSpPr>
-      <p:sp>
-        <p:nvSpPr>
-          <p:cNvPr id="2" name="Slide Image Placeholder 1"/>
-          <p:cNvSpPr>
-            <a:spLocks noGrp="1" noRot="1" noChangeAspect="1"/>
-          </p:cNvSpPr>
-          <p:nvPr>
-            <p:ph type="sldImg"/>
-          </p:nvPr>
-        </p:nvSpPr>
-        <p:spPr/>
-      </p:sp>
-      <p:sp>
-        <p:nvSpPr>
-          <p:cNvPr id="3" name="Notes Placeholder 2"/>
-          <p:cNvSpPr>
-            <a:spLocks noGrp="1"/>
-          </p:cNvSpPr>
-          <p:nvPr>
-            <p:ph type="body" idx="1"/>
-          </p:nvPr>
-        </p:nvSpPr>
-        <p:spPr/>
-        <p:txBody>
-          <a:bodyPr/>
-          <a:lstStyle/>
-          <a:p>
-            <a:r>
-              <a:rPr lang="en-US" dirty="0"/>
-              <a:t>Never fail! They only guess after they know the answer!</a:t>
-            </a:r>
-          </a:p>
-          <a:p>
-            <a:endParaRPr lang="en-US" dirty="0"/>
-          </a:p>
-          <a:p>
-            <a:r>
-              <a:rPr lang="en-US" dirty="0"/>
-              <a:t>Pick among known-good solutions.</a:t>
-            </a:r>
-          </a:p>
-        </p:txBody>
-      </p:sp>
-      <p:sp>
-        <p:nvSpPr>
-          <p:cNvPr id="4" name="Slide Number Placeholder 3"/>
-          <p:cNvSpPr>
-            <a:spLocks noGrp="1"/>
-          </p:cNvSpPr>
-          <p:nvPr>
-            <p:ph type="sldNum" sz="quarter" idx="5"/>
-          </p:nvPr>
-        </p:nvSpPr>
-        <p:spPr/>
-        <p:txBody>
-          <a:bodyPr/>
-          <a:lstStyle/>
-          <a:p>
-            <a:fld id="{2E396785-7325-4959-B34C-58C3AEDA50A1}" type="slidenum">
-              <a:rPr lang="en-US" smtClean="0"/>
-              <a:t>22</a:t>
-            </a:fld>
-            <a:endParaRPr lang="en-US"/>
-          </a:p>
-        </p:txBody>
-      </p:sp>
-    </p:spTree>
-    <p:extLst>
-      <p:ext uri="{BB962C8B-B14F-4D97-AF65-F5344CB8AC3E}">
-        <p14:creationId xmlns:p14="http://schemas.microsoft.com/office/powerpoint/2010/main" val="2966629978"/>
-      </p:ext>
-    </p:extLst>
-  </p:cSld>
-  <p:clrMapOvr>
-    <a:masterClrMapping/>
-  </p:clrMapOvr>
-</p:notes>
-</file>
-
-<file path=ppt/notesSlides/notesSlide19.xml><?xml version="1.0" encoding="utf-8"?>
-<p:notes xmlns:a="http://schemas.openxmlformats.org/drawingml/2006/main" xmlns:r="http://schemas.openxmlformats.org/officeDocument/2006/relationships" xmlns:p="http://schemas.openxmlformats.org/presentationml/2006/main">
-  <p:cSld>
-    <p:spTree>
-      <p:nvGrpSpPr>
-        <p:cNvPr id="1" name=""/>
-        <p:cNvGrpSpPr/>
-        <p:nvPr/>
-      </p:nvGrpSpPr>
-      <p:grpSpPr>
-        <a:xfrm>
-          <a:off x="0" y="0"/>
-          <a:ext cx="0" cy="0"/>
-          <a:chOff x="0" y="0"/>
-          <a:chExt cx="0" cy="0"/>
-        </a:xfrm>
-      </p:grpSpPr>
-      <p:sp>
-        <p:nvSpPr>
-          <p:cNvPr id="2" name="Slide Image Placeholder 1"/>
-          <p:cNvSpPr>
-            <a:spLocks noGrp="1" noRot="1" noChangeAspect="1"/>
-          </p:cNvSpPr>
-          <p:nvPr>
-            <p:ph type="sldImg"/>
-          </p:nvPr>
-        </p:nvSpPr>
-        <p:spPr/>
-      </p:sp>
-      <p:sp>
-        <p:nvSpPr>
-          <p:cNvPr id="3" name="Notes Placeholder 2"/>
-          <p:cNvSpPr>
-            <a:spLocks noGrp="1"/>
-          </p:cNvSpPr>
-          <p:nvPr>
-            <p:ph type="body" idx="1"/>
-          </p:nvPr>
-        </p:nvSpPr>
-        <p:spPr/>
-        <p:txBody>
-          <a:bodyPr/>
-          <a:lstStyle/>
-          <a:p>
-            <a:r>
-              <a:rPr lang="en-US" dirty="0"/>
-              <a:t>Never fail!</a:t>
-            </a:r>
-          </a:p>
-          <a:p>
-            <a:endParaRPr lang="en-US" dirty="0"/>
-          </a:p>
-          <a:p>
-            <a:r>
-              <a:rPr lang="en-US" dirty="0"/>
-              <a:t>Need to manage the divergence. Avoid analysis paralysis.</a:t>
-            </a:r>
-          </a:p>
-        </p:txBody>
-      </p:sp>
-      <p:sp>
-        <p:nvSpPr>
-          <p:cNvPr id="4" name="Slide Number Placeholder 3"/>
-          <p:cNvSpPr>
-            <a:spLocks noGrp="1"/>
-          </p:cNvSpPr>
-          <p:nvPr>
-            <p:ph type="sldNum" sz="quarter" idx="5"/>
-          </p:nvPr>
-        </p:nvSpPr>
-        <p:spPr/>
-        <p:txBody>
-          <a:bodyPr/>
-          <a:lstStyle/>
-          <a:p>
-            <a:fld id="{2E396785-7325-4959-B34C-58C3AEDA50A1}" type="slidenum">
-              <a:rPr lang="en-US" smtClean="0"/>
-              <a:t>23</a:t>
-            </a:fld>
-            <a:endParaRPr lang="en-US"/>
-          </a:p>
-        </p:txBody>
-      </p:sp>
-    </p:spTree>
-    <p:extLst>
-      <p:ext uri="{BB962C8B-B14F-4D97-AF65-F5344CB8AC3E}">
-        <p14:creationId xmlns:p14="http://schemas.microsoft.com/office/powerpoint/2010/main" val="1847428140"/>
       </p:ext>
     </p:extLst>
   </p:cSld>
@@ -34885,6 +35207,278 @@
           <a:bodyPr/>
           <a:lstStyle/>
           <a:p>
+            <a:r>
+              <a:rPr lang="en-US" dirty="0"/>
+              <a:t>Brilliant idea: Choose last!</a:t>
+            </a:r>
+          </a:p>
+          <a:p>
+            <a:endParaRPr lang="en-US" dirty="0"/>
+          </a:p>
+          <a:p>
+            <a:r>
+              <a:rPr lang="en-US" dirty="0"/>
+              <a:t>Never fail!</a:t>
+            </a:r>
+          </a:p>
+          <a:p>
+            <a:r>
+              <a:rPr lang="en-US" dirty="0"/>
+              <a:t>Pick among known-good solutions.</a:t>
+            </a:r>
+          </a:p>
+          <a:p>
+            <a:endParaRPr lang="en-US" dirty="0"/>
+          </a:p>
+          <a:p>
+            <a:r>
+              <a:rPr lang="en-US" dirty="0"/>
+              <a:t>Look like super-genius</a:t>
+            </a:r>
+          </a:p>
+          <a:p>
+            <a:r>
+              <a:rPr lang="en-US" dirty="0"/>
+              <a:t>Establishes trust</a:t>
+            </a:r>
+          </a:p>
+          <a:p>
+            <a:endParaRPr lang="en-US" dirty="0"/>
+          </a:p>
+          <a:p>
+            <a:r>
+              <a:rPr lang="en-US" dirty="0"/>
+              <a:t>Only on one problem</a:t>
+            </a:r>
+          </a:p>
+          <a:p>
+            <a:r>
+              <a:rPr lang="en-US" dirty="0"/>
+              <a:t>Carefully-orchestrated illusion</a:t>
+            </a:r>
+          </a:p>
+          <a:p>
+            <a:endParaRPr lang="en-US" dirty="0"/>
+          </a:p>
+          <a:p>
+            <a:r>
+              <a:rPr lang="en-US" dirty="0"/>
+              <a:t>How to apply this idea?</a:t>
+            </a:r>
+          </a:p>
+        </p:txBody>
+      </p:sp>
+      <p:sp>
+        <p:nvSpPr>
+          <p:cNvPr id="4" name="Slide Number Placeholder 3"/>
+          <p:cNvSpPr>
+            <a:spLocks noGrp="1"/>
+          </p:cNvSpPr>
+          <p:nvPr>
+            <p:ph type="sldNum" sz="quarter" idx="5"/>
+          </p:nvPr>
+        </p:nvSpPr>
+        <p:spPr/>
+        <p:txBody>
+          <a:bodyPr/>
+          <a:lstStyle/>
+          <a:p>
+            <a:fld id="{2E396785-7325-4959-B34C-58C3AEDA50A1}" type="slidenum">
+              <a:rPr lang="en-US" smtClean="0"/>
+              <a:t>22</a:t>
+            </a:fld>
+            <a:endParaRPr lang="en-US"/>
+          </a:p>
+        </p:txBody>
+      </p:sp>
+    </p:spTree>
+    <p:extLst>
+      <p:ext uri="{BB962C8B-B14F-4D97-AF65-F5344CB8AC3E}">
+        <p14:creationId xmlns:p14="http://schemas.microsoft.com/office/powerpoint/2010/main" val="2966629978"/>
+      </p:ext>
+    </p:extLst>
+  </p:cSld>
+  <p:clrMapOvr>
+    <a:masterClrMapping/>
+  </p:clrMapOvr>
+</p:notes>
+</file>
+
+<file path=ppt/notesSlides/notesSlide21.xml><?xml version="1.0" encoding="utf-8"?>
+<p:notes xmlns:a="http://schemas.openxmlformats.org/drawingml/2006/main" xmlns:r="http://schemas.openxmlformats.org/officeDocument/2006/relationships" xmlns:p="http://schemas.openxmlformats.org/presentationml/2006/main">
+  <p:cSld>
+    <p:spTree>
+      <p:nvGrpSpPr>
+        <p:cNvPr id="1" name=""/>
+        <p:cNvGrpSpPr/>
+        <p:nvPr/>
+      </p:nvGrpSpPr>
+      <p:grpSpPr>
+        <a:xfrm>
+          <a:off x="0" y="0"/>
+          <a:ext cx="0" cy="0"/>
+          <a:chOff x="0" y="0"/>
+          <a:chExt cx="0" cy="0"/>
+        </a:xfrm>
+      </p:grpSpPr>
+      <p:sp>
+        <p:nvSpPr>
+          <p:cNvPr id="2" name="Slide Image Placeholder 1"/>
+          <p:cNvSpPr>
+            <a:spLocks noGrp="1" noRot="1" noChangeAspect="1"/>
+          </p:cNvSpPr>
+          <p:nvPr>
+            <p:ph type="sldImg"/>
+          </p:nvPr>
+        </p:nvSpPr>
+        <p:spPr/>
+      </p:sp>
+      <p:sp>
+        <p:nvSpPr>
+          <p:cNvPr id="3" name="Notes Placeholder 2"/>
+          <p:cNvSpPr>
+            <a:spLocks noGrp="1"/>
+          </p:cNvSpPr>
+          <p:nvPr>
+            <p:ph type="body" idx="1"/>
+          </p:nvPr>
+        </p:nvSpPr>
+        <p:spPr/>
+        <p:txBody>
+          <a:bodyPr/>
+          <a:lstStyle/>
+          <a:p>
+            <a:pPr marL="0" marR="0" lvl="0" indent="0" algn="l" defTabSz="914400" rtl="0" eaLnBrk="1" fontAlgn="auto" latinLnBrk="0" hangingPunct="1">
+              <a:lnSpc>
+                <a:spcPct val="100000"/>
+              </a:lnSpc>
+              <a:spcBef>
+                <a:spcPts val="0"/>
+              </a:spcBef>
+              <a:spcAft>
+                <a:spcPts val="0"/>
+              </a:spcAft>
+              <a:buClrTx/>
+              <a:buSzTx/>
+              <a:buFontTx/>
+              <a:buNone/>
+              <a:tabLst/>
+              <a:defRPr/>
+            </a:pPr>
+            <a:r>
+              <a:rPr lang="en-US" dirty="0"/>
+              <a:t>Solves most important problem.</a:t>
+            </a:r>
+          </a:p>
+          <a:p>
+            <a:r>
+              <a:rPr lang="en-US" dirty="0"/>
+              <a:t>Never fail!</a:t>
+            </a:r>
+          </a:p>
+          <a:p>
+            <a:r>
+              <a:rPr lang="en-US" dirty="0"/>
+              <a:t>Look like super-genius.</a:t>
+            </a:r>
+          </a:p>
+          <a:p>
+            <a:r>
+              <a:rPr lang="en-US" dirty="0"/>
+              <a:t>Build crazy trust.</a:t>
+            </a:r>
+          </a:p>
+          <a:p>
+            <a:endParaRPr lang="en-US" dirty="0"/>
+          </a:p>
+          <a:p>
+            <a:r>
+              <a:rPr lang="en-US" dirty="0"/>
+              <a:t>Need to manage the divergence. Avoid analysis paralysis.</a:t>
+            </a:r>
+          </a:p>
+        </p:txBody>
+      </p:sp>
+      <p:sp>
+        <p:nvSpPr>
+          <p:cNvPr id="4" name="Slide Number Placeholder 3"/>
+          <p:cNvSpPr>
+            <a:spLocks noGrp="1"/>
+          </p:cNvSpPr>
+          <p:nvPr>
+            <p:ph type="sldNum" sz="quarter" idx="5"/>
+          </p:nvPr>
+        </p:nvSpPr>
+        <p:spPr/>
+        <p:txBody>
+          <a:bodyPr/>
+          <a:lstStyle/>
+          <a:p>
+            <a:fld id="{2E396785-7325-4959-B34C-58C3AEDA50A1}" type="slidenum">
+              <a:rPr lang="en-US" smtClean="0"/>
+              <a:t>23</a:t>
+            </a:fld>
+            <a:endParaRPr lang="en-US"/>
+          </a:p>
+        </p:txBody>
+      </p:sp>
+    </p:spTree>
+    <p:extLst>
+      <p:ext uri="{BB962C8B-B14F-4D97-AF65-F5344CB8AC3E}">
+        <p14:creationId xmlns:p14="http://schemas.microsoft.com/office/powerpoint/2010/main" val="1847428140"/>
+      </p:ext>
+    </p:extLst>
+  </p:cSld>
+  <p:clrMapOvr>
+    <a:masterClrMapping/>
+  </p:clrMapOvr>
+</p:notes>
+</file>
+
+<file path=ppt/notesSlides/notesSlide22.xml><?xml version="1.0" encoding="utf-8"?>
+<p:notes xmlns:a="http://schemas.openxmlformats.org/drawingml/2006/main" xmlns:r="http://schemas.openxmlformats.org/officeDocument/2006/relationships" xmlns:p="http://schemas.openxmlformats.org/presentationml/2006/main">
+  <p:cSld>
+    <p:spTree>
+      <p:nvGrpSpPr>
+        <p:cNvPr id="1" name=""/>
+        <p:cNvGrpSpPr/>
+        <p:nvPr/>
+      </p:nvGrpSpPr>
+      <p:grpSpPr>
+        <a:xfrm>
+          <a:off x="0" y="0"/>
+          <a:ext cx="0" cy="0"/>
+          <a:chOff x="0" y="0"/>
+          <a:chExt cx="0" cy="0"/>
+        </a:xfrm>
+      </p:grpSpPr>
+      <p:sp>
+        <p:nvSpPr>
+          <p:cNvPr id="2" name="Slide Image Placeholder 1"/>
+          <p:cNvSpPr>
+            <a:spLocks noGrp="1" noRot="1" noChangeAspect="1"/>
+          </p:cNvSpPr>
+          <p:nvPr>
+            <p:ph type="sldImg"/>
+          </p:nvPr>
+        </p:nvSpPr>
+        <p:spPr/>
+      </p:sp>
+      <p:sp>
+        <p:nvSpPr>
+          <p:cNvPr id="3" name="Notes Placeholder 2"/>
+          <p:cNvSpPr>
+            <a:spLocks noGrp="1"/>
+          </p:cNvSpPr>
+          <p:nvPr>
+            <p:ph type="body" idx="1"/>
+          </p:nvPr>
+        </p:nvSpPr>
+        <p:spPr/>
+        <p:txBody>
+          <a:bodyPr/>
+          <a:lstStyle/>
+          <a:p>
             <a:pPr marL="0" marR="0" lvl="0" indent="0" algn="l" defTabSz="914400" rtl="0" eaLnBrk="1" fontAlgn="auto" latinLnBrk="0" hangingPunct="1">
               <a:lnSpc>
                 <a:spcPct val="100000"/>
@@ -34950,6 +35544,115 @@
               <a:t>Don’t try to do both at once!</a:t>
             </a:r>
           </a:p>
+          <a:p>
+            <a:pPr marL="0" marR="0" lvl="0" indent="0" algn="l" defTabSz="914400" rtl="0" eaLnBrk="1" fontAlgn="auto" latinLnBrk="0" hangingPunct="1">
+              <a:lnSpc>
+                <a:spcPct val="100000"/>
+              </a:lnSpc>
+              <a:spcBef>
+                <a:spcPts val="0"/>
+              </a:spcBef>
+              <a:spcAft>
+                <a:spcPts val="0"/>
+              </a:spcAft>
+              <a:buClrTx/>
+              <a:buSzTx/>
+              <a:buFontTx/>
+              <a:buNone/>
+              <a:tabLst/>
+              <a:defRPr/>
+            </a:pPr>
+            <a:endParaRPr lang="en-US" dirty="0"/>
+          </a:p>
+          <a:p>
+            <a:pPr marL="0" marR="0" lvl="0" indent="0" algn="l" defTabSz="914400" rtl="0" eaLnBrk="1" fontAlgn="auto" latinLnBrk="0" hangingPunct="1">
+              <a:lnSpc>
+                <a:spcPct val="100000"/>
+              </a:lnSpc>
+              <a:spcBef>
+                <a:spcPts val="0"/>
+              </a:spcBef>
+              <a:spcAft>
+                <a:spcPts val="0"/>
+              </a:spcAft>
+              <a:buClrTx/>
+              <a:buSzTx/>
+              <a:buFontTx/>
+              <a:buNone/>
+              <a:tabLst/>
+              <a:defRPr/>
+            </a:pPr>
+            <a:r>
+              <a:rPr lang="en-US" dirty="0"/>
+              <a:t>How manage this complexity? -&gt; choose last!</a:t>
+            </a:r>
+          </a:p>
+          <a:p>
+            <a:pPr marL="0" marR="0" lvl="0" indent="0" algn="l" defTabSz="914400" rtl="0" eaLnBrk="1" fontAlgn="auto" latinLnBrk="0" hangingPunct="1">
+              <a:lnSpc>
+                <a:spcPct val="100000"/>
+              </a:lnSpc>
+              <a:spcBef>
+                <a:spcPts val="0"/>
+              </a:spcBef>
+              <a:spcAft>
+                <a:spcPts val="0"/>
+              </a:spcAft>
+              <a:buClrTx/>
+              <a:buSzTx/>
+              <a:buFontTx/>
+              <a:buNone/>
+              <a:tabLst/>
+              <a:defRPr/>
+            </a:pPr>
+            <a:r>
+              <a:rPr lang="en-US" dirty="0"/>
+              <a:t>notice similarities -&gt; structure week to work for either -&gt; pick which we do after we know the problem!</a:t>
+            </a:r>
+          </a:p>
+          <a:p>
+            <a:pPr marL="0" marR="0" lvl="0" indent="0" algn="l" defTabSz="914400" rtl="0" eaLnBrk="1" fontAlgn="auto" latinLnBrk="0" hangingPunct="1">
+              <a:lnSpc>
+                <a:spcPct val="100000"/>
+              </a:lnSpc>
+              <a:spcBef>
+                <a:spcPts val="0"/>
+              </a:spcBef>
+              <a:spcAft>
+                <a:spcPts val="0"/>
+              </a:spcAft>
+              <a:buClrTx/>
+              <a:buSzTx/>
+              <a:buFontTx/>
+              <a:buNone/>
+              <a:tabLst/>
+              <a:defRPr/>
+            </a:pPr>
+            <a:endParaRPr lang="en-US" dirty="0"/>
+          </a:p>
+          <a:p>
+            <a:pPr marL="0" marR="0" lvl="0" indent="0" algn="l" defTabSz="914400" rtl="0" eaLnBrk="1" fontAlgn="auto" latinLnBrk="0" hangingPunct="1">
+              <a:lnSpc>
+                <a:spcPct val="100000"/>
+              </a:lnSpc>
+              <a:spcBef>
+                <a:spcPts val="0"/>
+              </a:spcBef>
+              <a:spcAft>
+                <a:spcPts val="0"/>
+              </a:spcAft>
+              <a:buClrTx/>
+              <a:buSzTx/>
+              <a:buFontTx/>
+              <a:buNone/>
+              <a:tabLst/>
+              <a:defRPr/>
+            </a:pPr>
+            <a:r>
+              <a:rPr lang="en-US" dirty="0"/>
+              <a:t>Similarity:     plan -&gt; do -&gt; decide</a:t>
+            </a:r>
+          </a:p>
         </p:txBody>
       </p:sp>
       <p:sp>
@@ -34988,7 +35691,7 @@
 </p:notes>
 </file>
 
-<file path=ppt/notesSlides/notesSlide21.xml><?xml version="1.0" encoding="utf-8"?>
+<file path=ppt/notesSlides/notesSlide23.xml><?xml version="1.0" encoding="utf-8"?>
 <p:notes xmlns:a="http://schemas.openxmlformats.org/drawingml/2006/main" xmlns:r="http://schemas.openxmlformats.org/officeDocument/2006/relationships" xmlns:p="http://schemas.openxmlformats.org/presentationml/2006/main">
   <p:cSld>
     <p:spTree>
@@ -35068,7 +35771,17 @@
             </a:pPr>
             <a:r>
               <a:rPr lang="en-US" dirty="0"/>
-              <a:t>Optimally, gather problem data outside retro</a:t>
+              <a:t>Retro lacks “gather data” step.</a:t>
+            </a:r>
+          </a:p>
+          <a:p>
+            <a:pPr marL="171450" indent="-171450">
+              <a:buFont typeface="Arial" panose="020B0604020202020204" pitchFamily="34" charset="0"/>
+              <a:buChar char="•"/>
+            </a:pPr>
+            <a:r>
+              <a:rPr lang="en-US" dirty="0"/>
+              <a:t>In Do: Gather experiment results + unrelated pain points</a:t>
             </a:r>
           </a:p>
           <a:p>
@@ -35112,7 +35825,7 @@
 </p:notes>
 </file>
 
-<file path=ppt/notesSlides/notesSlide22.xml><?xml version="1.0" encoding="utf-8"?>
+<file path=ppt/notesSlides/notesSlide24.xml><?xml version="1.0" encoding="utf-8"?>
 <p:notes xmlns:a="http://schemas.openxmlformats.org/drawingml/2006/main" xmlns:r="http://schemas.openxmlformats.org/officeDocument/2006/relationships" xmlns:p="http://schemas.openxmlformats.org/presentationml/2006/main">
   <p:cSld>
     <p:spTree>
@@ -35156,7 +35869,25 @@
           <a:bodyPr/>
           <a:lstStyle/>
           <a:p>
+            <a:r>
+              <a:rPr lang="en-US" dirty="0"/>
+              <a:t>Key: measure wide; optimize for chance to be surprised.</a:t>
+            </a:r>
+          </a:p>
+          <a:p>
             <a:endParaRPr lang="en-US" dirty="0"/>
+          </a:p>
+          <a:p>
+            <a:r>
+              <a:rPr lang="en-US" dirty="0"/>
+              <a:t>Don’t read.</a:t>
+            </a:r>
+          </a:p>
+          <a:p>
+            <a:r>
+              <a:rPr lang="en-US" dirty="0"/>
+              <a:t>As reference in resources.</a:t>
+            </a:r>
           </a:p>
         </p:txBody>
       </p:sp>
@@ -35196,7 +35927,7 @@
 </p:notes>
 </file>
 
-<file path=ppt/notesSlides/notesSlide23.xml><?xml version="1.0" encoding="utf-8"?>
+<file path=ppt/notesSlides/notesSlide25.xml><?xml version="1.0" encoding="utf-8"?>
 <p:notes xmlns:a="http://schemas.openxmlformats.org/drawingml/2006/main" xmlns:r="http://schemas.openxmlformats.org/officeDocument/2006/relationships" xmlns:p="http://schemas.openxmlformats.org/presentationml/2006/main">
   <p:cSld>
     <p:spTree>
@@ -35240,7 +35971,25 @@
           <a:bodyPr/>
           <a:lstStyle/>
           <a:p>
+            <a:r>
+              <a:rPr lang="en-US" dirty="0"/>
+              <a:t>Key: habits and fluency. Optimize for uniformity and eliminate surprises.</a:t>
+            </a:r>
+          </a:p>
+          <a:p>
             <a:endParaRPr lang="en-US" dirty="0"/>
+          </a:p>
+          <a:p>
+            <a:r>
+              <a:rPr lang="en-US" dirty="0"/>
+              <a:t>Don’t read.</a:t>
+            </a:r>
+          </a:p>
+          <a:p>
+            <a:r>
+              <a:rPr lang="en-US" dirty="0"/>
+              <a:t>As reference in resources.</a:t>
+            </a:r>
           </a:p>
         </p:txBody>
       </p:sp>
@@ -35280,7 +36029,7 @@
 </p:notes>
 </file>
 
-<file path=ppt/notesSlides/notesSlide24.xml><?xml version="1.0" encoding="utf-8"?>
+<file path=ppt/notesSlides/notesSlide26.xml><?xml version="1.0" encoding="utf-8"?>
 <p:notes xmlns:a="http://schemas.openxmlformats.org/drawingml/2006/main" xmlns:r="http://schemas.openxmlformats.org/officeDocument/2006/relationships" xmlns:p="http://schemas.openxmlformats.org/presentationml/2006/main">
   <p:cSld>
     <p:spTree>
@@ -35348,7 +36097,7 @@
           <a:p>
             <a:fld id="{2E396785-7325-4959-B34C-58C3AEDA50A1}" type="slidenum">
               <a:rPr lang="en-US" smtClean="0"/>
-              <a:t>28</a:t>
+              <a:t>29</a:t>
             </a:fld>
             <a:endParaRPr lang="en-US"/>
           </a:p>
@@ -35367,7 +36116,7 @@
 </p:notes>
 </file>
 
-<file path=ppt/notesSlides/notesSlide25.xml><?xml version="1.0" encoding="utf-8"?>
+<file path=ppt/notesSlides/notesSlide27.xml><?xml version="1.0" encoding="utf-8"?>
 <p:notes xmlns:a="http://schemas.openxmlformats.org/drawingml/2006/main" xmlns:r="http://schemas.openxmlformats.org/officeDocument/2006/relationships" xmlns:p="http://schemas.openxmlformats.org/presentationml/2006/main">
   <p:cSld>
     <p:spTree>
@@ -35413,45 +36162,8 @@
           <a:p>
             <a:r>
               <a:rPr lang="en-US" dirty="0"/>
-              <a:t>Key points:</a:t>
+              <a:t>To get there, swap your retro</a:t>
             </a:r>
-            <a:br>
-              <a:rPr lang="en-US" dirty="0"/>
-            </a:br>
-            <a:endParaRPr lang="en-US" dirty="0"/>
-          </a:p>
-          <a:p>
-            <a:pPr marL="171450" indent="-171450">
-              <a:buFont typeface="Arial" panose="020B0604020202020204" pitchFamily="34" charset="0"/>
-              <a:buChar char="•"/>
-            </a:pPr>
-            <a:r>
-              <a:rPr lang="en-US" dirty="0"/>
-              <a:t>Each problem, choose to discover or improve. Align that way for the week.</a:t>
-            </a:r>
-          </a:p>
-          <a:p>
-            <a:pPr marL="171450" indent="-171450">
-              <a:buFont typeface="Arial" panose="020B0604020202020204" pitchFamily="34" charset="0"/>
-              <a:buChar char="•"/>
-            </a:pPr>
-            <a:r>
-              <a:rPr lang="en-US" dirty="0"/>
-              <a:t>Retro: demo past, then decide, then prioritize (shorts &amp; longs), then plan.</a:t>
-            </a:r>
-          </a:p>
-          <a:p>
-            <a:pPr marL="171450" indent="-171450">
-              <a:buFont typeface="Arial" panose="020B0604020202020204" pitchFamily="34" charset="0"/>
-              <a:buChar char="•"/>
-            </a:pPr>
-            <a:r>
-              <a:rPr lang="en-US" dirty="0"/>
-              <a:t>Optimally, gather problem data outside retro</a:t>
-            </a:r>
-          </a:p>
-          <a:p>
-            <a:endParaRPr lang="en-US" dirty="0"/>
           </a:p>
         </p:txBody>
       </p:sp>
@@ -35472,7 +36184,7 @@
           <a:p>
             <a:fld id="{2E396785-7325-4959-B34C-58C3AEDA50A1}" type="slidenum">
               <a:rPr lang="en-US" smtClean="0"/>
-              <a:t>29</a:t>
+              <a:t>30</a:t>
             </a:fld>
             <a:endParaRPr lang="en-US"/>
           </a:p>
@@ -35491,7 +36203,7 @@
 </p:notes>
 </file>
 
-<file path=ppt/notesSlides/notesSlide26.xml><?xml version="1.0" encoding="utf-8"?>
+<file path=ppt/notesSlides/notesSlide28.xml><?xml version="1.0" encoding="utf-8"?>
 <p:notes xmlns:a="http://schemas.openxmlformats.org/drawingml/2006/main" xmlns:r="http://schemas.openxmlformats.org/officeDocument/2006/relationships" xmlns:p="http://schemas.openxmlformats.org/presentationml/2006/main">
   <p:cSld>
     <p:spTree>
@@ -35559,7 +36271,7 @@
           <a:p>
             <a:fld id="{2E396785-7325-4959-B34C-58C3AEDA50A1}" type="slidenum">
               <a:rPr lang="en-US" smtClean="0"/>
-              <a:t>30</a:t>
+              <a:t>31</a:t>
             </a:fld>
             <a:endParaRPr lang="en-US"/>
           </a:p>
@@ -35652,6 +36364,59 @@
             </a:r>
           </a:p>
           <a:p>
+            <a:pPr marL="171450" marR="0" lvl="0" indent="-171450" algn="l" defTabSz="914400" rtl="0" eaLnBrk="1" fontAlgn="auto" latinLnBrk="0" hangingPunct="1">
+              <a:lnSpc>
+                <a:spcPct val="100000"/>
+              </a:lnSpc>
+              <a:spcBef>
+                <a:spcPts val="0"/>
+              </a:spcBef>
+              <a:spcAft>
+                <a:spcPts val="0"/>
+              </a:spcAft>
+              <a:buClrTx/>
+              <a:buSzTx/>
+              <a:buFont typeface="Arial" panose="020B0604020202020204" pitchFamily="34" charset="0"/>
+              <a:buChar char="•"/>
+              <a:tabLst/>
+              <a:defRPr/>
+            </a:pPr>
+            <a:r>
+              <a:rPr lang="en-US" dirty="0"/>
+              <a:t>But most effective was also hardest.</a:t>
+            </a:r>
+          </a:p>
+          <a:p>
+            <a:pPr marL="171450" marR="0" lvl="0" indent="-171450" algn="l" defTabSz="914400" rtl="0" eaLnBrk="1" fontAlgn="auto" latinLnBrk="0" hangingPunct="1">
+              <a:lnSpc>
+                <a:spcPct val="100000"/>
+              </a:lnSpc>
+              <a:spcBef>
+                <a:spcPts val="0"/>
+              </a:spcBef>
+              <a:spcAft>
+                <a:spcPts val="0"/>
+              </a:spcAft>
+              <a:buClrTx/>
+              <a:buSzTx/>
+              <a:buFont typeface="Arial" panose="020B0604020202020204" pitchFamily="34" charset="0"/>
+              <a:buChar char="•"/>
+              <a:tabLst/>
+              <a:defRPr/>
+            </a:pPr>
+            <a:r>
+              <a:rPr lang="en-US" dirty="0"/>
+              <a:t>Chose peak not because we like pain, but because we understood the data.</a:t>
+            </a:r>
+          </a:p>
+          <a:p>
+            <a:pPr marL="171450" indent="-171450">
+              <a:buFont typeface="Arial" panose="020B0604020202020204" pitchFamily="34" charset="0"/>
+              <a:buChar char="•"/>
+            </a:pPr>
+            <a:endParaRPr lang="en-US" dirty="0"/>
+          </a:p>
+          <a:p>
             <a:endParaRPr lang="en-US" dirty="0"/>
           </a:p>
         </p:txBody>
@@ -35742,7 +36507,7 @@
             </a:pPr>
             <a:r>
               <a:rPr lang="en-US" dirty="0"/>
-              <a:t>But most effective was also hardest.</a:t>
+              <a:t>Having finished Discovery, we now needed to Improve.</a:t>
             </a:r>
           </a:p>
           <a:p>
@@ -35752,17 +36517,53 @@
             </a:pPr>
             <a:r>
               <a:rPr lang="en-US" dirty="0"/>
-              <a:t>Team chose to use the egg timer. Not because we like pain, but because we understood the data.</a:t>
+              <a:t>And that means changing habits. For which we needs support, such as tools.</a:t>
             </a:r>
           </a:p>
           <a:p>
-            <a:pPr marL="171450" indent="-171450">
+            <a:pPr marL="171450" marR="0" lvl="0" indent="-171450" algn="l" defTabSz="914400" rtl="0" eaLnBrk="1" fontAlgn="auto" latinLnBrk="0" hangingPunct="1">
+              <a:lnSpc>
+                <a:spcPct val="100000"/>
+              </a:lnSpc>
+              <a:spcBef>
+                <a:spcPts val="0"/>
+              </a:spcBef>
+              <a:spcAft>
+                <a:spcPts val="0"/>
+              </a:spcAft>
+              <a:buClrTx/>
+              <a:buSzTx/>
               <a:buFont typeface="Arial" panose="020B0604020202020204" pitchFamily="34" charset="0"/>
               <a:buChar char="•"/>
+              <a:tabLst/>
+              <a:defRPr/>
             </a:pPr>
             <a:r>
               <a:rPr lang="en-US" dirty="0"/>
-              <a:t>Having finished Discovery, we now needed to Improve. And that means changing habits. For which we needs support, such as tools.</a:t>
+              <a:t>Team chose to use the egg timer.</a:t>
+            </a:r>
+          </a:p>
+          <a:p>
+            <a:pPr marL="171450" marR="0" lvl="0" indent="-171450" algn="l" defTabSz="914400" rtl="0" eaLnBrk="1" fontAlgn="auto" latinLnBrk="0" hangingPunct="1">
+              <a:lnSpc>
+                <a:spcPct val="100000"/>
+              </a:lnSpc>
+              <a:spcBef>
+                <a:spcPts val="0"/>
+              </a:spcBef>
+              <a:spcAft>
+                <a:spcPts val="0"/>
+              </a:spcAft>
+              <a:buClrTx/>
+              <a:buSzTx/>
+              <a:buFont typeface="Arial" panose="020B0604020202020204" pitchFamily="34" charset="0"/>
+              <a:buChar char="•"/>
+              <a:tabLst/>
+              <a:defRPr/>
+            </a:pPr>
+            <a:r>
+              <a:rPr lang="en-US" dirty="0"/>
+              <a:t>I knew we had an excellent way to work, because we chose to adopt an annoying egg timer.</a:t>
             </a:r>
           </a:p>
           <a:p>
@@ -35866,20 +36667,56 @@
           <a:p>
             <a:r>
               <a:rPr lang="en-US" dirty="0"/>
-              <a:t>Before I answer that question,</a:t>
+              <a:t>Before I answer that question, let’s make it easier to be present.</a:t>
             </a:r>
           </a:p>
           <a:p>
             <a:endParaRPr lang="en-US" dirty="0"/>
           </a:p>
           <a:p>
-            <a:pPr marL="171450" indent="-171450">
+            <a:pPr marL="171450" marR="0" lvl="0" indent="-171450" algn="l" defTabSz="914400" rtl="0" eaLnBrk="1" fontAlgn="auto" latinLnBrk="0" hangingPunct="1">
+              <a:lnSpc>
+                <a:spcPct val="100000"/>
+              </a:lnSpc>
+              <a:spcBef>
+                <a:spcPts val="0"/>
+              </a:spcBef>
+              <a:spcAft>
+                <a:spcPts val="0"/>
+              </a:spcAft>
+              <a:buClrTx/>
+              <a:buSzTx/>
               <a:buFont typeface="Arial" panose="020B0604020202020204" pitchFamily="34" charset="0"/>
               <a:buChar char="•"/>
+              <a:tabLst/>
+              <a:defRPr/>
             </a:pPr>
             <a:r>
               <a:rPr lang="en-US" dirty="0"/>
-              <a:t>Restate mission, offer Ask Arlo Anything</a:t>
+              <a:t>All resources are online.</a:t>
+            </a:r>
+          </a:p>
+          <a:p>
+            <a:pPr marL="171450" marR="0" lvl="0" indent="-171450" algn="l" defTabSz="914400" rtl="0" eaLnBrk="1" fontAlgn="auto" latinLnBrk="0" hangingPunct="1">
+              <a:lnSpc>
+                <a:spcPct val="100000"/>
+              </a:lnSpc>
+              <a:spcBef>
+                <a:spcPts val="0"/>
+              </a:spcBef>
+              <a:spcAft>
+                <a:spcPts val="0"/>
+              </a:spcAft>
+              <a:buClrTx/>
+              <a:buSzTx/>
+              <a:buFont typeface="Arial" panose="020B0604020202020204" pitchFamily="34" charset="0"/>
+              <a:buChar char="•"/>
+              <a:tabLst/>
+              <a:defRPr/>
+            </a:pPr>
+            <a:r>
+              <a:rPr lang="en-US" dirty="0"/>
+              <a:t>QR/URL at end of talk too.</a:t>
             </a:r>
           </a:p>
           <a:p>
@@ -35889,7 +36726,17 @@
             </a:pPr>
             <a:r>
               <a:rPr lang="en-US" dirty="0"/>
-              <a:t>All resources are online.</a:t>
+              <a:t>I’m Arlo; I love legacy code; mission to end all bugs, worldwide</a:t>
+            </a:r>
+          </a:p>
+          <a:p>
+            <a:pPr marL="171450" indent="-171450">
+              <a:buFont typeface="Arial" panose="020B0604020202020204" pitchFamily="34" charset="0"/>
+              <a:buChar char="•"/>
+            </a:pPr>
+            <a:r>
+              <a:rPr lang="en-US" dirty="0"/>
+              <a:t>Ask Arlo Anything (end of talk and afterword)</a:t>
             </a:r>
           </a:p>
           <a:p>
@@ -35906,7 +36753,7 @@
             </a:pPr>
             <a:r>
               <a:rPr lang="en-US" dirty="0"/>
-              <a:t>This QR &amp; URL will be available at end too.</a:t>
+              <a:t>So, should you work like we did?</a:t>
             </a:r>
           </a:p>
         </p:txBody>
@@ -36314,7 +37161,142 @@
             </a:pPr>
             <a:r>
               <a:rPr lang="en-US" dirty="0"/>
-              <a:t>Distinguish discovery from improvement. Use the scientific method for discovery and the engineering method for improvement.</a:t>
+              <a:t>Distinguish discovery from improvement.</a:t>
+            </a:r>
+          </a:p>
+          <a:p>
+            <a:pPr marL="0" marR="0" lvl="0" indent="0" algn="l" defTabSz="914400" rtl="0" eaLnBrk="1" fontAlgn="auto" latinLnBrk="0" hangingPunct="1">
+              <a:lnSpc>
+                <a:spcPct val="100000"/>
+              </a:lnSpc>
+              <a:spcBef>
+                <a:spcPts val="0"/>
+              </a:spcBef>
+              <a:spcAft>
+                <a:spcPts val="0"/>
+              </a:spcAft>
+              <a:buClrTx/>
+              <a:buSzTx/>
+              <a:buFontTx/>
+              <a:buNone/>
+              <a:tabLst/>
+              <a:defRPr/>
+            </a:pPr>
+            <a:r>
+              <a:rPr lang="en-US" dirty="0"/>
+              <a:t>Scientific method -&gt; discovery </a:t>
+            </a:r>
+          </a:p>
+          <a:p>
+            <a:pPr marL="0" marR="0" lvl="0" indent="0" algn="l" defTabSz="914400" rtl="0" eaLnBrk="1" fontAlgn="auto" latinLnBrk="0" hangingPunct="1">
+              <a:lnSpc>
+                <a:spcPct val="100000"/>
+              </a:lnSpc>
+              <a:spcBef>
+                <a:spcPts val="0"/>
+              </a:spcBef>
+              <a:spcAft>
+                <a:spcPts val="0"/>
+              </a:spcAft>
+              <a:buClrTx/>
+              <a:buSzTx/>
+              <a:buFontTx/>
+              <a:buNone/>
+              <a:tabLst/>
+              <a:defRPr/>
+            </a:pPr>
+            <a:r>
+              <a:rPr lang="en-US" dirty="0"/>
+              <a:t>Engineering method -&gt; improvement</a:t>
+            </a:r>
+          </a:p>
+          <a:p>
+            <a:pPr marL="0" marR="0" lvl="0" indent="0" algn="l" defTabSz="914400" rtl="0" eaLnBrk="1" fontAlgn="auto" latinLnBrk="0" hangingPunct="1">
+              <a:lnSpc>
+                <a:spcPct val="100000"/>
+              </a:lnSpc>
+              <a:spcBef>
+                <a:spcPts val="0"/>
+              </a:spcBef>
+              <a:spcAft>
+                <a:spcPts val="0"/>
+              </a:spcAft>
+              <a:buClrTx/>
+              <a:buSzTx/>
+              <a:buFontTx/>
+              <a:buNone/>
+              <a:tabLst/>
+              <a:defRPr/>
+            </a:pPr>
+            <a:endParaRPr lang="en-US" dirty="0"/>
+          </a:p>
+          <a:p>
+            <a:pPr marL="0" marR="0" lvl="0" indent="0" algn="l" defTabSz="914400" rtl="0" eaLnBrk="1" fontAlgn="auto" latinLnBrk="0" hangingPunct="1">
+              <a:lnSpc>
+                <a:spcPct val="100000"/>
+              </a:lnSpc>
+              <a:spcBef>
+                <a:spcPts val="0"/>
+              </a:spcBef>
+              <a:spcAft>
+                <a:spcPts val="0"/>
+              </a:spcAft>
+              <a:buClrTx/>
+              <a:buSzTx/>
+              <a:buFontTx/>
+              <a:buNone/>
+              <a:tabLst/>
+              <a:defRPr/>
+            </a:pPr>
+            <a:r>
+              <a:rPr lang="en-US" dirty="0"/>
+              <a:t>Immediate result:</a:t>
+            </a:r>
+          </a:p>
+          <a:p>
+            <a:pPr marL="0" marR="0" lvl="0" indent="0" algn="l" defTabSz="914400" rtl="0" eaLnBrk="1" fontAlgn="auto" latinLnBrk="0" hangingPunct="1">
+              <a:lnSpc>
+                <a:spcPct val="100000"/>
+              </a:lnSpc>
+              <a:spcBef>
+                <a:spcPts val="0"/>
+              </a:spcBef>
+              <a:spcAft>
+                <a:spcPts val="0"/>
+              </a:spcAft>
+              <a:buClrTx/>
+              <a:buSzTx/>
+              <a:buFontTx/>
+              <a:buNone/>
+              <a:tabLst/>
+              <a:defRPr/>
+            </a:pPr>
+            <a:r>
+              <a:rPr lang="en-US" dirty="0"/>
+              <a:t>Replaces opinion with data.</a:t>
+            </a:r>
+          </a:p>
+          <a:p>
+            <a:pPr marL="0" marR="0" lvl="0" indent="0" algn="l" defTabSz="914400" rtl="0" eaLnBrk="1" fontAlgn="auto" latinLnBrk="0" hangingPunct="1">
+              <a:lnSpc>
+                <a:spcPct val="100000"/>
+              </a:lnSpc>
+              <a:spcBef>
+                <a:spcPts val="0"/>
+              </a:spcBef>
+              <a:spcAft>
+                <a:spcPts val="0"/>
+              </a:spcAft>
+              <a:buClrTx/>
+              <a:buSzTx/>
+              <a:buFontTx/>
+              <a:buNone/>
+              <a:tabLst/>
+              <a:defRPr/>
+            </a:pPr>
+            <a:r>
+              <a:rPr lang="en-US" dirty="0"/>
+              <a:t>Still uses intuition, but to guide discovery, not to define improvements.</a:t>
             </a:r>
           </a:p>
           <a:p>
@@ -36358,6 +37340,29 @@
             <a:r>
               <a:rPr lang="en-US" dirty="0"/>
               <a:t>This replaces your traditional retro with a whole new set of practices.</a:t>
+            </a:r>
+          </a:p>
+          <a:p>
+            <a:pPr marL="0" marR="0" lvl="0" indent="0" algn="l" defTabSz="914400" rtl="0" eaLnBrk="1" fontAlgn="auto" latinLnBrk="0" hangingPunct="1">
+              <a:lnSpc>
+                <a:spcPct val="100000"/>
+              </a:lnSpc>
+              <a:spcBef>
+                <a:spcPts val="0"/>
+              </a:spcBef>
+              <a:spcAft>
+                <a:spcPts val="0"/>
+              </a:spcAft>
+              <a:buClrTx/>
+              <a:buSzTx/>
+              <a:buFontTx/>
+              <a:buNone/>
+              <a:tabLst/>
+              <a:defRPr/>
+            </a:pPr>
+            <a:r>
+              <a:rPr lang="en-US" dirty="0"/>
+              <a:t>Why bother?</a:t>
             </a:r>
           </a:p>
         </p:txBody>
@@ -36444,61 +37449,61 @@
           <a:p>
             <a:r>
               <a:rPr lang="en-US" dirty="0"/>
-              <a:t>But first let’s talk about pairing</a:t>
+              <a:t>Improve by intuition -&gt; many opinions. Choose based on person.</a:t>
+            </a:r>
+          </a:p>
+          <a:p>
+            <a:r>
+              <a:rPr lang="en-US" dirty="0"/>
+              <a:t>Do discovery with data -&gt; best wins; no matter who had it.</a:t>
             </a:r>
           </a:p>
           <a:p>
             <a:endParaRPr lang="en-US" dirty="0"/>
           </a:p>
           <a:p>
-            <a:pPr marL="171450" indent="-171450">
-              <a:buFont typeface="Arial" panose="020B0604020202020204" pitchFamily="34" charset="0"/>
-              <a:buChar char="•"/>
-            </a:pPr>
             <a:r>
               <a:rPr lang="en-US" dirty="0"/>
-              <a:t>Walk through our results</a:t>
+              <a:t>Following intuition -&gt; following past patterns -&gt; left bump</a:t>
             </a:r>
           </a:p>
           <a:p>
-            <a:pPr marL="171450" indent="-171450">
-              <a:buFont typeface="Arial" panose="020B0604020202020204" pitchFamily="34" charset="0"/>
-              <a:buChar char="•"/>
-            </a:pPr>
+            <a:r>
+              <a:rPr lang="en-US" dirty="0"/>
+              <a:t>Experiments -&gt; surprises!</a:t>
+            </a:r>
+          </a:p>
+          <a:p>
             <a:endParaRPr lang="en-US" dirty="0"/>
           </a:p>
           <a:p>
-            <a:pPr marL="171450" indent="-171450">
-              <a:buFont typeface="Arial" panose="020B0604020202020204" pitchFamily="34" charset="0"/>
-              <a:buChar char="•"/>
-            </a:pPr>
+            <a:r>
+              <a:rPr lang="en-US" dirty="0"/>
+              <a:t>Opinions -&gt; things fail -&gt; comes up again</a:t>
+            </a:r>
+          </a:p>
+          <a:p>
+            <a:r>
+              <a:rPr lang="en-US" dirty="0"/>
+              <a:t>Opinions -&gt; have to convince -&gt; pain of change -&gt; limits number of changes</a:t>
+            </a:r>
+          </a:p>
+          <a:p>
             <a:endParaRPr lang="en-US" dirty="0"/>
           </a:p>
           <a:p>
-            <a:pPr marL="0" indent="0">
-              <a:buFont typeface="Arial" panose="020B0604020202020204" pitchFamily="34" charset="0"/>
-              <a:buNone/>
-            </a:pPr>
             <a:r>
               <a:rPr lang="en-US" dirty="0"/>
-              <a:t>I didn’t report it in the paper, but we also tracked red card rate (explain).</a:t>
+              <a:t>Known good solution when changing -&gt; focus on change -&gt; disciplined, iterative adoption -&gt; stays changed</a:t>
             </a:r>
           </a:p>
           <a:p>
-            <a:pPr marL="0" indent="0">
-              <a:buFont typeface="Arial" panose="020B0604020202020204" pitchFamily="34" charset="0"/>
-              <a:buNone/>
-            </a:pPr>
             <a:endParaRPr lang="en-US" dirty="0"/>
           </a:p>
           <a:p>
-            <a:pPr marL="0" indent="0">
-              <a:buFont typeface="Arial" panose="020B0604020202020204" pitchFamily="34" charset="0"/>
-              <a:buNone/>
-            </a:pPr>
             <a:r>
               <a:rPr lang="en-US" dirty="0"/>
-              <a:t>Red rate was unaffected by swap strategy, except for one case. Sith-style with swap rate fast enough that most stories involved a complete rotation of implementors resulted in a lower rate. Step function, but only 20% or so better.</a:t>
+              <a:t>4 reasons to change your retro. But that’s not why you’re here…</a:t>
             </a:r>
           </a:p>
         </p:txBody>
@@ -36520,7 +37525,7 @@
           <a:p>
             <a:fld id="{2E396785-7325-4959-B34C-58C3AEDA50A1}" type="slidenum">
               <a:rPr lang="en-US" smtClean="0"/>
-              <a:t>12</a:t>
+              <a:t>10</a:t>
             </a:fld>
             <a:endParaRPr lang="en-US"/>
           </a:p>
@@ -36529,7 +37534,7 @@
     </p:spTree>
     <p:extLst>
       <p:ext uri="{BB962C8B-B14F-4D97-AF65-F5344CB8AC3E}">
-        <p14:creationId xmlns:p14="http://schemas.microsoft.com/office/powerpoint/2010/main" val="2003283927"/>
+        <p14:creationId xmlns:p14="http://schemas.microsoft.com/office/powerpoint/2010/main" val="2216927240"/>
       </p:ext>
     </p:extLst>
   </p:cSld>
@@ -39479,7 +40484,7 @@
           <p:nvPr/>
         </p:nvPicPr>
         <p:blipFill>
-          <a:blip r:embed="rId2">
+          <a:blip r:embed="rId3">
             <a:extLst>
               <a:ext uri="{28A0092B-C50C-407E-A947-70E740481C1C}">
                 <a14:useLocalDpi xmlns:a14="http://schemas.microsoft.com/office/drawing/2010/main" val="0"/>
@@ -39493,7 +40498,7 @@
         </p:blipFill>
         <p:spPr bwMode="auto">
           <a:xfrm>
-            <a:off x="3115403" y="2003068"/>
+            <a:off x="3688612" y="2003068"/>
             <a:ext cx="5333561" cy="2306709"/>
           </a:xfrm>
           <a:prstGeom prst="rect">
@@ -39526,7 +40531,7 @@
           <p:nvPr/>
         </p:nvPicPr>
         <p:blipFill>
-          <a:blip r:embed="rId3">
+          <a:blip r:embed="rId4">
             <a:extLst>
               <a:ext uri="{28A0092B-C50C-407E-A947-70E740481C1C}">
                 <a14:useLocalDpi xmlns:a14="http://schemas.microsoft.com/office/drawing/2010/main" val="0"/>
@@ -39573,7 +40578,7 @@
           <p:nvPr/>
         </p:nvPicPr>
         <p:blipFill>
-          <a:blip r:embed="rId4">
+          <a:blip r:embed="rId5">
             <a:extLst>
               <a:ext uri="{28A0092B-C50C-407E-A947-70E740481C1C}">
                 <a14:useLocalDpi xmlns:a14="http://schemas.microsoft.com/office/drawing/2010/main" val="0"/>
@@ -39802,7 +40807,7 @@
                                     <p:cond delay="0"/>
                                   </p:stCondLst>
                                   <p:childTnLst>
-                                    <p:animMotion origin="layout" path="M 1.25E-6 4.81481E-6 L -0.18281 0.34004 " pathEditMode="relative" rAng="0" ptsTypes="AA">
+                                    <p:animMotion origin="layout" path="M -0.06093 0.0081 L -0.2302 0.34004 " pathEditMode="relative" rAng="0" ptsTypes="AA">
                                       <p:cBhvr>
                                         <p:cTn id="21" dur="1000" fill="hold"/>
                                         <p:tgtEl>
@@ -39813,7 +40818,7 @@
                                           <p:attrName>ppt_y</p:attrName>
                                         </p:attrNameLst>
                                       </p:cBhvr>
-                                      <p:rCtr x="-9141" y="16991"/>
+                                      <p:rCtr x="-8464" y="16597"/>
                                     </p:animMotion>
                                   </p:childTnLst>
                                 </p:cTn>
@@ -40707,7 +41712,7 @@
           <a:p>
             <a:r>
               <a:rPr lang="en-US" sz="1400" dirty="0"/>
-              <a:t>Individual Owned</a:t>
+              <a:t>Keep Expert</a:t>
             </a:r>
           </a:p>
         </p:txBody>
@@ -40742,7 +41747,7 @@
           <a:p>
             <a:r>
               <a:rPr lang="en-US" sz="1400" dirty="0"/>
-              <a:t>Team Owned</a:t>
+              <a:t>Avoid Experts</a:t>
             </a:r>
           </a:p>
         </p:txBody>
@@ -40798,7 +41803,7 @@
             </a:br>
             <a:r>
               <a:rPr lang="en-US" dirty="0"/>
-              <a:t>(1x velocity)</a:t>
+              <a:t>(baseline velocity)</a:t>
             </a:r>
           </a:p>
         </p:txBody>
@@ -41657,332 +42662,269 @@
           </a:p>
         </p:txBody>
       </p:sp>
-      <p:grpSp>
-        <p:nvGrpSpPr>
-          <p:cNvPr id="8" name="Group 7">
+      <p:pic>
+        <p:nvPicPr>
+          <p:cNvPr id="4" name="Picture 2" descr="2 HOUR MECHANICAL TIMER - Woodbridge Kitchen Company">
             <a:extLst>
               <a:ext uri="{FF2B5EF4-FFF2-40B4-BE49-F238E27FC236}">
-                <a16:creationId xmlns:a16="http://schemas.microsoft.com/office/drawing/2014/main" id="{0356FDAD-CEE7-8E15-DDF7-2195AA05301A}"/>
+                <a16:creationId xmlns:a16="http://schemas.microsoft.com/office/drawing/2014/main" id="{33BDEF54-8BB6-6E88-DDC7-A8F226917A6B}"/>
               </a:ext>
             </a:extLst>
           </p:cNvPr>
-          <p:cNvGrpSpPr/>
+          <p:cNvPicPr>
+            <a:picLocks noChangeAspect="1" noChangeArrowheads="1"/>
+          </p:cNvPicPr>
           <p:nvPr/>
-        </p:nvGrpSpPr>
-        <p:grpSpPr>
-          <a:xfrm>
-            <a:off x="592538" y="2006224"/>
-            <a:ext cx="2388359" cy="3034690"/>
-            <a:chOff x="592538" y="1446662"/>
-            <a:chExt cx="2388359" cy="3034690"/>
-          </a:xfrm>
-        </p:grpSpPr>
-        <p:pic>
-          <p:nvPicPr>
-            <p:cNvPr id="4" name="Picture 2" descr="2 HOUR MECHANICAL TIMER - Woodbridge Kitchen Company">
-              <a:extLst>
-                <a:ext uri="{FF2B5EF4-FFF2-40B4-BE49-F238E27FC236}">
-                  <a16:creationId xmlns:a16="http://schemas.microsoft.com/office/drawing/2014/main" id="{33BDEF54-8BB6-6E88-DDC7-A8F226917A6B}"/>
-                </a:ext>
-              </a:extLst>
-            </p:cNvPr>
-            <p:cNvPicPr>
-              <a:picLocks noChangeAspect="1" noChangeArrowheads="1"/>
-            </p:cNvPicPr>
-            <p:nvPr/>
-          </p:nvPicPr>
-          <p:blipFill>
-            <a:blip r:embed="rId3">
-              <a:extLst>
-                <a:ext uri="{28A0092B-C50C-407E-A947-70E740481C1C}">
-                  <a14:useLocalDpi xmlns:a14="http://schemas.microsoft.com/office/drawing/2010/main" val="0"/>
-                </a:ext>
-              </a:extLst>
-            </a:blip>
-            <a:srcRect/>
-            <a:stretch>
-              <a:fillRect/>
-            </a:stretch>
-          </p:blipFill>
-          <p:spPr bwMode="auto">
-            <a:xfrm>
-              <a:off x="592538" y="1446662"/>
-              <a:ext cx="2388359" cy="2388359"/>
-            </a:xfrm>
-            <a:prstGeom prst="rect">
-              <a:avLst/>
-            </a:prstGeom>
-            <a:noFill/>
+        </p:nvPicPr>
+        <p:blipFill>
+          <a:blip r:embed="rId3">
             <a:extLst>
-              <a:ext uri="{909E8E84-426E-40DD-AFC4-6F175D3DCCD1}">
-                <a14:hiddenFill xmlns:a14="http://schemas.microsoft.com/office/drawing/2010/main">
-                  <a:solidFill>
-                    <a:srgbClr val="FFFFFF"/>
-                  </a:solidFill>
-                </a14:hiddenFill>
+              <a:ext uri="{28A0092B-C50C-407E-A947-70E740481C1C}">
+                <a14:useLocalDpi xmlns:a14="http://schemas.microsoft.com/office/drawing/2010/main" val="0"/>
               </a:ext>
             </a:extLst>
-          </p:spPr>
-        </p:pic>
-        <p:sp>
-          <p:nvSpPr>
-            <p:cNvPr id="5" name="TextBox 4">
-              <a:extLst>
-                <a:ext uri="{FF2B5EF4-FFF2-40B4-BE49-F238E27FC236}">
-                  <a16:creationId xmlns:a16="http://schemas.microsoft.com/office/drawing/2014/main" id="{E75FD1FA-3F2C-A1EF-138E-050592F800F2}"/>
-                </a:ext>
-              </a:extLst>
-            </p:cNvPr>
-            <p:cNvSpPr txBox="1"/>
-            <p:nvPr/>
-          </p:nvSpPr>
-          <p:spPr>
-            <a:xfrm>
-              <a:off x="787023" y="3835021"/>
-              <a:ext cx="2119953" cy="646331"/>
-            </a:xfrm>
-            <a:prstGeom prst="rect">
-              <a:avLst/>
-            </a:prstGeom>
-            <a:noFill/>
-          </p:spPr>
-          <p:txBody>
-            <a:bodyPr wrap="square" rtlCol="0">
-              <a:spAutoFit/>
-            </a:bodyPr>
-            <a:lstStyle/>
-            <a:p>
-              <a:pPr algn="ctr"/>
-              <a:r>
-                <a:rPr lang="en-US" dirty="0"/>
-                <a:t>Swap every</a:t>
-              </a:r>
-            </a:p>
-            <a:p>
-              <a:pPr algn="ctr"/>
-              <a:r>
-                <a:rPr lang="en-US" dirty="0"/>
-                <a:t>90-120 min</a:t>
-              </a:r>
-            </a:p>
-          </p:txBody>
-        </p:sp>
-      </p:grpSp>
-      <p:grpSp>
-        <p:nvGrpSpPr>
-          <p:cNvPr id="9" name="Group 8">
+          </a:blip>
+          <a:srcRect/>
+          <a:stretch>
+            <a:fillRect/>
+          </a:stretch>
+        </p:blipFill>
+        <p:spPr bwMode="auto">
+          <a:xfrm>
+            <a:off x="656187" y="2006224"/>
+            <a:ext cx="2388359" cy="2388359"/>
+          </a:xfrm>
+          <a:prstGeom prst="rect">
+            <a:avLst/>
+          </a:prstGeom>
+          <a:noFill/>
+          <a:extLst>
+            <a:ext uri="{909E8E84-426E-40DD-AFC4-6F175D3DCCD1}">
+              <a14:hiddenFill xmlns:a14="http://schemas.microsoft.com/office/drawing/2010/main">
+                <a:solidFill>
+                  <a:srgbClr val="FFFFFF"/>
+                </a:solidFill>
+              </a14:hiddenFill>
+            </a:ext>
+          </a:extLst>
+        </p:spPr>
+      </p:pic>
+      <p:sp>
+        <p:nvSpPr>
+          <p:cNvPr id="5" name="TextBox 4">
             <a:extLst>
               <a:ext uri="{FF2B5EF4-FFF2-40B4-BE49-F238E27FC236}">
-                <a16:creationId xmlns:a16="http://schemas.microsoft.com/office/drawing/2014/main" id="{BD1E694F-0637-0AAE-FEF5-446D8610D8E8}"/>
+                <a16:creationId xmlns:a16="http://schemas.microsoft.com/office/drawing/2014/main" id="{E75FD1FA-3F2C-A1EF-138E-050592F800F2}"/>
               </a:ext>
             </a:extLst>
           </p:cNvPr>
-          <p:cNvGrpSpPr/>
+          <p:cNvSpPr txBox="1"/>
           <p:nvPr/>
-        </p:nvGrpSpPr>
-        <p:grpSpPr>
+        </p:nvSpPr>
+        <p:spPr>
           <a:xfrm>
-            <a:off x="4277152" y="2312288"/>
-            <a:ext cx="2428734" cy="2728626"/>
-            <a:chOff x="3617225" y="1752726"/>
-            <a:chExt cx="2428734" cy="2728626"/>
+            <a:off x="850672" y="4394583"/>
+            <a:ext cx="2119953" cy="646331"/>
           </a:xfrm>
-        </p:grpSpPr>
-        <p:pic>
-          <p:nvPicPr>
-            <p:cNvPr id="3074" name="Picture 2">
-              <a:extLst>
-                <a:ext uri="{FF2B5EF4-FFF2-40B4-BE49-F238E27FC236}">
-                  <a16:creationId xmlns:a16="http://schemas.microsoft.com/office/drawing/2014/main" id="{CAF36501-0E75-2C90-BC5F-DEC972BD6BE4}"/>
-                </a:ext>
-              </a:extLst>
-            </p:cNvPr>
-            <p:cNvPicPr>
-              <a:picLocks noChangeAspect="1" noChangeArrowheads="1"/>
-            </p:cNvPicPr>
-            <p:nvPr/>
-          </p:nvPicPr>
-          <p:blipFill>
-            <a:blip r:embed="rId4">
-              <a:extLst>
-                <a:ext uri="{28A0092B-C50C-407E-A947-70E740481C1C}">
-                  <a14:useLocalDpi xmlns:a14="http://schemas.microsoft.com/office/drawing/2010/main" val="0"/>
-                </a:ext>
-              </a:extLst>
-            </a:blip>
-            <a:srcRect/>
-            <a:stretch>
-              <a:fillRect/>
-            </a:stretch>
-          </p:blipFill>
-          <p:spPr bwMode="auto">
-            <a:xfrm>
-              <a:off x="3832107" y="1752726"/>
-              <a:ext cx="1998971" cy="1776229"/>
-            </a:xfrm>
-            <a:prstGeom prst="rect">
-              <a:avLst/>
-            </a:prstGeom>
-            <a:noFill/>
-            <a:extLst>
-              <a:ext uri="{909E8E84-426E-40DD-AFC4-6F175D3DCCD1}">
-                <a14:hiddenFill xmlns:a14="http://schemas.microsoft.com/office/drawing/2010/main">
-                  <a:solidFill>
-                    <a:srgbClr val="FFFFFF"/>
-                  </a:solidFill>
-                </a14:hiddenFill>
-              </a:ext>
-            </a:extLst>
-          </p:spPr>
-        </p:pic>
-        <p:sp>
-          <p:nvSpPr>
-            <p:cNvPr id="6" name="TextBox 5">
-              <a:extLst>
-                <a:ext uri="{FF2B5EF4-FFF2-40B4-BE49-F238E27FC236}">
-                  <a16:creationId xmlns:a16="http://schemas.microsoft.com/office/drawing/2014/main" id="{AA16B818-09CA-4147-9022-3535F455CF59}"/>
-                </a:ext>
-              </a:extLst>
-            </p:cNvPr>
-            <p:cNvSpPr txBox="1"/>
-            <p:nvPr/>
-          </p:nvSpPr>
-          <p:spPr>
-            <a:xfrm>
-              <a:off x="3617225" y="3835021"/>
-              <a:ext cx="2428734" cy="646331"/>
-            </a:xfrm>
-            <a:prstGeom prst="rect">
-              <a:avLst/>
-            </a:prstGeom>
-            <a:noFill/>
-          </p:spPr>
-          <p:txBody>
-            <a:bodyPr wrap="square" rtlCol="0">
-              <a:spAutoFit/>
-            </a:bodyPr>
-            <a:lstStyle/>
-            <a:p>
-              <a:pPr algn="ctr"/>
-              <a:r>
-                <a:rPr lang="en-US" dirty="0"/>
-                <a:t>Apprentice replaces master</a:t>
-              </a:r>
-            </a:p>
-          </p:txBody>
-        </p:sp>
-      </p:grpSp>
-      <p:grpSp>
-        <p:nvGrpSpPr>
-          <p:cNvPr id="10" name="Group 9">
+          <a:prstGeom prst="rect">
+            <a:avLst/>
+          </a:prstGeom>
+          <a:noFill/>
+        </p:spPr>
+        <p:txBody>
+          <a:bodyPr wrap="square" rtlCol="0">
+            <a:spAutoFit/>
+          </a:bodyPr>
+          <a:lstStyle/>
+          <a:p>
+            <a:pPr algn="ctr"/>
+            <a:r>
+              <a:rPr lang="en-US" dirty="0"/>
+              <a:t>Swap every</a:t>
+            </a:r>
+          </a:p>
+          <a:p>
+            <a:pPr algn="ctr"/>
+            <a:r>
+              <a:rPr lang="en-US" dirty="0"/>
+              <a:t>90-120 min</a:t>
+            </a:r>
+          </a:p>
+        </p:txBody>
+      </p:sp>
+      <p:pic>
+        <p:nvPicPr>
+          <p:cNvPr id="3074" name="Picture 2">
             <a:extLst>
               <a:ext uri="{FF2B5EF4-FFF2-40B4-BE49-F238E27FC236}">
-                <a16:creationId xmlns:a16="http://schemas.microsoft.com/office/drawing/2014/main" id="{4D1F5073-207B-F0B8-F43A-A288F5AF38E0}"/>
+                <a16:creationId xmlns:a16="http://schemas.microsoft.com/office/drawing/2014/main" id="{CAF36501-0E75-2C90-BC5F-DEC972BD6BE4}"/>
               </a:ext>
             </a:extLst>
           </p:cNvPr>
-          <p:cNvGrpSpPr/>
+          <p:cNvPicPr>
+            <a:picLocks noChangeAspect="1" noChangeArrowheads="1"/>
+          </p:cNvPicPr>
           <p:nvPr/>
-        </p:nvGrpSpPr>
-        <p:grpSpPr>
-          <a:xfrm>
-            <a:off x="8002141" y="1913280"/>
-            <a:ext cx="3470024" cy="3127634"/>
-            <a:chOff x="6205182" y="1353717"/>
-            <a:chExt cx="3470024" cy="3127634"/>
-          </a:xfrm>
-        </p:grpSpPr>
-        <p:pic>
-          <p:nvPicPr>
-            <p:cNvPr id="3076" name="Picture 4" descr="Most of us are applying for roles for which we are simply not qualified - RECRUITING TIMES">
-              <a:extLst>
-                <a:ext uri="{FF2B5EF4-FFF2-40B4-BE49-F238E27FC236}">
-                  <a16:creationId xmlns:a16="http://schemas.microsoft.com/office/drawing/2014/main" id="{66888BC7-303B-83EF-C156-5C8EBA9AB77E}"/>
-                </a:ext>
-              </a:extLst>
-            </p:cNvPr>
-            <p:cNvPicPr>
-              <a:picLocks noChangeAspect="1" noChangeArrowheads="1"/>
-            </p:cNvPicPr>
-            <p:nvPr/>
-          </p:nvPicPr>
-          <p:blipFill>
-            <a:blip r:embed="rId5">
-              <a:extLst>
-                <a:ext uri="{28A0092B-C50C-407E-A947-70E740481C1C}">
-                  <a14:useLocalDpi xmlns:a14="http://schemas.microsoft.com/office/drawing/2010/main" val="0"/>
-                </a:ext>
-              </a:extLst>
-            </a:blip>
-            <a:srcRect/>
-            <a:stretch>
-              <a:fillRect/>
-            </a:stretch>
-          </p:blipFill>
-          <p:spPr bwMode="auto">
-            <a:xfrm>
-              <a:off x="6205182" y="1353717"/>
-              <a:ext cx="3470024" cy="2082918"/>
-            </a:xfrm>
-            <a:prstGeom prst="rect">
-              <a:avLst/>
-            </a:prstGeom>
-            <a:noFill/>
+        </p:nvPicPr>
+        <p:blipFill>
+          <a:blip r:embed="rId4">
             <a:extLst>
-              <a:ext uri="{909E8E84-426E-40DD-AFC4-6F175D3DCCD1}">
-                <a14:hiddenFill xmlns:a14="http://schemas.microsoft.com/office/drawing/2010/main">
-                  <a:solidFill>
-                    <a:srgbClr val="FFFFFF"/>
-                  </a:solidFill>
-                </a14:hiddenFill>
+              <a:ext uri="{28A0092B-C50C-407E-A947-70E740481C1C}">
+                <a14:useLocalDpi xmlns:a14="http://schemas.microsoft.com/office/drawing/2010/main" val="0"/>
               </a:ext>
             </a:extLst>
-          </p:spPr>
-        </p:pic>
-        <p:sp>
-          <p:nvSpPr>
-            <p:cNvPr id="7" name="TextBox 6">
-              <a:extLst>
-                <a:ext uri="{FF2B5EF4-FFF2-40B4-BE49-F238E27FC236}">
-                  <a16:creationId xmlns:a16="http://schemas.microsoft.com/office/drawing/2014/main" id="{27612809-F6DE-487F-14D1-A123452FE3D2}"/>
-                </a:ext>
-              </a:extLst>
-            </p:cNvPr>
-            <p:cNvSpPr txBox="1"/>
-            <p:nvPr/>
-          </p:nvSpPr>
-          <p:spPr>
-            <a:xfrm>
-              <a:off x="6725827" y="3835020"/>
-              <a:ext cx="2428734" cy="646331"/>
-            </a:xfrm>
-            <a:prstGeom prst="rect">
-              <a:avLst/>
-            </a:prstGeom>
-            <a:noFill/>
-          </p:spPr>
-          <p:txBody>
-            <a:bodyPr wrap="square" rtlCol="0">
-              <a:spAutoFit/>
-            </a:bodyPr>
-            <a:lstStyle/>
-            <a:p>
-              <a:pPr algn="ctr"/>
-              <a:r>
-                <a:rPr lang="en-US" dirty="0"/>
-                <a:t>Least-qualified</a:t>
-              </a:r>
-            </a:p>
-            <a:p>
-              <a:pPr algn="ctr"/>
-              <a:r>
-                <a:rPr lang="en-US" dirty="0"/>
-                <a:t>implementor</a:t>
-              </a:r>
-            </a:p>
-          </p:txBody>
-        </p:sp>
-      </p:grpSp>
+          </a:blip>
+          <a:srcRect/>
+          <a:stretch>
+            <a:fillRect/>
+          </a:stretch>
+        </p:blipFill>
+        <p:spPr bwMode="auto">
+          <a:xfrm>
+            <a:off x="4555683" y="2312288"/>
+            <a:ext cx="1998971" cy="1776229"/>
+          </a:xfrm>
+          <a:prstGeom prst="rect">
+            <a:avLst/>
+          </a:prstGeom>
+          <a:noFill/>
+          <a:extLst>
+            <a:ext uri="{909E8E84-426E-40DD-AFC4-6F175D3DCCD1}">
+              <a14:hiddenFill xmlns:a14="http://schemas.microsoft.com/office/drawing/2010/main">
+                <a:solidFill>
+                  <a:srgbClr val="FFFFFF"/>
+                </a:solidFill>
+              </a14:hiddenFill>
+            </a:ext>
+          </a:extLst>
+        </p:spPr>
+      </p:pic>
+      <p:sp>
+        <p:nvSpPr>
+          <p:cNvPr id="6" name="TextBox 5">
+            <a:extLst>
+              <a:ext uri="{FF2B5EF4-FFF2-40B4-BE49-F238E27FC236}">
+                <a16:creationId xmlns:a16="http://schemas.microsoft.com/office/drawing/2014/main" id="{AA16B818-09CA-4147-9022-3535F455CF59}"/>
+              </a:ext>
+            </a:extLst>
+          </p:cNvPr>
+          <p:cNvSpPr txBox="1"/>
+          <p:nvPr/>
+        </p:nvSpPr>
+        <p:spPr>
+          <a:xfrm>
+            <a:off x="4340801" y="4394583"/>
+            <a:ext cx="2428734" cy="646331"/>
+          </a:xfrm>
+          <a:prstGeom prst="rect">
+            <a:avLst/>
+          </a:prstGeom>
+          <a:noFill/>
+        </p:spPr>
+        <p:txBody>
+          <a:bodyPr wrap="square" rtlCol="0">
+            <a:spAutoFit/>
+          </a:bodyPr>
+          <a:lstStyle/>
+          <a:p>
+            <a:pPr algn="ctr"/>
+            <a:r>
+              <a:rPr lang="en-US" dirty="0"/>
+              <a:t>Apprentice replaces master</a:t>
+            </a:r>
+          </a:p>
+        </p:txBody>
+      </p:sp>
+      <p:pic>
+        <p:nvPicPr>
+          <p:cNvPr id="3076" name="Picture 4" descr="Most of us are applying for roles for which we are simply not qualified - RECRUITING TIMES">
+            <a:extLst>
+              <a:ext uri="{FF2B5EF4-FFF2-40B4-BE49-F238E27FC236}">
+                <a16:creationId xmlns:a16="http://schemas.microsoft.com/office/drawing/2014/main" id="{66888BC7-303B-83EF-C156-5C8EBA9AB77E}"/>
+              </a:ext>
+            </a:extLst>
+          </p:cNvPr>
+          <p:cNvPicPr>
+            <a:picLocks noChangeAspect="1" noChangeArrowheads="1"/>
+          </p:cNvPicPr>
+          <p:nvPr/>
+        </p:nvPicPr>
+        <p:blipFill>
+          <a:blip r:embed="rId5">
+            <a:extLst>
+              <a:ext uri="{28A0092B-C50C-407E-A947-70E740481C1C}">
+                <a14:useLocalDpi xmlns:a14="http://schemas.microsoft.com/office/drawing/2010/main" val="0"/>
+              </a:ext>
+            </a:extLst>
+          </a:blip>
+          <a:srcRect/>
+          <a:stretch>
+            <a:fillRect/>
+          </a:stretch>
+        </p:blipFill>
+        <p:spPr bwMode="auto">
+          <a:xfrm>
+            <a:off x="8065790" y="1913280"/>
+            <a:ext cx="3470024" cy="2082918"/>
+          </a:xfrm>
+          <a:prstGeom prst="rect">
+            <a:avLst/>
+          </a:prstGeom>
+          <a:noFill/>
+          <a:extLst>
+            <a:ext uri="{909E8E84-426E-40DD-AFC4-6F175D3DCCD1}">
+              <a14:hiddenFill xmlns:a14="http://schemas.microsoft.com/office/drawing/2010/main">
+                <a:solidFill>
+                  <a:srgbClr val="FFFFFF"/>
+                </a:solidFill>
+              </a14:hiddenFill>
+            </a:ext>
+          </a:extLst>
+        </p:spPr>
+      </p:pic>
+      <p:sp>
+        <p:nvSpPr>
+          <p:cNvPr id="7" name="TextBox 6">
+            <a:extLst>
+              <a:ext uri="{FF2B5EF4-FFF2-40B4-BE49-F238E27FC236}">
+                <a16:creationId xmlns:a16="http://schemas.microsoft.com/office/drawing/2014/main" id="{27612809-F6DE-487F-14D1-A123452FE3D2}"/>
+              </a:ext>
+            </a:extLst>
+          </p:cNvPr>
+          <p:cNvSpPr txBox="1"/>
+          <p:nvPr/>
+        </p:nvSpPr>
+        <p:spPr>
+          <a:xfrm>
+            <a:off x="8586435" y="4394583"/>
+            <a:ext cx="2428734" cy="646331"/>
+          </a:xfrm>
+          <a:prstGeom prst="rect">
+            <a:avLst/>
+          </a:prstGeom>
+          <a:noFill/>
+        </p:spPr>
+        <p:txBody>
+          <a:bodyPr wrap="square" rtlCol="0">
+            <a:spAutoFit/>
+          </a:bodyPr>
+          <a:lstStyle/>
+          <a:p>
+            <a:pPr algn="ctr"/>
+            <a:r>
+              <a:rPr lang="en-US" dirty="0"/>
+              <a:t>Least-qualified</a:t>
+            </a:r>
+          </a:p>
+          <a:p>
+            <a:pPr algn="ctr"/>
+            <a:r>
+              <a:rPr lang="en-US" dirty="0"/>
+              <a:t>implementor</a:t>
+            </a:r>
+          </a:p>
+        </p:txBody>
+      </p:sp>
     </p:spTree>
     <p:extLst>
       <p:ext uri="{BB962C8B-B14F-4D97-AF65-F5344CB8AC3E}">
@@ -42879,6 +43821,58 @@
           </a:graphicData>
         </a:graphic>
       </p:graphicFrame>
+      <p:sp>
+        <p:nvSpPr>
+          <p:cNvPr id="5" name="Rectangle 4">
+            <a:extLst>
+              <a:ext uri="{FF2B5EF4-FFF2-40B4-BE49-F238E27FC236}">
+                <a16:creationId xmlns:a16="http://schemas.microsoft.com/office/drawing/2014/main" id="{7389D393-117C-7445-B08C-BA6F4E0A8A8B}"/>
+              </a:ext>
+            </a:extLst>
+          </p:cNvPr>
+          <p:cNvSpPr/>
+          <p:nvPr/>
+        </p:nvSpPr>
+        <p:spPr>
+          <a:xfrm>
+            <a:off x="2442949" y="2238233"/>
+            <a:ext cx="9294126" cy="3758111"/>
+          </a:xfrm>
+          <a:prstGeom prst="rect">
+            <a:avLst/>
+          </a:prstGeom>
+          <a:solidFill>
+            <a:schemeClr val="bg1"/>
+          </a:solidFill>
+          <a:ln>
+            <a:noFill/>
+          </a:ln>
+        </p:spPr>
+        <p:style>
+          <a:lnRef idx="2">
+            <a:schemeClr val="accent1">
+              <a:shade val="50000"/>
+            </a:schemeClr>
+          </a:lnRef>
+          <a:fillRef idx="1">
+            <a:schemeClr val="accent1"/>
+          </a:fillRef>
+          <a:effectRef idx="0">
+            <a:schemeClr val="accent1"/>
+          </a:effectRef>
+          <a:fontRef idx="minor">
+            <a:schemeClr val="lt1"/>
+          </a:fontRef>
+        </p:style>
+        <p:txBody>
+          <a:bodyPr rtlCol="0" anchor="ctr"/>
+          <a:lstStyle/>
+          <a:p>
+            <a:pPr algn="ctr"/>
+            <a:endParaRPr lang="en-US"/>
+          </a:p>
+        </p:txBody>
+      </p:sp>
     </p:spTree>
     <p:extLst>
       <p:ext uri="{BB962C8B-B14F-4D97-AF65-F5344CB8AC3E}">
@@ -42889,6 +43883,84 @@
   <p:clrMapOvr>
     <a:masterClrMapping/>
   </p:clrMapOvr>
+  <p:timing>
+    <p:tnLst>
+      <p:par>
+        <p:cTn id="1" dur="indefinite" restart="never" nodeType="tmRoot">
+          <p:childTnLst>
+            <p:seq concurrent="1" nextAc="seek">
+              <p:cTn id="2" dur="indefinite" nodeType="mainSeq">
+                <p:childTnLst>
+                  <p:par>
+                    <p:cTn id="3" fill="hold">
+                      <p:stCondLst>
+                        <p:cond delay="indefinite"/>
+                      </p:stCondLst>
+                      <p:childTnLst>
+                        <p:par>
+                          <p:cTn id="4" fill="hold">
+                            <p:stCondLst>
+                              <p:cond delay="0"/>
+                            </p:stCondLst>
+                            <p:childTnLst>
+                              <p:par>
+                                <p:cTn id="5" presetID="1" presetClass="exit" presetSubtype="0" fill="hold" grpId="0" nodeType="clickEffect">
+                                  <p:stCondLst>
+                                    <p:cond delay="0"/>
+                                  </p:stCondLst>
+                                  <p:childTnLst>
+                                    <p:set>
+                                      <p:cBhvr>
+                                        <p:cTn id="6" dur="1" fill="hold">
+                                          <p:stCondLst>
+                                            <p:cond delay="0"/>
+                                          </p:stCondLst>
+                                        </p:cTn>
+                                        <p:tgtEl>
+                                          <p:spTgt spid="5"/>
+                                        </p:tgtEl>
+                                        <p:attrNameLst>
+                                          <p:attrName>style.visibility</p:attrName>
+                                        </p:attrNameLst>
+                                      </p:cBhvr>
+                                      <p:to>
+                                        <p:strVal val="hidden"/>
+                                      </p:to>
+                                    </p:set>
+                                  </p:childTnLst>
+                                </p:cTn>
+                              </p:par>
+                            </p:childTnLst>
+                          </p:cTn>
+                        </p:par>
+                      </p:childTnLst>
+                    </p:cTn>
+                  </p:par>
+                </p:childTnLst>
+              </p:cTn>
+              <p:prevCondLst>
+                <p:cond evt="onPrev" delay="0">
+                  <p:tgtEl>
+                    <p:sldTgt/>
+                  </p:tgtEl>
+                </p:cond>
+              </p:prevCondLst>
+              <p:nextCondLst>
+                <p:cond evt="onNext" delay="0">
+                  <p:tgtEl>
+                    <p:sldTgt/>
+                  </p:tgtEl>
+                </p:cond>
+              </p:nextCondLst>
+            </p:seq>
+          </p:childTnLst>
+        </p:cTn>
+      </p:par>
+    </p:tnLst>
+    <p:bldLst>
+      <p:bldP spid="5" grpId="0" animBg="1"/>
+    </p:bldLst>
+  </p:timing>
 </p:sld>
 </file>
 
@@ -45464,6 +46536,92 @@
       </p:grpSpPr>
       <p:sp>
         <p:nvSpPr>
+          <p:cNvPr id="4" name="Title 3">
+            <a:extLst>
+              <a:ext uri="{FF2B5EF4-FFF2-40B4-BE49-F238E27FC236}">
+                <a16:creationId xmlns:a16="http://schemas.microsoft.com/office/drawing/2014/main" id="{AEE70552-2A31-5874-19E9-993BEC7B0ED6}"/>
+              </a:ext>
+            </a:extLst>
+          </p:cNvPr>
+          <p:cNvSpPr>
+            <a:spLocks noGrp="1"/>
+          </p:cNvSpPr>
+          <p:nvPr>
+            <p:ph type="title"/>
+          </p:nvPr>
+        </p:nvSpPr>
+        <p:spPr/>
+        <p:txBody>
+          <a:bodyPr/>
+          <a:lstStyle/>
+          <a:p>
+            <a:r>
+              <a:rPr lang="en-US" dirty="0"/>
+              <a:t>Taking it Home</a:t>
+            </a:r>
+          </a:p>
+        </p:txBody>
+      </p:sp>
+      <p:sp>
+        <p:nvSpPr>
+          <p:cNvPr id="5" name="Text Placeholder 4">
+            <a:extLst>
+              <a:ext uri="{FF2B5EF4-FFF2-40B4-BE49-F238E27FC236}">
+                <a16:creationId xmlns:a16="http://schemas.microsoft.com/office/drawing/2014/main" id="{85DD13C9-1AA2-CEA3-65DA-35D77682DE54}"/>
+              </a:ext>
+            </a:extLst>
+          </p:cNvPr>
+          <p:cNvSpPr>
+            <a:spLocks noGrp="1"/>
+          </p:cNvSpPr>
+          <p:nvPr>
+            <p:ph type="body" idx="1"/>
+          </p:nvPr>
+        </p:nvSpPr>
+        <p:spPr/>
+        <p:txBody>
+          <a:bodyPr/>
+          <a:lstStyle/>
+          <a:p>
+            <a:r>
+              <a:rPr lang="en-US" dirty="0"/>
+              <a:t>Making this talk useful by improving your team</a:t>
+            </a:r>
+          </a:p>
+        </p:txBody>
+      </p:sp>
+    </p:spTree>
+    <p:extLst>
+      <p:ext uri="{BB962C8B-B14F-4D97-AF65-F5344CB8AC3E}">
+        <p14:creationId xmlns:p14="http://schemas.microsoft.com/office/powerpoint/2010/main" val="1921864136"/>
+      </p:ext>
+    </p:extLst>
+  </p:cSld>
+  <p:clrMapOvr>
+    <a:masterClrMapping/>
+  </p:clrMapOvr>
+</p:sld>
+</file>
+
+<file path=ppt/slides/slide29.xml><?xml version="1.0" encoding="utf-8"?>
+<p:sld xmlns:a="http://schemas.openxmlformats.org/drawingml/2006/main" xmlns:r="http://schemas.openxmlformats.org/officeDocument/2006/relationships" xmlns:p="http://schemas.openxmlformats.org/presentationml/2006/main">
+  <p:cSld>
+    <p:spTree>
+      <p:nvGrpSpPr>
+        <p:cNvPr id="1" name=""/>
+        <p:cNvGrpSpPr/>
+        <p:nvPr/>
+      </p:nvGrpSpPr>
+      <p:grpSpPr>
+        <a:xfrm>
+          <a:off x="0" y="0"/>
+          <a:ext cx="0" cy="0"/>
+          <a:chOff x="0" y="0"/>
+          <a:chExt cx="0" cy="0"/>
+        </a:xfrm>
+      </p:grpSpPr>
+      <p:sp>
+        <p:nvSpPr>
           <p:cNvPr id="2" name="Title 1">
             <a:extLst>
               <a:ext uri="{FF2B5EF4-FFF2-40B4-BE49-F238E27FC236}">
@@ -46099,7 +47257,84 @@
 </p:sld>
 </file>
 
-<file path=ppt/slides/slide29.xml><?xml version="1.0" encoding="utf-8"?>
+<file path=ppt/slides/slide3.xml><?xml version="1.0" encoding="utf-8"?>
+<p:sld xmlns:a="http://schemas.openxmlformats.org/drawingml/2006/main" xmlns:r="http://schemas.openxmlformats.org/officeDocument/2006/relationships" xmlns:p="http://schemas.openxmlformats.org/presentationml/2006/main">
+  <p:cSld>
+    <p:spTree>
+      <p:nvGrpSpPr>
+        <p:cNvPr id="1" name=""/>
+        <p:cNvGrpSpPr/>
+        <p:nvPr/>
+      </p:nvGrpSpPr>
+      <p:grpSpPr>
+        <a:xfrm>
+          <a:off x="0" y="0"/>
+          <a:ext cx="0" cy="0"/>
+          <a:chOff x="0" y="0"/>
+          <a:chExt cx="0" cy="0"/>
+        </a:xfrm>
+      </p:grpSpPr>
+      <p:pic>
+        <p:nvPicPr>
+          <p:cNvPr id="2050" name="Picture 2" descr="Extreme Programming Explained: Embrace Change - Picture 1 of 1">
+            <a:extLst>
+              <a:ext uri="{FF2B5EF4-FFF2-40B4-BE49-F238E27FC236}">
+                <a16:creationId xmlns:a16="http://schemas.microsoft.com/office/drawing/2014/main" id="{875E5102-4C9E-2544-24C9-E84B8170CC02}"/>
+              </a:ext>
+            </a:extLst>
+          </p:cNvPr>
+          <p:cNvPicPr>
+            <a:picLocks noChangeAspect="1" noChangeArrowheads="1"/>
+          </p:cNvPicPr>
+          <p:nvPr/>
+        </p:nvPicPr>
+        <p:blipFill>
+          <a:blip r:embed="rId3">
+            <a:extLst>
+              <a:ext uri="{28A0092B-C50C-407E-A947-70E740481C1C}">
+                <a14:useLocalDpi xmlns:a14="http://schemas.microsoft.com/office/drawing/2010/main" val="0"/>
+              </a:ext>
+            </a:extLst>
+          </a:blip>
+          <a:srcRect/>
+          <a:stretch>
+            <a:fillRect/>
+          </a:stretch>
+        </p:blipFill>
+        <p:spPr bwMode="auto">
+          <a:xfrm>
+            <a:off x="3425588" y="82178"/>
+            <a:ext cx="5377217" cy="6739257"/>
+          </a:xfrm>
+          <a:prstGeom prst="rect">
+            <a:avLst/>
+          </a:prstGeom>
+          <a:noFill/>
+          <a:extLst>
+            <a:ext uri="{909E8E84-426E-40DD-AFC4-6F175D3DCCD1}">
+              <a14:hiddenFill xmlns:a14="http://schemas.microsoft.com/office/drawing/2010/main">
+                <a:solidFill>
+                  <a:srgbClr val="FFFFFF"/>
+                </a:solidFill>
+              </a14:hiddenFill>
+            </a:ext>
+          </a:extLst>
+        </p:spPr>
+      </p:pic>
+    </p:spTree>
+    <p:extLst>
+      <p:ext uri="{BB962C8B-B14F-4D97-AF65-F5344CB8AC3E}">
+        <p14:creationId xmlns:p14="http://schemas.microsoft.com/office/powerpoint/2010/main" val="1393936036"/>
+      </p:ext>
+    </p:extLst>
+  </p:cSld>
+  <p:clrMapOvr>
+    <a:masterClrMapping/>
+  </p:clrMapOvr>
+</p:sld>
+</file>
+
+<file path=ppt/slides/slide30.xml><?xml version="1.0" encoding="utf-8"?>
 <p:sld xmlns:a="http://schemas.openxmlformats.org/drawingml/2006/main" xmlns:r="http://schemas.openxmlformats.org/officeDocument/2006/relationships" xmlns:p="http://schemas.openxmlformats.org/presentationml/2006/main">
   <p:cSld>
     <p:spTree>
@@ -47510,84 +48745,7 @@
 </p:sld>
 </file>
 
-<file path=ppt/slides/slide3.xml><?xml version="1.0" encoding="utf-8"?>
-<p:sld xmlns:a="http://schemas.openxmlformats.org/drawingml/2006/main" xmlns:r="http://schemas.openxmlformats.org/officeDocument/2006/relationships" xmlns:p="http://schemas.openxmlformats.org/presentationml/2006/main">
-  <p:cSld>
-    <p:spTree>
-      <p:nvGrpSpPr>
-        <p:cNvPr id="1" name=""/>
-        <p:cNvGrpSpPr/>
-        <p:nvPr/>
-      </p:nvGrpSpPr>
-      <p:grpSpPr>
-        <a:xfrm>
-          <a:off x="0" y="0"/>
-          <a:ext cx="0" cy="0"/>
-          <a:chOff x="0" y="0"/>
-          <a:chExt cx="0" cy="0"/>
-        </a:xfrm>
-      </p:grpSpPr>
-      <p:pic>
-        <p:nvPicPr>
-          <p:cNvPr id="2050" name="Picture 2" descr="Extreme Programming Explained: Embrace Change - Picture 1 of 1">
-            <a:extLst>
-              <a:ext uri="{FF2B5EF4-FFF2-40B4-BE49-F238E27FC236}">
-                <a16:creationId xmlns:a16="http://schemas.microsoft.com/office/drawing/2014/main" id="{875E5102-4C9E-2544-24C9-E84B8170CC02}"/>
-              </a:ext>
-            </a:extLst>
-          </p:cNvPr>
-          <p:cNvPicPr>
-            <a:picLocks noChangeAspect="1" noChangeArrowheads="1"/>
-          </p:cNvPicPr>
-          <p:nvPr/>
-        </p:nvPicPr>
-        <p:blipFill>
-          <a:blip r:embed="rId3">
-            <a:extLst>
-              <a:ext uri="{28A0092B-C50C-407E-A947-70E740481C1C}">
-                <a14:useLocalDpi xmlns:a14="http://schemas.microsoft.com/office/drawing/2010/main" val="0"/>
-              </a:ext>
-            </a:extLst>
-          </a:blip>
-          <a:srcRect/>
-          <a:stretch>
-            <a:fillRect/>
-          </a:stretch>
-        </p:blipFill>
-        <p:spPr bwMode="auto">
-          <a:xfrm>
-            <a:off x="3425588" y="82178"/>
-            <a:ext cx="5377217" cy="6739257"/>
-          </a:xfrm>
-          <a:prstGeom prst="rect">
-            <a:avLst/>
-          </a:prstGeom>
-          <a:noFill/>
-          <a:extLst>
-            <a:ext uri="{909E8E84-426E-40DD-AFC4-6F175D3DCCD1}">
-              <a14:hiddenFill xmlns:a14="http://schemas.microsoft.com/office/drawing/2010/main">
-                <a:solidFill>
-                  <a:srgbClr val="FFFFFF"/>
-                </a:solidFill>
-              </a14:hiddenFill>
-            </a:ext>
-          </a:extLst>
-        </p:spPr>
-      </p:pic>
-    </p:spTree>
-    <p:extLst>
-      <p:ext uri="{BB962C8B-B14F-4D97-AF65-F5344CB8AC3E}">
-        <p14:creationId xmlns:p14="http://schemas.microsoft.com/office/powerpoint/2010/main" val="1393936036"/>
-      </p:ext>
-    </p:extLst>
-  </p:cSld>
-  <p:clrMapOvr>
-    <a:masterClrMapping/>
-  </p:clrMapOvr>
-</p:sld>
-</file>
-
-<file path=ppt/slides/slide30.xml><?xml version="1.0" encoding="utf-8"?>
+<file path=ppt/slides/slide31.xml><?xml version="1.0" encoding="utf-8"?>
 <p:sld xmlns:a="http://schemas.openxmlformats.org/drawingml/2006/main" xmlns:r="http://schemas.openxmlformats.org/officeDocument/2006/relationships" xmlns:p="http://schemas.openxmlformats.org/presentationml/2006/main">
   <p:cSld>
     <p:spTree>
@@ -49229,7 +50387,7 @@
           <a:p>
             <a:r>
               <a:rPr lang="en-US" dirty="0"/>
-              <a:t>Recommendation</a:t>
+              <a:t>Recommendation – Data-driven Improvement</a:t>
             </a:r>
           </a:p>
         </p:txBody>

</xml_diff>